<commit_message>
another test for commits
</commit_message>
<xml_diff>
--- a/02_project-steps-aibl.pptx
+++ b/02_project-steps-aibl.pptx
@@ -320,18 +320,18 @@
   <pc:docChgLst>
     <pc:chgData name="Osama Mohammed Moustafa Hosam Elde" userId="ab8f451e-a635-42ee-be12-e2dde55852bf" providerId="ADAL" clId="{B6D8E2E3-C58C-42AC-BD6D-A79F41996BB5}"/>
     <pc:docChg chg="undo custSel modSld">
-      <pc:chgData name="Osama Mohammed Moustafa Hosam Elde" userId="ab8f451e-a635-42ee-be12-e2dde55852bf" providerId="ADAL" clId="{B6D8E2E3-C58C-42AC-BD6D-A79F41996BB5}" dt="2020-02-17T11:21:23.543" v="705" actId="20577"/>
+      <pc:chgData name="Osama Mohammed Moustafa Hosam Elde" userId="ab8f451e-a635-42ee-be12-e2dde55852bf" providerId="ADAL" clId="{B6D8E2E3-C58C-42AC-BD6D-A79F41996BB5}" dt="2020-02-17T11:35:07.740" v="706" actId="20577"/>
       <pc:docMkLst>
         <pc:docMk/>
       </pc:docMkLst>
       <pc:sldChg chg="modSp">
-        <pc:chgData name="Osama Mohammed Moustafa Hosam Elde" userId="ab8f451e-a635-42ee-be12-e2dde55852bf" providerId="ADAL" clId="{B6D8E2E3-C58C-42AC-BD6D-A79F41996BB5}" dt="2020-02-17T11:21:23.543" v="705" actId="20577"/>
+        <pc:chgData name="Osama Mohammed Moustafa Hosam Elde" userId="ab8f451e-a635-42ee-be12-e2dde55852bf" providerId="ADAL" clId="{B6D8E2E3-C58C-42AC-BD6D-A79F41996BB5}" dt="2020-02-17T11:35:07.740" v="706" actId="20577"/>
         <pc:sldMkLst>
           <pc:docMk/>
           <pc:sldMk cId="0" sldId="257"/>
         </pc:sldMkLst>
         <pc:spChg chg="mod">
-          <ac:chgData name="Osama Mohammed Moustafa Hosam Elde" userId="ab8f451e-a635-42ee-be12-e2dde55852bf" providerId="ADAL" clId="{B6D8E2E3-C58C-42AC-BD6D-A79F41996BB5}" dt="2020-02-17T11:21:23.543" v="705" actId="20577"/>
+          <ac:chgData name="Osama Mohammed Moustafa Hosam Elde" userId="ab8f451e-a635-42ee-be12-e2dde55852bf" providerId="ADAL" clId="{B6D8E2E3-C58C-42AC-BD6D-A79F41996BB5}" dt="2020-02-17T11:35:07.740" v="706" actId="20577"/>
           <ac:spMkLst>
             <pc:docMk/>
             <pc:sldMk cId="0" sldId="257"/>
@@ -15118,7 +15118,7 @@
             </a:pPr>
             <a:r>
               <a:rPr lang="en" sz="3600"/>
-              <a:t>First Prioritization Grid.</a:t>
+              <a:t>First Prioritization Grid</a:t>
             </a:r>
             <a:endParaRPr sz="3600"/>
           </a:p>

</xml_diff>

<commit_message>
still trying to figure out how to login to github account
</commit_message>
<xml_diff>
--- a/02_project-steps-aibl.pptx
+++ b/02_project-steps-aibl.pptx
@@ -320,10 +320,25 @@
   <pc:docChgLst>
     <pc:chgData name="Osama Mohammed Moustafa Hosam Elde" userId="ab8f451e-a635-42ee-be12-e2dde55852bf" providerId="ADAL" clId="{B6D8E2E3-C58C-42AC-BD6D-A79F41996BB5}"/>
     <pc:docChg chg="undo custSel modSld">
-      <pc:chgData name="Osama Mohammed Moustafa Hosam Elde" userId="ab8f451e-a635-42ee-be12-e2dde55852bf" providerId="ADAL" clId="{B6D8E2E3-C58C-42AC-BD6D-A79F41996BB5}" dt="2020-02-17T11:35:07.740" v="706" actId="20577"/>
+      <pc:chgData name="Osama Mohammed Moustafa Hosam Elde" userId="ab8f451e-a635-42ee-be12-e2dde55852bf" providerId="ADAL" clId="{B6D8E2E3-C58C-42AC-BD6D-A79F41996BB5}" dt="2020-02-17T12:55:26.697" v="709" actId="20577"/>
       <pc:docMkLst>
         <pc:docMk/>
       </pc:docMkLst>
+      <pc:sldChg chg="modSp">
+        <pc:chgData name="Osama Mohammed Moustafa Hosam Elde" userId="ab8f451e-a635-42ee-be12-e2dde55852bf" providerId="ADAL" clId="{B6D8E2E3-C58C-42AC-BD6D-A79F41996BB5}" dt="2020-02-17T12:55:26.697" v="709" actId="20577"/>
+        <pc:sldMkLst>
+          <pc:docMk/>
+          <pc:sldMk cId="0" sldId="256"/>
+        </pc:sldMkLst>
+        <pc:spChg chg="mod">
+          <ac:chgData name="Osama Mohammed Moustafa Hosam Elde" userId="ab8f451e-a635-42ee-be12-e2dde55852bf" providerId="ADAL" clId="{B6D8E2E3-C58C-42AC-BD6D-A79F41996BB5}" dt="2020-02-17T12:55:26.697" v="709" actId="20577"/>
+          <ac:spMkLst>
+            <pc:docMk/>
+            <pc:sldMk cId="0" sldId="256"/>
+            <ac:spMk id="67" creationId="{00000000-0000-0000-0000-000000000000}"/>
+          </ac:spMkLst>
+        </pc:spChg>
+      </pc:sldChg>
       <pc:sldChg chg="modSp">
         <pc:chgData name="Osama Mohammed Moustafa Hosam Elde" userId="ab8f451e-a635-42ee-be12-e2dde55852bf" providerId="ADAL" clId="{B6D8E2E3-C58C-42AC-BD6D-A79F41996BB5}" dt="2020-02-17T11:35:07.740" v="706" actId="20577"/>
         <pc:sldMkLst>
@@ -1361,8 +1376,8 @@
         </p:nvSpPr>
         <p:spPr>
           <a:xfrm>
-            <a:off x="381300" y="685800"/>
-            <a:ext cx="6096075" cy="3429000"/>
+            <a:off x="381000" y="685800"/>
+            <a:ext cx="6096000" cy="3429000"/>
           </a:xfrm>
           <a:custGeom>
             <a:avLst/>
@@ -10689,7 +10704,7 @@
               <a:buNone/>
             </a:pPr>
             <a:r>
-              <a:rPr lang="en" sz="3000">
+              <a:rPr lang="en" sz="3000" dirty="0">
                 <a:latin typeface="Open Sans"/>
                 <a:ea typeface="Open Sans"/>
                 <a:cs typeface="Open Sans"/>
@@ -10697,7 +10712,7 @@
               </a:rPr>
               <a:t>AI For Business Leaders Course</a:t>
             </a:r>
-            <a:endParaRPr sz="3000">
+            <a:endParaRPr sz="3000" dirty="0">
               <a:latin typeface="Open Sans"/>
               <a:ea typeface="Open Sans"/>
               <a:cs typeface="Open Sans"/>
@@ -10714,7 +10729,7 @@
               </a:spcAft>
               <a:buNone/>
             </a:pPr>
-            <a:endParaRPr sz="3000">
+            <a:endParaRPr sz="3000" dirty="0">
               <a:latin typeface="Open Sans"/>
               <a:ea typeface="Open Sans"/>
               <a:cs typeface="Open Sans"/>
@@ -10732,7 +10747,7 @@
               <a:buNone/>
             </a:pPr>
             <a:r>
-              <a:rPr lang="en" sz="3000">
+              <a:rPr lang="en" sz="3000" dirty="0">
                 <a:latin typeface="Open Sans"/>
                 <a:ea typeface="Open Sans"/>
                 <a:cs typeface="Open Sans"/>
@@ -10741,10 +10756,10 @@
               <a:t>Project Steps: Delivering an ML/AI Strategy</a:t>
             </a:r>
             <a:r>
-              <a:rPr lang="en" sz="3600"/>
+              <a:rPr lang="en" sz="3600" dirty="0"/>
               <a:t> </a:t>
             </a:r>
-            <a:endParaRPr sz="3600"/>
+            <a:endParaRPr sz="3600" dirty="0"/>
           </a:p>
           <a:p>
             <a:pPr marL="0" lvl="0" indent="0" algn="l" rtl="0">
@@ -10756,7 +10771,11 @@
               </a:spcAft>
               <a:buNone/>
             </a:pPr>
-            <a:endParaRPr/>
+            <a:r>
+              <a:rPr lang="en-US" dirty="0" err="1"/>
+              <a:t>dfs</a:t>
+            </a:r>
+            <a:endParaRPr dirty="0"/>
           </a:p>
         </p:txBody>
       </p:sp>

</xml_diff>

<commit_message>
finished up to step 5
</commit_message>
<xml_diff>
--- a/02_project-steps-aibl.pptx
+++ b/02_project-steps-aibl.pptx
@@ -310,7 +310,7 @@
 <file path=ppt/revisionInfo.xml><?xml version="1.0" encoding="utf-8"?>
 <p1510:revInfo xmlns:a="http://schemas.openxmlformats.org/drawingml/2006/main" xmlns:r="http://schemas.openxmlformats.org/officeDocument/2006/relationships" xmlns:p1510="http://schemas.microsoft.com/office/powerpoint/2015/10/main">
   <p1510:revLst>
-    <p1510:client id="{B6D8E2E3-C58C-42AC-BD6D-A79F41996BB5}" v="74" dt="2020-02-16T20:57:22.725"/>
+    <p1510:client id="{B6D8E2E3-C58C-42AC-BD6D-A79F41996BB5}" v="85" dt="2020-02-17T14:37:13.881"/>
   </p1510:revLst>
 </p1510:revInfo>
 </file>
@@ -320,7 +320,7 @@
   <pc:docChgLst>
     <pc:chgData name="Osama Mohammed Moustafa Hosam Elde" userId="ab8f451e-a635-42ee-be12-e2dde55852bf" providerId="ADAL" clId="{B6D8E2E3-C58C-42AC-BD6D-A79F41996BB5}"/>
     <pc:docChg chg="undo custSel modSld">
-      <pc:chgData name="Osama Mohammed Moustafa Hosam Elde" userId="ab8f451e-a635-42ee-be12-e2dde55852bf" providerId="ADAL" clId="{B6D8E2E3-C58C-42AC-BD6D-A79F41996BB5}" dt="2020-02-17T13:00:44.211" v="710" actId="20577"/>
+      <pc:chgData name="Osama Mohammed Moustafa Hosam Elde" userId="ab8f451e-a635-42ee-be12-e2dde55852bf" providerId="ADAL" clId="{B6D8E2E3-C58C-42AC-BD6D-A79F41996BB5}" dt="2020-02-17T14:46:11.576" v="2837" actId="478"/>
       <pc:docMkLst>
         <pc:docMk/>
       </pc:docMkLst>
@@ -901,6 +901,99 @@
           </ac:picMkLst>
         </pc:picChg>
       </pc:sldChg>
+      <pc:sldChg chg="addSp delSp modSp">
+        <pc:chgData name="Osama Mohammed Moustafa Hosam Elde" userId="ab8f451e-a635-42ee-be12-e2dde55852bf" providerId="ADAL" clId="{B6D8E2E3-C58C-42AC-BD6D-A79F41996BB5}" dt="2020-02-17T14:08:30.922" v="732" actId="207"/>
+        <pc:sldMkLst>
+          <pc:docMk/>
+          <pc:sldMk cId="0" sldId="271"/>
+        </pc:sldMkLst>
+        <pc:spChg chg="add mod">
+          <ac:chgData name="Osama Mohammed Moustafa Hosam Elde" userId="ab8f451e-a635-42ee-be12-e2dde55852bf" providerId="ADAL" clId="{B6D8E2E3-C58C-42AC-BD6D-A79F41996BB5}" dt="2020-02-17T14:07:27.880" v="721" actId="1076"/>
+          <ac:spMkLst>
+            <pc:docMk/>
+            <pc:sldMk cId="0" sldId="271"/>
+            <ac:spMk id="25" creationId="{9825E33E-050F-49B1-9A6B-FB766898D110}"/>
+          </ac:spMkLst>
+        </pc:spChg>
+        <pc:spChg chg="add mod">
+          <ac:chgData name="Osama Mohammed Moustafa Hosam Elde" userId="ab8f451e-a635-42ee-be12-e2dde55852bf" providerId="ADAL" clId="{B6D8E2E3-C58C-42AC-BD6D-A79F41996BB5}" dt="2020-02-17T14:07:26.200" v="720" actId="1076"/>
+          <ac:spMkLst>
+            <pc:docMk/>
+            <pc:sldMk cId="0" sldId="271"/>
+            <ac:spMk id="26" creationId="{2C058A09-3626-48BE-968E-2879F77D1470}"/>
+          </ac:spMkLst>
+        </pc:spChg>
+        <pc:spChg chg="add del mod">
+          <ac:chgData name="Osama Mohammed Moustafa Hosam Elde" userId="ab8f451e-a635-42ee-be12-e2dde55852bf" providerId="ADAL" clId="{B6D8E2E3-C58C-42AC-BD6D-A79F41996BB5}" dt="2020-02-17T14:07:23.137" v="718" actId="478"/>
+          <ac:spMkLst>
+            <pc:docMk/>
+            <pc:sldMk cId="0" sldId="271"/>
+            <ac:spMk id="27" creationId="{CC83B30E-3759-4D23-B9DC-37604EB9729E}"/>
+          </ac:spMkLst>
+        </pc:spChg>
+        <pc:spChg chg="add mod">
+          <ac:chgData name="Osama Mohammed Moustafa Hosam Elde" userId="ab8f451e-a635-42ee-be12-e2dde55852bf" providerId="ADAL" clId="{B6D8E2E3-C58C-42AC-BD6D-A79F41996BB5}" dt="2020-02-17T14:08:30.922" v="732" actId="207"/>
+          <ac:spMkLst>
+            <pc:docMk/>
+            <pc:sldMk cId="0" sldId="271"/>
+            <ac:spMk id="28" creationId="{62955130-B96C-492F-93ED-EB69F4A49983}"/>
+          </ac:spMkLst>
+        </pc:spChg>
+        <pc:spChg chg="mod">
+          <ac:chgData name="Osama Mohammed Moustafa Hosam Elde" userId="ab8f451e-a635-42ee-be12-e2dde55852bf" providerId="ADAL" clId="{B6D8E2E3-C58C-42AC-BD6D-A79F41996BB5}" dt="2020-02-17T14:07:48.083" v="725" actId="1076"/>
+          <ac:spMkLst>
+            <pc:docMk/>
+            <pc:sldMk cId="0" sldId="271"/>
+            <ac:spMk id="213" creationId="{00000000-0000-0000-0000-000000000000}"/>
+          </ac:spMkLst>
+        </pc:spChg>
+      </pc:sldChg>
+      <pc:sldChg chg="addSp delSp modSp">
+        <pc:chgData name="Osama Mohammed Moustafa Hosam Elde" userId="ab8f451e-a635-42ee-be12-e2dde55852bf" providerId="ADAL" clId="{B6D8E2E3-C58C-42AC-BD6D-A79F41996BB5}" dt="2020-02-17T14:27:05.457" v="1779" actId="20577"/>
+        <pc:sldMkLst>
+          <pc:docMk/>
+          <pc:sldMk cId="0" sldId="276"/>
+        </pc:sldMkLst>
+        <pc:spChg chg="mod">
+          <ac:chgData name="Osama Mohammed Moustafa Hosam Elde" userId="ab8f451e-a635-42ee-be12-e2dde55852bf" providerId="ADAL" clId="{B6D8E2E3-C58C-42AC-BD6D-A79F41996BB5}" dt="2020-02-17T14:27:05.457" v="1779" actId="20577"/>
+          <ac:spMkLst>
+            <pc:docMk/>
+            <pc:sldMk cId="0" sldId="276"/>
+            <ac:spMk id="260" creationId="{00000000-0000-0000-0000-000000000000}"/>
+          </ac:spMkLst>
+        </pc:spChg>
+        <pc:picChg chg="add del mod">
+          <ac:chgData name="Osama Mohammed Moustafa Hosam Elde" userId="ab8f451e-a635-42ee-be12-e2dde55852bf" providerId="ADAL" clId="{B6D8E2E3-C58C-42AC-BD6D-A79F41996BB5}" dt="2020-02-17T14:24:58.408" v="1353" actId="478"/>
+          <ac:picMkLst>
+            <pc:docMk/>
+            <pc:sldMk cId="0" sldId="276"/>
+            <ac:picMk id="2" creationId="{BAB7CA86-F29E-484A-8D24-B5FC23C90B9F}"/>
+          </ac:picMkLst>
+        </pc:picChg>
+      </pc:sldChg>
+      <pc:sldChg chg="addSp delSp modSp">
+        <pc:chgData name="Osama Mohammed Moustafa Hosam Elde" userId="ab8f451e-a635-42ee-be12-e2dde55852bf" providerId="ADAL" clId="{B6D8E2E3-C58C-42AC-BD6D-A79F41996BB5}" dt="2020-02-17T14:46:11.576" v="2837" actId="478"/>
+        <pc:sldMkLst>
+          <pc:docMk/>
+          <pc:sldMk cId="0" sldId="277"/>
+        </pc:sldMkLst>
+        <pc:spChg chg="mod">
+          <ac:chgData name="Osama Mohammed Moustafa Hosam Elde" userId="ab8f451e-a635-42ee-be12-e2dde55852bf" providerId="ADAL" clId="{B6D8E2E3-C58C-42AC-BD6D-A79F41996BB5}" dt="2020-02-17T14:46:08.330" v="2836" actId="20577"/>
+          <ac:spMkLst>
+            <pc:docMk/>
+            <pc:sldMk cId="0" sldId="277"/>
+            <ac:spMk id="266" creationId="{00000000-0000-0000-0000-000000000000}"/>
+          </ac:spMkLst>
+        </pc:spChg>
+        <pc:picChg chg="add del mod">
+          <ac:chgData name="Osama Mohammed Moustafa Hosam Elde" userId="ab8f451e-a635-42ee-be12-e2dde55852bf" providerId="ADAL" clId="{B6D8E2E3-C58C-42AC-BD6D-A79F41996BB5}" dt="2020-02-17T14:46:11.576" v="2837" actId="478"/>
+          <ac:picMkLst>
+            <pc:docMk/>
+            <pc:sldMk cId="0" sldId="277"/>
+            <ac:picMk id="2" creationId="{51C1E37F-46F3-46CC-AC27-6BF74F42D0E5}"/>
+          </ac:picMkLst>
+        </pc:picChg>
+      </pc:sldChg>
     </pc:docChg>
   </pc:docChgLst>
 </pc:chgInfo>
@@ -2116,8 +2209,8 @@
         </p:nvSpPr>
         <p:spPr>
           <a:xfrm>
-            <a:off x="381188" y="685800"/>
-            <a:ext cx="6096300" cy="3429000"/>
+            <a:off x="381000" y="685800"/>
+            <a:ext cx="6096000" cy="3429000"/>
           </a:xfrm>
           <a:custGeom>
             <a:avLst/>
@@ -2740,7 +2833,7 @@
         </p:nvSpPr>
         <p:spPr>
           <a:xfrm>
-            <a:off x="381300" y="685800"/>
+            <a:off x="381000" y="685800"/>
             <a:ext cx="6096000" cy="3429000"/>
           </a:xfrm>
           <a:custGeom>
@@ -2844,7 +2937,7 @@
         </p:nvSpPr>
         <p:spPr>
           <a:xfrm>
-            <a:off x="381300" y="685800"/>
+            <a:off x="381000" y="685800"/>
             <a:ext cx="6096000" cy="3429000"/>
           </a:xfrm>
           <a:custGeom>
@@ -14544,6 +14637,246 @@
           </p:txBody>
         </p:sp>
       </p:grpSp>
+      <p:sp>
+        <p:nvSpPr>
+          <p:cNvPr id="25" name="Google Shape;211;p28">
+            <a:extLst>
+              <a:ext uri="{FF2B5EF4-FFF2-40B4-BE49-F238E27FC236}">
+                <a16:creationId xmlns:a16="http://schemas.microsoft.com/office/drawing/2014/main" id="{9825E33E-050F-49B1-9A6B-FB766898D110}"/>
+              </a:ext>
+            </a:extLst>
+          </p:cNvPr>
+          <p:cNvSpPr/>
+          <p:nvPr/>
+        </p:nvSpPr>
+        <p:spPr>
+          <a:xfrm>
+            <a:off x="1171109" y="1787925"/>
+            <a:ext cx="345000" cy="338400"/>
+          </a:xfrm>
+          <a:prstGeom prst="ellipse">
+            <a:avLst/>
+          </a:prstGeom>
+          <a:solidFill>
+            <a:schemeClr val="dk1"/>
+          </a:solidFill>
+          <a:ln w="9525" cap="flat" cmpd="sng">
+            <a:solidFill>
+              <a:srgbClr val="666666"/>
+            </a:solidFill>
+            <a:prstDash val="solid"/>
+            <a:round/>
+            <a:headEnd type="none" w="sm" len="sm"/>
+            <a:tailEnd type="none" w="sm" len="sm"/>
+          </a:ln>
+        </p:spPr>
+        <p:txBody>
+          <a:bodyPr spcFirstLastPara="1" wrap="square" lIns="0" tIns="0" rIns="0" bIns="0" anchor="ctr" anchorCtr="0">
+            <a:noAutofit/>
+          </a:bodyPr>
+          <a:lstStyle/>
+          <a:p>
+            <a:pPr marL="0" lvl="0" indent="0" algn="ctr" rtl="0">
+              <a:spcBef>
+                <a:spcPts val="0"/>
+              </a:spcBef>
+              <a:spcAft>
+                <a:spcPts val="0"/>
+              </a:spcAft>
+              <a:buNone/>
+            </a:pPr>
+            <a:r>
+              <a:rPr lang="en" sz="900">
+                <a:solidFill>
+                  <a:srgbClr val="FFFFFF"/>
+                </a:solidFill>
+              </a:rPr>
+              <a:t>UC</a:t>
+            </a:r>
+            <a:br>
+              <a:rPr lang="en" sz="900">
+                <a:solidFill>
+                  <a:srgbClr val="FFFFFF"/>
+                </a:solidFill>
+              </a:rPr>
+            </a:br>
+            <a:r>
+              <a:rPr lang="en" sz="900">
+                <a:solidFill>
+                  <a:srgbClr val="FFFFFF"/>
+                </a:solidFill>
+              </a:rPr>
+              <a:t>1</a:t>
+            </a:r>
+            <a:endParaRPr sz="900">
+              <a:solidFill>
+                <a:srgbClr val="FFFFFF"/>
+              </a:solidFill>
+            </a:endParaRPr>
+          </a:p>
+        </p:txBody>
+      </p:sp>
+      <p:sp>
+        <p:nvSpPr>
+          <p:cNvPr id="26" name="Google Shape;214;p28">
+            <a:extLst>
+              <a:ext uri="{FF2B5EF4-FFF2-40B4-BE49-F238E27FC236}">
+                <a16:creationId xmlns:a16="http://schemas.microsoft.com/office/drawing/2014/main" id="{2C058A09-3626-48BE-968E-2879F77D1470}"/>
+              </a:ext>
+            </a:extLst>
+          </p:cNvPr>
+          <p:cNvSpPr/>
+          <p:nvPr/>
+        </p:nvSpPr>
+        <p:spPr>
+          <a:xfrm>
+            <a:off x="1831587" y="2126325"/>
+            <a:ext cx="345000" cy="338400"/>
+          </a:xfrm>
+          <a:prstGeom prst="ellipse">
+            <a:avLst/>
+          </a:prstGeom>
+          <a:solidFill>
+            <a:schemeClr val="dk1"/>
+          </a:solidFill>
+          <a:ln w="9525" cap="flat" cmpd="sng">
+            <a:solidFill>
+              <a:srgbClr val="666666"/>
+            </a:solidFill>
+            <a:prstDash val="solid"/>
+            <a:round/>
+            <a:headEnd type="none" w="sm" len="sm"/>
+            <a:tailEnd type="none" w="sm" len="sm"/>
+          </a:ln>
+        </p:spPr>
+        <p:txBody>
+          <a:bodyPr spcFirstLastPara="1" wrap="square" lIns="0" tIns="0" rIns="0" bIns="0" anchor="ctr" anchorCtr="0">
+            <a:noAutofit/>
+          </a:bodyPr>
+          <a:lstStyle/>
+          <a:p>
+            <a:pPr marL="0" lvl="0" indent="0" algn="ctr" rtl="0">
+              <a:spcBef>
+                <a:spcPts val="0"/>
+              </a:spcBef>
+              <a:spcAft>
+                <a:spcPts val="0"/>
+              </a:spcAft>
+              <a:buNone/>
+            </a:pPr>
+            <a:r>
+              <a:rPr lang="en" sz="900">
+                <a:solidFill>
+                  <a:srgbClr val="FFFFFF"/>
+                </a:solidFill>
+              </a:rPr>
+              <a:t>UC</a:t>
+            </a:r>
+            <a:br>
+              <a:rPr lang="en" sz="900">
+                <a:solidFill>
+                  <a:srgbClr val="FFFFFF"/>
+                </a:solidFill>
+              </a:rPr>
+            </a:br>
+            <a:r>
+              <a:rPr lang="en" sz="900">
+                <a:solidFill>
+                  <a:srgbClr val="FFFFFF"/>
+                </a:solidFill>
+              </a:rPr>
+              <a:t>4</a:t>
+            </a:r>
+            <a:endParaRPr sz="900">
+              <a:solidFill>
+                <a:srgbClr val="FFFFFF"/>
+              </a:solidFill>
+            </a:endParaRPr>
+          </a:p>
+        </p:txBody>
+      </p:sp>
+      <p:sp>
+        <p:nvSpPr>
+          <p:cNvPr id="28" name="Google Shape;213;p28">
+            <a:extLst>
+              <a:ext uri="{FF2B5EF4-FFF2-40B4-BE49-F238E27FC236}">
+                <a16:creationId xmlns:a16="http://schemas.microsoft.com/office/drawing/2014/main" id="{62955130-B96C-492F-93ED-EB69F4A49983}"/>
+              </a:ext>
+            </a:extLst>
+          </p:cNvPr>
+          <p:cNvSpPr/>
+          <p:nvPr/>
+        </p:nvSpPr>
+        <p:spPr>
+          <a:xfrm>
+            <a:off x="1831587" y="2813855"/>
+            <a:ext cx="345000" cy="338400"/>
+          </a:xfrm>
+          <a:prstGeom prst="ellipse">
+            <a:avLst/>
+          </a:prstGeom>
+          <a:solidFill>
+            <a:schemeClr val="tx2">
+              <a:lumMod val="60000"/>
+              <a:lumOff val="40000"/>
+            </a:schemeClr>
+          </a:solidFill>
+          <a:ln w="9525" cap="flat" cmpd="sng">
+            <a:solidFill>
+              <a:srgbClr val="666666"/>
+            </a:solidFill>
+            <a:prstDash val="solid"/>
+            <a:round/>
+            <a:headEnd type="none" w="sm" len="sm"/>
+            <a:tailEnd type="none" w="sm" len="sm"/>
+          </a:ln>
+        </p:spPr>
+        <p:txBody>
+          <a:bodyPr spcFirstLastPara="1" wrap="square" lIns="0" tIns="0" rIns="0" bIns="0" anchor="ctr" anchorCtr="0">
+            <a:noAutofit/>
+          </a:bodyPr>
+          <a:lstStyle/>
+          <a:p>
+            <a:pPr marL="0" lvl="0" indent="0" algn="ctr" rtl="0">
+              <a:spcBef>
+                <a:spcPts val="0"/>
+              </a:spcBef>
+              <a:spcAft>
+                <a:spcPts val="0"/>
+              </a:spcAft>
+              <a:buNone/>
+            </a:pPr>
+            <a:r>
+              <a:rPr lang="en" sz="900">
+                <a:solidFill>
+                  <a:schemeClr val="bg1"/>
+                </a:solidFill>
+              </a:rPr>
+              <a:t>UC</a:t>
+            </a:r>
+            <a:br>
+              <a:rPr lang="en" sz="900">
+                <a:solidFill>
+                  <a:schemeClr val="bg1"/>
+                </a:solidFill>
+              </a:rPr>
+            </a:br>
+            <a:r>
+              <a:rPr lang="en" sz="900">
+                <a:solidFill>
+                  <a:schemeClr val="bg1"/>
+                </a:solidFill>
+              </a:rPr>
+              <a:t>3</a:t>
+            </a:r>
+            <a:endParaRPr sz="900">
+              <a:solidFill>
+                <a:schemeClr val="bg1"/>
+              </a:solidFill>
+            </a:endParaRPr>
+          </a:p>
+        </p:txBody>
+      </p:sp>
     </p:spTree>
   </p:cSld>
   <p:clrMapOvr>
@@ -15465,7 +15798,7 @@
               <a:buNone/>
             </a:pPr>
             <a:r>
-              <a:rPr lang="en" sz="1200">
+              <a:rPr lang="en" sz="1200" dirty="0">
                 <a:latin typeface="Roboto"/>
                 <a:ea typeface="Roboto"/>
                 <a:cs typeface="Roboto"/>
@@ -15473,7 +15806,84 @@
               </a:rPr>
               <a:t>Please write 2-3 paragraphs here, following the guidelines on slide 21.</a:t>
             </a:r>
-            <a:endParaRPr sz="1200">
+          </a:p>
+          <a:p>
+            <a:pPr marL="0" lvl="0" indent="0" algn="l" rtl="0">
+              <a:spcBef>
+                <a:spcPts val="0"/>
+              </a:spcBef>
+              <a:spcAft>
+                <a:spcPts val="0"/>
+              </a:spcAft>
+              <a:buNone/>
+            </a:pPr>
+            <a:endParaRPr lang="en" sz="1200" dirty="0">
+              <a:latin typeface="Roboto"/>
+              <a:ea typeface="Roboto"/>
+              <a:cs typeface="Roboto"/>
+              <a:sym typeface="Roboto"/>
+            </a:endParaRPr>
+          </a:p>
+          <a:p>
+            <a:pPr marL="0" lvl="0" indent="0" algn="l" rtl="0">
+              <a:spcBef>
+                <a:spcPts val="0"/>
+              </a:spcBef>
+              <a:spcAft>
+                <a:spcPts val="0"/>
+              </a:spcAft>
+              <a:buNone/>
+            </a:pPr>
+            <a:r>
+              <a:rPr lang="en-US" sz="1200" dirty="0">
+                <a:latin typeface="Roboto"/>
+                <a:ea typeface="Roboto"/>
+                <a:cs typeface="Roboto"/>
+                <a:sym typeface="Roboto"/>
+              </a:rPr>
+              <a:t>The quality control can be controlled totally on visual classification. In which it can be either binary classifier, so the classifier can detect the existence/absence of the defect. But the defect will be then examined manually. </a:t>
+            </a:r>
+          </a:p>
+          <a:p>
+            <a:pPr marL="0" lvl="0" indent="0" algn="l" rtl="0">
+              <a:spcBef>
+                <a:spcPts val="0"/>
+              </a:spcBef>
+              <a:spcAft>
+                <a:spcPts val="0"/>
+              </a:spcAft>
+              <a:buNone/>
+            </a:pPr>
+            <a:r>
+              <a:rPr lang="en-US" sz="1200" dirty="0">
+                <a:latin typeface="Roboto"/>
+                <a:ea typeface="Roboto"/>
+                <a:cs typeface="Roboto"/>
+                <a:sym typeface="Roboto"/>
+              </a:rPr>
+              <a:t>This methods takes too much time and effort and may need labor work. Another idea is to divide the classification into multiple types (classes). And train the classifier on the labels, one label for each defect. We can classify as much labels as we need due to the existence of deep neural networking.  </a:t>
+            </a:r>
+          </a:p>
+          <a:p>
+            <a:pPr marL="0" lvl="0" indent="0" algn="l" rtl="0">
+              <a:spcBef>
+                <a:spcPts val="0"/>
+              </a:spcBef>
+              <a:spcAft>
+                <a:spcPts val="0"/>
+              </a:spcAft>
+              <a:buNone/>
+            </a:pPr>
+            <a:r>
+              <a:rPr lang="en-US" sz="1200" dirty="0">
+                <a:latin typeface="Roboto"/>
+                <a:ea typeface="Roboto"/>
+                <a:cs typeface="Roboto"/>
+                <a:sym typeface="Roboto"/>
+              </a:rPr>
+              <a:t>Business rule are then be implied to see what you will do with the defective devices. After discovery, what the quality engineer will do ? Will he count the number of defectives and if increased on threshold he will stop line/machine? Or he will calculate some probability and if the probability of defective &gt; threshold he will stop line/machine. </a:t>
+            </a:r>
+            <a:endParaRPr sz="1200" dirty="0">
               <a:latin typeface="Roboto"/>
               <a:ea typeface="Roboto"/>
               <a:cs typeface="Roboto"/>
@@ -15584,7 +15994,7 @@
               <a:buNone/>
             </a:pPr>
             <a:r>
-              <a:rPr lang="en" sz="1200">
+              <a:rPr lang="en" sz="1200" dirty="0">
                 <a:latin typeface="Roboto"/>
                 <a:ea typeface="Roboto"/>
                 <a:cs typeface="Roboto"/>
@@ -15592,7 +16002,84 @@
               </a:rPr>
               <a:t>Please write 2-3 paragraphs here, following the guidelines on slide 21.</a:t>
             </a:r>
-            <a:endParaRPr sz="1200">
+          </a:p>
+          <a:p>
+            <a:pPr marL="0" lvl="0" indent="0" algn="l" rtl="0">
+              <a:spcBef>
+                <a:spcPts val="0"/>
+              </a:spcBef>
+              <a:spcAft>
+                <a:spcPts val="0"/>
+              </a:spcAft>
+              <a:buNone/>
+            </a:pPr>
+            <a:endParaRPr lang="en" sz="1200" dirty="0">
+              <a:latin typeface="Roboto"/>
+              <a:ea typeface="Roboto"/>
+              <a:cs typeface="Roboto"/>
+              <a:sym typeface="Roboto"/>
+            </a:endParaRPr>
+          </a:p>
+          <a:p>
+            <a:pPr marL="0" lvl="0" indent="0" algn="l" rtl="0">
+              <a:spcBef>
+                <a:spcPts val="0"/>
+              </a:spcBef>
+              <a:spcAft>
+                <a:spcPts val="0"/>
+              </a:spcAft>
+              <a:buNone/>
+            </a:pPr>
+            <a:r>
+              <a:rPr lang="en-US" sz="1200" dirty="0">
+                <a:latin typeface="Roboto"/>
+                <a:ea typeface="Roboto"/>
+                <a:cs typeface="Roboto"/>
+                <a:sym typeface="Roboto"/>
+              </a:rPr>
+              <a:t>The basic principle is to use the reading from the sensors in the automobile to check for the expected upcoming failure. Regression can use the failure as a dependent variable and the reading from the sensors as the independent variable. It is expected to have direct relationship between the sensor readings and the expectation of failure. </a:t>
+            </a:r>
+          </a:p>
+          <a:p>
+            <a:pPr marL="0" lvl="0" indent="0" algn="l" rtl="0">
+              <a:spcBef>
+                <a:spcPts val="0"/>
+              </a:spcBef>
+              <a:spcAft>
+                <a:spcPts val="0"/>
+              </a:spcAft>
+              <a:buNone/>
+            </a:pPr>
+            <a:r>
+              <a:rPr lang="en-US" sz="1200" dirty="0">
+                <a:latin typeface="Roboto"/>
+                <a:ea typeface="Roboto"/>
+                <a:cs typeface="Roboto"/>
+                <a:sym typeface="Roboto"/>
+              </a:rPr>
+              <a:t>One concern is that we can expect the existence or upcoming failure only in short amount of time. Time is needed to be at least 2 weeks which might not be feasible with sensor readings. Engineers may involve more sensors readings to overcome this problem. </a:t>
+            </a:r>
+          </a:p>
+          <a:p>
+            <a:pPr marL="0" lvl="0" indent="0" algn="l" rtl="0">
+              <a:spcBef>
+                <a:spcPts val="0"/>
+              </a:spcBef>
+              <a:spcAft>
+                <a:spcPts val="0"/>
+              </a:spcAft>
+              <a:buNone/>
+            </a:pPr>
+            <a:r>
+              <a:rPr lang="en-US" sz="1200" dirty="0">
+                <a:latin typeface="Roboto"/>
+                <a:ea typeface="Roboto"/>
+                <a:cs typeface="Roboto"/>
+                <a:sym typeface="Roboto"/>
+              </a:rPr>
+              <a:t>The second concern is to know which sensor is more important than others regarding failure. One way to see which sensor(s) are vital is to stop him during the test period. Results may lead us to which sensors are effective than others. </a:t>
+            </a:r>
+            <a:endParaRPr sz="1200" dirty="0">
               <a:latin typeface="Roboto"/>
               <a:ea typeface="Roboto"/>
               <a:cs typeface="Roboto"/>
@@ -19936,7 +20423,7 @@
               <a:buNone/>
             </a:pPr>
             <a:r>
-              <a:rPr lang="en" sz="1200">
+              <a:rPr lang="en" sz="1200" dirty="0">
                 <a:latin typeface="Roboto"/>
                 <a:ea typeface="Roboto"/>
                 <a:cs typeface="Roboto"/>
@@ -19944,7 +20431,7 @@
               </a:rPr>
               <a:t>high</a:t>
             </a:r>
-            <a:endParaRPr sz="1200">
+            <a:endParaRPr sz="1200" dirty="0">
               <a:latin typeface="Roboto"/>
               <a:ea typeface="Roboto"/>
               <a:cs typeface="Roboto"/>

</xml_diff>

<commit_message>
updated little bit of slides
</commit_message>
<xml_diff>
--- a/02_project-steps-aibl.pptx
+++ b/02_project-steps-aibl.pptx
@@ -320,18 +320,18 @@
   <pc:docChgLst>
     <pc:chgData name="Osama Mohammed Moustafa Hosam Elde" userId="ab8f451e-a635-42ee-be12-e2dde55852bf" providerId="ADAL" clId="{B6D8E2E3-C58C-42AC-BD6D-A79F41996BB5}"/>
     <pc:docChg chg="undo custSel modSld">
-      <pc:chgData name="Osama Mohammed Moustafa Hosam Elde" userId="ab8f451e-a635-42ee-be12-e2dde55852bf" providerId="ADAL" clId="{B6D8E2E3-C58C-42AC-BD6D-A79F41996BB5}" dt="2020-02-17T14:46:11.576" v="2837" actId="478"/>
+      <pc:chgData name="Osama Mohammed Moustafa Hosam Elde" userId="ab8f451e-a635-42ee-be12-e2dde55852bf" providerId="ADAL" clId="{B6D8E2E3-C58C-42AC-BD6D-A79F41996BB5}" dt="2020-02-17T21:02:35.091" v="2841" actId="20577"/>
       <pc:docMkLst>
         <pc:docMk/>
       </pc:docMkLst>
       <pc:sldChg chg="modSp">
-        <pc:chgData name="Osama Mohammed Moustafa Hosam Elde" userId="ab8f451e-a635-42ee-be12-e2dde55852bf" providerId="ADAL" clId="{B6D8E2E3-C58C-42AC-BD6D-A79F41996BB5}" dt="2020-02-17T13:00:44.211" v="710" actId="20577"/>
+        <pc:chgData name="Osama Mohammed Moustafa Hosam Elde" userId="ab8f451e-a635-42ee-be12-e2dde55852bf" providerId="ADAL" clId="{B6D8E2E3-C58C-42AC-BD6D-A79F41996BB5}" dt="2020-02-17T21:02:35.091" v="2841" actId="20577"/>
         <pc:sldMkLst>
           <pc:docMk/>
           <pc:sldMk cId="0" sldId="256"/>
         </pc:sldMkLst>
         <pc:spChg chg="mod">
-          <ac:chgData name="Osama Mohammed Moustafa Hosam Elde" userId="ab8f451e-a635-42ee-be12-e2dde55852bf" providerId="ADAL" clId="{B6D8E2E3-C58C-42AC-BD6D-A79F41996BB5}" dt="2020-02-17T13:00:44.211" v="710" actId="20577"/>
+          <ac:chgData name="Osama Mohammed Moustafa Hosam Elde" userId="ab8f451e-a635-42ee-be12-e2dde55852bf" providerId="ADAL" clId="{B6D8E2E3-C58C-42AC-BD6D-A79F41996BB5}" dt="2020-02-17T21:02:35.091" v="2841" actId="20577"/>
           <ac:spMkLst>
             <pc:docMk/>
             <pc:sldMk cId="0" sldId="256"/>
@@ -10852,7 +10852,6 @@
               <a:rPr lang="en" sz="3600" dirty="0"/>
               <a:t> </a:t>
             </a:r>
-            <a:endParaRPr sz="3600" dirty="0"/>
           </a:p>
           <a:p>
             <a:pPr marL="0" lvl="0" indent="0" algn="l" rtl="0">
@@ -10864,11 +10863,7 @@
               </a:spcAft>
               <a:buNone/>
             </a:pPr>
-            <a:r>
-              <a:rPr lang="en-US"/>
-              <a:t>df</a:t>
-            </a:r>
-            <a:endParaRPr dirty="0"/>
+            <a:endParaRPr lang="en-US" dirty="0"/>
           </a:p>
         </p:txBody>
       </p:sp>

</xml_diff>

<commit_message>
finished project steps slides
</commit_message>
<xml_diff>
--- a/02_project-steps-aibl.pptx
+++ b/02_project-steps-aibl.pptx
@@ -310,7 +310,7 @@
 <file path=ppt/revisionInfo.xml><?xml version="1.0" encoding="utf-8"?>
 <p1510:revInfo xmlns:a="http://schemas.openxmlformats.org/drawingml/2006/main" xmlns:r="http://schemas.openxmlformats.org/officeDocument/2006/relationships" xmlns:p1510="http://schemas.microsoft.com/office/powerpoint/2015/10/main">
   <p1510:revLst>
-    <p1510:client id="{B6D8E2E3-C58C-42AC-BD6D-A79F41996BB5}" v="85" dt="2020-02-17T14:37:13.881"/>
+    <p1510:client id="{B6D8E2E3-C58C-42AC-BD6D-A79F41996BB5}" v="103" dt="2020-02-18T20:11:27.264"/>
   </p1510:revLst>
 </p1510:revInfo>
 </file>
@@ -320,7 +320,7 @@
   <pc:docChgLst>
     <pc:chgData name="Osama Mohammed Moustafa Hosam Elde" userId="ab8f451e-a635-42ee-be12-e2dde55852bf" providerId="ADAL" clId="{B6D8E2E3-C58C-42AC-BD6D-A79F41996BB5}"/>
     <pc:docChg chg="undo custSel modSld">
-      <pc:chgData name="Osama Mohammed Moustafa Hosam Elde" userId="ab8f451e-a635-42ee-be12-e2dde55852bf" providerId="ADAL" clId="{B6D8E2E3-C58C-42AC-BD6D-A79F41996BB5}" dt="2020-02-17T21:02:35.091" v="2841" actId="20577"/>
+      <pc:chgData name="Osama Mohammed Moustafa Hosam Elde" userId="ab8f451e-a635-42ee-be12-e2dde55852bf" providerId="ADAL" clId="{B6D8E2E3-C58C-42AC-BD6D-A79F41996BB5}" dt="2020-02-18T20:11:27.263" v="3721" actId="571"/>
       <pc:docMkLst>
         <pc:docMk/>
       </pc:docMkLst>
@@ -902,7 +902,7 @@
         </pc:picChg>
       </pc:sldChg>
       <pc:sldChg chg="addSp delSp modSp">
-        <pc:chgData name="Osama Mohammed Moustafa Hosam Elde" userId="ab8f451e-a635-42ee-be12-e2dde55852bf" providerId="ADAL" clId="{B6D8E2E3-C58C-42AC-BD6D-A79F41996BB5}" dt="2020-02-17T14:08:30.922" v="732" actId="207"/>
+        <pc:chgData name="Osama Mohammed Moustafa Hosam Elde" userId="ab8f451e-a635-42ee-be12-e2dde55852bf" providerId="ADAL" clId="{B6D8E2E3-C58C-42AC-BD6D-A79F41996BB5}" dt="2020-02-18T18:24:53.196" v="2875" actId="1036"/>
         <pc:sldMkLst>
           <pc:docMk/>
           <pc:sldMk cId="0" sldId="271"/>
@@ -939,12 +939,92 @@
             <ac:spMk id="28" creationId="{62955130-B96C-492F-93ED-EB69F4A49983}"/>
           </ac:spMkLst>
         </pc:spChg>
+        <pc:spChg chg="add mod">
+          <ac:chgData name="Osama Mohammed Moustafa Hosam Elde" userId="ab8f451e-a635-42ee-be12-e2dde55852bf" providerId="ADAL" clId="{B6D8E2E3-C58C-42AC-BD6D-A79F41996BB5}" dt="2020-02-18T18:24:53.196" v="2875" actId="1036"/>
+          <ac:spMkLst>
+            <pc:docMk/>
+            <pc:sldMk cId="0" sldId="271"/>
+            <ac:spMk id="29" creationId="{EFB6C51E-B9E0-4CF1-9F4F-068984839219}"/>
+          </ac:spMkLst>
+        </pc:spChg>
+        <pc:spChg chg="add mod">
+          <ac:chgData name="Osama Mohammed Moustafa Hosam Elde" userId="ab8f451e-a635-42ee-be12-e2dde55852bf" providerId="ADAL" clId="{B6D8E2E3-C58C-42AC-BD6D-A79F41996BB5}" dt="2020-02-18T18:24:53.196" v="2875" actId="1036"/>
+          <ac:spMkLst>
+            <pc:docMk/>
+            <pc:sldMk cId="0" sldId="271"/>
+            <ac:spMk id="30" creationId="{02C99310-701F-4F1B-88FA-5589E2280C73}"/>
+          </ac:spMkLst>
+        </pc:spChg>
+        <pc:spChg chg="add mod">
+          <ac:chgData name="Osama Mohammed Moustafa Hosam Elde" userId="ab8f451e-a635-42ee-be12-e2dde55852bf" providerId="ADAL" clId="{B6D8E2E3-C58C-42AC-BD6D-A79F41996BB5}" dt="2020-02-18T18:24:53.196" v="2875" actId="1036"/>
+          <ac:spMkLst>
+            <pc:docMk/>
+            <pc:sldMk cId="0" sldId="271"/>
+            <ac:spMk id="31" creationId="{6CF5BE7C-B445-4376-A73D-98EA66E74410}"/>
+          </ac:spMkLst>
+        </pc:spChg>
+        <pc:spChg chg="add mod">
+          <ac:chgData name="Osama Mohammed Moustafa Hosam Elde" userId="ab8f451e-a635-42ee-be12-e2dde55852bf" providerId="ADAL" clId="{B6D8E2E3-C58C-42AC-BD6D-A79F41996BB5}" dt="2020-02-18T18:24:53.196" v="2875" actId="1036"/>
+          <ac:spMkLst>
+            <pc:docMk/>
+            <pc:sldMk cId="0" sldId="271"/>
+            <ac:spMk id="32" creationId="{8947F74F-0D1C-41A4-B240-4959F7D417E6}"/>
+          </ac:spMkLst>
+        </pc:spChg>
+        <pc:spChg chg="add mod">
+          <ac:chgData name="Osama Mohammed Moustafa Hosam Elde" userId="ab8f451e-a635-42ee-be12-e2dde55852bf" providerId="ADAL" clId="{B6D8E2E3-C58C-42AC-BD6D-A79F41996BB5}" dt="2020-02-18T18:24:53.196" v="2875" actId="1036"/>
+          <ac:spMkLst>
+            <pc:docMk/>
+            <pc:sldMk cId="0" sldId="271"/>
+            <ac:spMk id="33" creationId="{1996F8F0-18F7-41EA-9556-C36C34886DD8}"/>
+          </ac:spMkLst>
+        </pc:spChg>
         <pc:spChg chg="mod">
           <ac:chgData name="Osama Mohammed Moustafa Hosam Elde" userId="ab8f451e-a635-42ee-be12-e2dde55852bf" providerId="ADAL" clId="{B6D8E2E3-C58C-42AC-BD6D-A79F41996BB5}" dt="2020-02-17T14:07:48.083" v="725" actId="1076"/>
           <ac:spMkLst>
             <pc:docMk/>
             <pc:sldMk cId="0" sldId="271"/>
             <ac:spMk id="213" creationId="{00000000-0000-0000-0000-000000000000}"/>
+          </ac:spMkLst>
+        </pc:spChg>
+        <pc:spChg chg="del">
+          <ac:chgData name="Osama Mohammed Moustafa Hosam Elde" userId="ab8f451e-a635-42ee-be12-e2dde55852bf" providerId="ADAL" clId="{B6D8E2E3-C58C-42AC-BD6D-A79F41996BB5}" dt="2020-02-18T18:24:46.102" v="2842" actId="478"/>
+          <ac:spMkLst>
+            <pc:docMk/>
+            <pc:sldMk cId="0" sldId="271"/>
+            <ac:spMk id="216" creationId="{00000000-0000-0000-0000-000000000000}"/>
+          </ac:spMkLst>
+        </pc:spChg>
+        <pc:spChg chg="del">
+          <ac:chgData name="Osama Mohammed Moustafa Hosam Elde" userId="ab8f451e-a635-42ee-be12-e2dde55852bf" providerId="ADAL" clId="{B6D8E2E3-C58C-42AC-BD6D-A79F41996BB5}" dt="2020-02-18T18:24:46.102" v="2842" actId="478"/>
+          <ac:spMkLst>
+            <pc:docMk/>
+            <pc:sldMk cId="0" sldId="271"/>
+            <ac:spMk id="217" creationId="{00000000-0000-0000-0000-000000000000}"/>
+          </ac:spMkLst>
+        </pc:spChg>
+        <pc:spChg chg="del">
+          <ac:chgData name="Osama Mohammed Moustafa Hosam Elde" userId="ab8f451e-a635-42ee-be12-e2dde55852bf" providerId="ADAL" clId="{B6D8E2E3-C58C-42AC-BD6D-A79F41996BB5}" dt="2020-02-18T18:24:46.102" v="2842" actId="478"/>
+          <ac:spMkLst>
+            <pc:docMk/>
+            <pc:sldMk cId="0" sldId="271"/>
+            <ac:spMk id="218" creationId="{00000000-0000-0000-0000-000000000000}"/>
+          </ac:spMkLst>
+        </pc:spChg>
+        <pc:spChg chg="del">
+          <ac:chgData name="Osama Mohammed Moustafa Hosam Elde" userId="ab8f451e-a635-42ee-be12-e2dde55852bf" providerId="ADAL" clId="{B6D8E2E3-C58C-42AC-BD6D-A79F41996BB5}" dt="2020-02-18T18:24:46.102" v="2842" actId="478"/>
+          <ac:spMkLst>
+            <pc:docMk/>
+            <pc:sldMk cId="0" sldId="271"/>
+            <ac:spMk id="219" creationId="{00000000-0000-0000-0000-000000000000}"/>
+          </ac:spMkLst>
+        </pc:spChg>
+        <pc:spChg chg="del">
+          <ac:chgData name="Osama Mohammed Moustafa Hosam Elde" userId="ab8f451e-a635-42ee-be12-e2dde55852bf" providerId="ADAL" clId="{B6D8E2E3-C58C-42AC-BD6D-A79F41996BB5}" dt="2020-02-18T18:24:46.102" v="2842" actId="478"/>
+          <ac:spMkLst>
+            <pc:docMk/>
+            <pc:sldMk cId="0" sldId="271"/>
+            <ac:spMk id="220" creationId="{00000000-0000-0000-0000-000000000000}"/>
           </ac:spMkLst>
         </pc:spChg>
       </pc:sldChg>
@@ -993,6 +1073,161 @@
             <ac:picMk id="2" creationId="{51C1E37F-46F3-46CC-AC27-6BF74F42D0E5}"/>
           </ac:picMkLst>
         </pc:picChg>
+      </pc:sldChg>
+      <pc:sldChg chg="modSp">
+        <pc:chgData name="Osama Mohammed Moustafa Hosam Elde" userId="ab8f451e-a635-42ee-be12-e2dde55852bf" providerId="ADAL" clId="{B6D8E2E3-C58C-42AC-BD6D-A79F41996BB5}" dt="2020-02-18T19:52:50.688" v="3315" actId="20577"/>
+        <pc:sldMkLst>
+          <pc:docMk/>
+          <pc:sldMk cId="0" sldId="281"/>
+        </pc:sldMkLst>
+        <pc:spChg chg="mod">
+          <ac:chgData name="Osama Mohammed Moustafa Hosam Elde" userId="ab8f451e-a635-42ee-be12-e2dde55852bf" providerId="ADAL" clId="{B6D8E2E3-C58C-42AC-BD6D-A79F41996BB5}" dt="2020-02-18T18:27:23.306" v="2885" actId="20577"/>
+          <ac:spMkLst>
+            <pc:docMk/>
+            <pc:sldMk cId="0" sldId="281"/>
+            <ac:spMk id="291" creationId="{00000000-0000-0000-0000-000000000000}"/>
+          </ac:spMkLst>
+        </pc:spChg>
+        <pc:spChg chg="mod">
+          <ac:chgData name="Osama Mohammed Moustafa Hosam Elde" userId="ab8f451e-a635-42ee-be12-e2dde55852bf" providerId="ADAL" clId="{B6D8E2E3-C58C-42AC-BD6D-A79F41996BB5}" dt="2020-02-18T19:48:35.536" v="3049" actId="313"/>
+          <ac:spMkLst>
+            <pc:docMk/>
+            <pc:sldMk cId="0" sldId="281"/>
+            <ac:spMk id="292" creationId="{00000000-0000-0000-0000-000000000000}"/>
+          </ac:spMkLst>
+        </pc:spChg>
+        <pc:spChg chg="mod">
+          <ac:chgData name="Osama Mohammed Moustafa Hosam Elde" userId="ab8f451e-a635-42ee-be12-e2dde55852bf" providerId="ADAL" clId="{B6D8E2E3-C58C-42AC-BD6D-A79F41996BB5}" dt="2020-02-18T19:50:26.672" v="3125" actId="20577"/>
+          <ac:spMkLst>
+            <pc:docMk/>
+            <pc:sldMk cId="0" sldId="281"/>
+            <ac:spMk id="293" creationId="{00000000-0000-0000-0000-000000000000}"/>
+          </ac:spMkLst>
+        </pc:spChg>
+        <pc:spChg chg="mod">
+          <ac:chgData name="Osama Mohammed Moustafa Hosam Elde" userId="ab8f451e-a635-42ee-be12-e2dde55852bf" providerId="ADAL" clId="{B6D8E2E3-C58C-42AC-BD6D-A79F41996BB5}" dt="2020-02-18T19:52:50.688" v="3315" actId="20577"/>
+          <ac:spMkLst>
+            <pc:docMk/>
+            <pc:sldMk cId="0" sldId="281"/>
+            <ac:spMk id="294" creationId="{00000000-0000-0000-0000-000000000000}"/>
+          </ac:spMkLst>
+        </pc:spChg>
+      </pc:sldChg>
+      <pc:sldChg chg="addSp modSp">
+        <pc:chgData name="Osama Mohammed Moustafa Hosam Elde" userId="ab8f451e-a635-42ee-be12-e2dde55852bf" providerId="ADAL" clId="{B6D8E2E3-C58C-42AC-BD6D-A79F41996BB5}" dt="2020-02-18T20:06:16.957" v="3713" actId="1076"/>
+        <pc:sldMkLst>
+          <pc:docMk/>
+          <pc:sldMk cId="0" sldId="282"/>
+        </pc:sldMkLst>
+        <pc:spChg chg="mod">
+          <ac:chgData name="Osama Mohammed Moustafa Hosam Elde" userId="ab8f451e-a635-42ee-be12-e2dde55852bf" providerId="ADAL" clId="{B6D8E2E3-C58C-42AC-BD6D-A79F41996BB5}" dt="2020-02-18T19:53:14.737" v="3318" actId="20577"/>
+          <ac:spMkLst>
+            <pc:docMk/>
+            <pc:sldMk cId="0" sldId="282"/>
+            <ac:spMk id="299" creationId="{00000000-0000-0000-0000-000000000000}"/>
+          </ac:spMkLst>
+        </pc:spChg>
+        <pc:picChg chg="add mod">
+          <ac:chgData name="Osama Mohammed Moustafa Hosam Elde" userId="ab8f451e-a635-42ee-be12-e2dde55852bf" providerId="ADAL" clId="{B6D8E2E3-C58C-42AC-BD6D-A79F41996BB5}" dt="2020-02-18T20:06:16.957" v="3713" actId="1076"/>
+          <ac:picMkLst>
+            <pc:docMk/>
+            <pc:sldMk cId="0" sldId="282"/>
+            <ac:picMk id="1026" creationId="{C67D799D-CE8B-48BB-8F13-CD66003AF9C7}"/>
+          </ac:picMkLst>
+        </pc:picChg>
+      </pc:sldChg>
+      <pc:sldChg chg="modSp">
+        <pc:chgData name="Osama Mohammed Moustafa Hosam Elde" userId="ab8f451e-a635-42ee-be12-e2dde55852bf" providerId="ADAL" clId="{B6D8E2E3-C58C-42AC-BD6D-A79F41996BB5}" dt="2020-02-18T19:59:45.704" v="3710" actId="20577"/>
+        <pc:sldMkLst>
+          <pc:docMk/>
+          <pc:sldMk cId="0" sldId="283"/>
+        </pc:sldMkLst>
+        <pc:spChg chg="mod">
+          <ac:chgData name="Osama Mohammed Moustafa Hosam Elde" userId="ab8f451e-a635-42ee-be12-e2dde55852bf" providerId="ADAL" clId="{B6D8E2E3-C58C-42AC-BD6D-A79F41996BB5}" dt="2020-02-18T19:53:28.999" v="3319" actId="20577"/>
+          <ac:spMkLst>
+            <pc:docMk/>
+            <pc:sldMk cId="0" sldId="283"/>
+            <ac:spMk id="305" creationId="{00000000-0000-0000-0000-000000000000}"/>
+          </ac:spMkLst>
+        </pc:spChg>
+        <pc:spChg chg="mod">
+          <ac:chgData name="Osama Mohammed Moustafa Hosam Elde" userId="ab8f451e-a635-42ee-be12-e2dde55852bf" providerId="ADAL" clId="{B6D8E2E3-C58C-42AC-BD6D-A79F41996BB5}" dt="2020-02-18T19:56:49.048" v="3417" actId="20577"/>
+          <ac:spMkLst>
+            <pc:docMk/>
+            <pc:sldMk cId="0" sldId="283"/>
+            <ac:spMk id="306" creationId="{00000000-0000-0000-0000-000000000000}"/>
+          </ac:spMkLst>
+        </pc:spChg>
+        <pc:spChg chg="mod">
+          <ac:chgData name="Osama Mohammed Moustafa Hosam Elde" userId="ab8f451e-a635-42ee-be12-e2dde55852bf" providerId="ADAL" clId="{B6D8E2E3-C58C-42AC-BD6D-A79F41996BB5}" dt="2020-02-18T19:58:32.621" v="3577" actId="313"/>
+          <ac:spMkLst>
+            <pc:docMk/>
+            <pc:sldMk cId="0" sldId="283"/>
+            <ac:spMk id="307" creationId="{00000000-0000-0000-0000-000000000000}"/>
+          </ac:spMkLst>
+        </pc:spChg>
+        <pc:spChg chg="mod">
+          <ac:chgData name="Osama Mohammed Moustafa Hosam Elde" userId="ab8f451e-a635-42ee-be12-e2dde55852bf" providerId="ADAL" clId="{B6D8E2E3-C58C-42AC-BD6D-A79F41996BB5}" dt="2020-02-18T19:59:45.704" v="3710" actId="20577"/>
+          <ac:spMkLst>
+            <pc:docMk/>
+            <pc:sldMk cId="0" sldId="283"/>
+            <ac:spMk id="308" creationId="{00000000-0000-0000-0000-000000000000}"/>
+          </ac:spMkLst>
+        </pc:spChg>
+      </pc:sldChg>
+      <pc:sldChg chg="addSp delSp modSp">
+        <pc:chgData name="Osama Mohammed Moustafa Hosam Elde" userId="ab8f451e-a635-42ee-be12-e2dde55852bf" providerId="ADAL" clId="{B6D8E2E3-C58C-42AC-BD6D-A79F41996BB5}" dt="2020-02-18T20:10:13.902" v="3719" actId="1076"/>
+        <pc:sldMkLst>
+          <pc:docMk/>
+          <pc:sldMk cId="0" sldId="284"/>
+        </pc:sldMkLst>
+        <pc:spChg chg="mod">
+          <ac:chgData name="Osama Mohammed Moustafa Hosam Elde" userId="ab8f451e-a635-42ee-be12-e2dde55852bf" providerId="ADAL" clId="{B6D8E2E3-C58C-42AC-BD6D-A79F41996BB5}" dt="2020-02-18T19:53:40.943" v="3320"/>
+          <ac:spMkLst>
+            <pc:docMk/>
+            <pc:sldMk cId="0" sldId="284"/>
+            <ac:spMk id="313" creationId="{00000000-0000-0000-0000-000000000000}"/>
+          </ac:spMkLst>
+        </pc:spChg>
+        <pc:picChg chg="add mod">
+          <ac:chgData name="Osama Mohammed Moustafa Hosam Elde" userId="ab8f451e-a635-42ee-be12-e2dde55852bf" providerId="ADAL" clId="{B6D8E2E3-C58C-42AC-BD6D-A79F41996BB5}" dt="2020-02-18T20:10:13.902" v="3719" actId="1076"/>
+          <ac:picMkLst>
+            <pc:docMk/>
+            <pc:sldMk cId="0" sldId="284"/>
+            <ac:picMk id="2" creationId="{F0DC8E92-F19C-4A1E-B7CF-1B16FB025779}"/>
+          </ac:picMkLst>
+        </pc:picChg>
+        <pc:picChg chg="add del mod">
+          <ac:chgData name="Osama Mohammed Moustafa Hosam Elde" userId="ab8f451e-a635-42ee-be12-e2dde55852bf" providerId="ADAL" clId="{B6D8E2E3-C58C-42AC-BD6D-A79F41996BB5}" dt="2020-02-18T20:10:10.799" v="3717" actId="478"/>
+          <ac:picMkLst>
+            <pc:docMk/>
+            <pc:sldMk cId="0" sldId="284"/>
+            <ac:picMk id="2050" creationId="{01CBAE4B-2004-4EA0-9EF5-0D226F1B7CA8}"/>
+          </ac:picMkLst>
+        </pc:picChg>
+      </pc:sldChg>
+      <pc:sldChg chg="addSp modSp">
+        <pc:chgData name="Osama Mohammed Moustafa Hosam Elde" userId="ab8f451e-a635-42ee-be12-e2dde55852bf" providerId="ADAL" clId="{B6D8E2E3-C58C-42AC-BD6D-A79F41996BB5}" dt="2020-02-18T20:11:27.263" v="3721" actId="571"/>
+        <pc:sldMkLst>
+          <pc:docMk/>
+          <pc:sldMk cId="0" sldId="286"/>
+        </pc:sldMkLst>
+        <pc:spChg chg="add mod">
+          <ac:chgData name="Osama Mohammed Moustafa Hosam Elde" userId="ab8f451e-a635-42ee-be12-e2dde55852bf" providerId="ADAL" clId="{B6D8E2E3-C58C-42AC-BD6D-A79F41996BB5}" dt="2020-02-18T20:11:21.719" v="3720" actId="571"/>
+          <ac:spMkLst>
+            <pc:docMk/>
+            <pc:sldMk cId="0" sldId="286"/>
+            <ac:spMk id="24" creationId="{83693FCD-34F1-454A-BB5B-36606FBA5622}"/>
+          </ac:spMkLst>
+        </pc:spChg>
+        <pc:spChg chg="add mod">
+          <ac:chgData name="Osama Mohammed Moustafa Hosam Elde" userId="ab8f451e-a635-42ee-be12-e2dde55852bf" providerId="ADAL" clId="{B6D8E2E3-C58C-42AC-BD6D-A79F41996BB5}" dt="2020-02-18T20:11:27.263" v="3721" actId="571"/>
+          <ac:spMkLst>
+            <pc:docMk/>
+            <pc:sldMk cId="0" sldId="286"/>
+            <ac:spMk id="25" creationId="{79B783B6-442B-40B4-8F14-31C7A809C5D1}"/>
+          </ac:spMkLst>
+        </pc:spChg>
       </pc:sldChg>
     </pc:docChg>
   </pc:docChgLst>
@@ -3353,8 +3588,8 @@
         </p:nvSpPr>
         <p:spPr>
           <a:xfrm>
-            <a:off x="381188" y="685800"/>
-            <a:ext cx="6096300" cy="3429000"/>
+            <a:off x="381000" y="685800"/>
+            <a:ext cx="6096000" cy="3429000"/>
           </a:xfrm>
           <a:custGeom>
             <a:avLst/>
@@ -3457,8 +3692,8 @@
         </p:nvSpPr>
         <p:spPr>
           <a:xfrm>
-            <a:off x="381188" y="685800"/>
-            <a:ext cx="6096300" cy="3429000"/>
+            <a:off x="381000" y="685800"/>
+            <a:ext cx="6096000" cy="3429000"/>
           </a:xfrm>
           <a:custGeom>
             <a:avLst/>
@@ -3561,8 +3796,8 @@
         </p:nvSpPr>
         <p:spPr>
           <a:xfrm>
-            <a:off x="381188" y="685800"/>
-            <a:ext cx="6096300" cy="3429000"/>
+            <a:off x="381000" y="685800"/>
+            <a:ext cx="6096000" cy="3429000"/>
           </a:xfrm>
           <a:custGeom>
             <a:avLst/>
@@ -3665,8 +3900,8 @@
         </p:nvSpPr>
         <p:spPr>
           <a:xfrm>
-            <a:off x="381188" y="685800"/>
-            <a:ext cx="6096300" cy="3429000"/>
+            <a:off x="381000" y="685800"/>
+            <a:ext cx="6096000" cy="3429000"/>
           </a:xfrm>
           <a:custGeom>
             <a:avLst/>
@@ -3977,8 +4212,8 @@
         </p:nvSpPr>
         <p:spPr>
           <a:xfrm>
-            <a:off x="381188" y="685800"/>
-            <a:ext cx="6096300" cy="3429000"/>
+            <a:off x="381000" y="685800"/>
+            <a:ext cx="6096000" cy="3429000"/>
           </a:xfrm>
           <a:custGeom>
             <a:avLst/>
@@ -13861,296 +14096,6 @@
       </p:sp>
       <p:sp>
         <p:nvSpPr>
-          <p:cNvPr id="216" name="Google Shape;216;p28"/>
-          <p:cNvSpPr txBox="1"/>
-          <p:nvPr/>
-        </p:nvSpPr>
-        <p:spPr>
-          <a:xfrm>
-            <a:off x="6599350" y="1918575"/>
-            <a:ext cx="2483400" cy="415500"/>
-          </a:xfrm>
-          <a:prstGeom prst="rect">
-            <a:avLst/>
-          </a:prstGeom>
-          <a:noFill/>
-          <a:ln>
-            <a:noFill/>
-          </a:ln>
-        </p:spPr>
-        <p:txBody>
-          <a:bodyPr spcFirstLastPara="1" wrap="square" lIns="91425" tIns="91425" rIns="91425" bIns="91425" anchor="t" anchorCtr="0">
-            <a:noAutofit/>
-          </a:bodyPr>
-          <a:lstStyle/>
-          <a:p>
-            <a:pPr marL="0" lvl="0" indent="0" algn="l" rtl="0">
-              <a:spcBef>
-                <a:spcPts val="0"/>
-              </a:spcBef>
-              <a:spcAft>
-                <a:spcPts val="0"/>
-              </a:spcAft>
-              <a:buNone/>
-            </a:pPr>
-            <a:r>
-              <a:rPr lang="en" sz="1100">
-                <a:solidFill>
-                  <a:schemeClr val="dk1"/>
-                </a:solidFill>
-                <a:latin typeface="Open Sans"/>
-                <a:ea typeface="Open Sans"/>
-                <a:cs typeface="Open Sans"/>
-                <a:sym typeface="Open Sans"/>
-              </a:rPr>
-              <a:t>UC1: &lt;Enter Name 1 Here&gt;</a:t>
-            </a:r>
-            <a:endParaRPr sz="1100">
-              <a:solidFill>
-                <a:schemeClr val="dk1"/>
-              </a:solidFill>
-              <a:latin typeface="Open Sans"/>
-              <a:ea typeface="Open Sans"/>
-              <a:cs typeface="Open Sans"/>
-              <a:sym typeface="Open Sans"/>
-            </a:endParaRPr>
-          </a:p>
-        </p:txBody>
-      </p:sp>
-      <p:sp>
-        <p:nvSpPr>
-          <p:cNvPr id="217" name="Google Shape;217;p28"/>
-          <p:cNvSpPr txBox="1"/>
-          <p:nvPr/>
-        </p:nvSpPr>
-        <p:spPr>
-          <a:xfrm>
-            <a:off x="6599350" y="2297240"/>
-            <a:ext cx="2483400" cy="415500"/>
-          </a:xfrm>
-          <a:prstGeom prst="rect">
-            <a:avLst/>
-          </a:prstGeom>
-          <a:noFill/>
-          <a:ln>
-            <a:noFill/>
-          </a:ln>
-        </p:spPr>
-        <p:txBody>
-          <a:bodyPr spcFirstLastPara="1" wrap="square" lIns="91425" tIns="91425" rIns="91425" bIns="91425" anchor="t" anchorCtr="0">
-            <a:noAutofit/>
-          </a:bodyPr>
-          <a:lstStyle/>
-          <a:p>
-            <a:pPr marL="0" lvl="0" indent="0" algn="l" rtl="0">
-              <a:spcBef>
-                <a:spcPts val="0"/>
-              </a:spcBef>
-              <a:spcAft>
-                <a:spcPts val="0"/>
-              </a:spcAft>
-              <a:buNone/>
-            </a:pPr>
-            <a:r>
-              <a:rPr lang="en" sz="1100">
-                <a:solidFill>
-                  <a:schemeClr val="dk1"/>
-                </a:solidFill>
-                <a:latin typeface="Open Sans"/>
-                <a:ea typeface="Open Sans"/>
-                <a:cs typeface="Open Sans"/>
-                <a:sym typeface="Open Sans"/>
-              </a:rPr>
-              <a:t>UC2: &lt;Enter Name 2 Here&gt;</a:t>
-            </a:r>
-            <a:endParaRPr sz="1100">
-              <a:solidFill>
-                <a:schemeClr val="dk1"/>
-              </a:solidFill>
-              <a:latin typeface="Open Sans"/>
-              <a:ea typeface="Open Sans"/>
-              <a:cs typeface="Open Sans"/>
-              <a:sym typeface="Open Sans"/>
-            </a:endParaRPr>
-          </a:p>
-        </p:txBody>
-      </p:sp>
-      <p:sp>
-        <p:nvSpPr>
-          <p:cNvPr id="218" name="Google Shape;218;p28"/>
-          <p:cNvSpPr txBox="1"/>
-          <p:nvPr/>
-        </p:nvSpPr>
-        <p:spPr>
-          <a:xfrm>
-            <a:off x="6599350" y="2675906"/>
-            <a:ext cx="2483400" cy="415500"/>
-          </a:xfrm>
-          <a:prstGeom prst="rect">
-            <a:avLst/>
-          </a:prstGeom>
-          <a:noFill/>
-          <a:ln>
-            <a:noFill/>
-          </a:ln>
-        </p:spPr>
-        <p:txBody>
-          <a:bodyPr spcFirstLastPara="1" wrap="square" lIns="91425" tIns="91425" rIns="91425" bIns="91425" anchor="t" anchorCtr="0">
-            <a:noAutofit/>
-          </a:bodyPr>
-          <a:lstStyle/>
-          <a:p>
-            <a:pPr marL="0" lvl="0" indent="0" algn="l" rtl="0">
-              <a:spcBef>
-                <a:spcPts val="0"/>
-              </a:spcBef>
-              <a:spcAft>
-                <a:spcPts val="0"/>
-              </a:spcAft>
-              <a:buNone/>
-            </a:pPr>
-            <a:r>
-              <a:rPr lang="en" sz="1100">
-                <a:solidFill>
-                  <a:schemeClr val="dk1"/>
-                </a:solidFill>
-                <a:latin typeface="Open Sans"/>
-                <a:ea typeface="Open Sans"/>
-                <a:cs typeface="Open Sans"/>
-                <a:sym typeface="Open Sans"/>
-              </a:rPr>
-              <a:t>UC3: &lt;Enter Name 3 Here&gt;</a:t>
-            </a:r>
-            <a:endParaRPr sz="1100">
-              <a:solidFill>
-                <a:schemeClr val="dk1"/>
-              </a:solidFill>
-              <a:latin typeface="Open Sans"/>
-              <a:ea typeface="Open Sans"/>
-              <a:cs typeface="Open Sans"/>
-              <a:sym typeface="Open Sans"/>
-            </a:endParaRPr>
-          </a:p>
-        </p:txBody>
-      </p:sp>
-      <p:sp>
-        <p:nvSpPr>
-          <p:cNvPr id="219" name="Google Shape;219;p28"/>
-          <p:cNvSpPr txBox="1"/>
-          <p:nvPr/>
-        </p:nvSpPr>
-        <p:spPr>
-          <a:xfrm>
-            <a:off x="6599350" y="3054571"/>
-            <a:ext cx="2483400" cy="415500"/>
-          </a:xfrm>
-          <a:prstGeom prst="rect">
-            <a:avLst/>
-          </a:prstGeom>
-          <a:noFill/>
-          <a:ln>
-            <a:noFill/>
-          </a:ln>
-        </p:spPr>
-        <p:txBody>
-          <a:bodyPr spcFirstLastPara="1" wrap="square" lIns="91425" tIns="91425" rIns="91425" bIns="91425" anchor="t" anchorCtr="0">
-            <a:noAutofit/>
-          </a:bodyPr>
-          <a:lstStyle/>
-          <a:p>
-            <a:pPr marL="0" lvl="0" indent="0" algn="l" rtl="0">
-              <a:spcBef>
-                <a:spcPts val="0"/>
-              </a:spcBef>
-              <a:spcAft>
-                <a:spcPts val="0"/>
-              </a:spcAft>
-              <a:buNone/>
-            </a:pPr>
-            <a:r>
-              <a:rPr lang="en" sz="1100">
-                <a:solidFill>
-                  <a:schemeClr val="dk1"/>
-                </a:solidFill>
-                <a:latin typeface="Open Sans"/>
-                <a:ea typeface="Open Sans"/>
-                <a:cs typeface="Open Sans"/>
-                <a:sym typeface="Open Sans"/>
-              </a:rPr>
-              <a:t>UC4: &lt;Enter Name 4 Here&gt;</a:t>
-            </a:r>
-            <a:endParaRPr sz="1100">
-              <a:solidFill>
-                <a:schemeClr val="dk1"/>
-              </a:solidFill>
-              <a:latin typeface="Open Sans"/>
-              <a:ea typeface="Open Sans"/>
-              <a:cs typeface="Open Sans"/>
-              <a:sym typeface="Open Sans"/>
-            </a:endParaRPr>
-          </a:p>
-        </p:txBody>
-      </p:sp>
-      <p:sp>
-        <p:nvSpPr>
-          <p:cNvPr id="220" name="Google Shape;220;p28"/>
-          <p:cNvSpPr txBox="1"/>
-          <p:nvPr/>
-        </p:nvSpPr>
-        <p:spPr>
-          <a:xfrm>
-            <a:off x="6599350" y="3433236"/>
-            <a:ext cx="2483400" cy="415500"/>
-          </a:xfrm>
-          <a:prstGeom prst="rect">
-            <a:avLst/>
-          </a:prstGeom>
-          <a:noFill/>
-          <a:ln>
-            <a:noFill/>
-          </a:ln>
-        </p:spPr>
-        <p:txBody>
-          <a:bodyPr spcFirstLastPara="1" wrap="square" lIns="91425" tIns="91425" rIns="91425" bIns="91425" anchor="t" anchorCtr="0">
-            <a:noAutofit/>
-          </a:bodyPr>
-          <a:lstStyle/>
-          <a:p>
-            <a:pPr marL="0" lvl="0" indent="0" algn="l" rtl="0">
-              <a:spcBef>
-                <a:spcPts val="0"/>
-              </a:spcBef>
-              <a:spcAft>
-                <a:spcPts val="0"/>
-              </a:spcAft>
-              <a:buNone/>
-            </a:pPr>
-            <a:r>
-              <a:rPr lang="en" sz="1100">
-                <a:solidFill>
-                  <a:schemeClr val="dk1"/>
-                </a:solidFill>
-                <a:latin typeface="Open Sans"/>
-                <a:ea typeface="Open Sans"/>
-                <a:cs typeface="Open Sans"/>
-                <a:sym typeface="Open Sans"/>
-              </a:rPr>
-              <a:t>UC5: &lt;Enter Name 5 Here&gt;</a:t>
-            </a:r>
-            <a:endParaRPr sz="1100">
-              <a:solidFill>
-                <a:schemeClr val="dk1"/>
-              </a:solidFill>
-              <a:latin typeface="Open Sans"/>
-              <a:ea typeface="Open Sans"/>
-              <a:cs typeface="Open Sans"/>
-              <a:sym typeface="Open Sans"/>
-            </a:endParaRPr>
-          </a:p>
-        </p:txBody>
-      </p:sp>
-      <p:sp>
-        <p:nvSpPr>
           <p:cNvPr id="221" name="Google Shape;221;p28"/>
           <p:cNvSpPr txBox="1"/>
           <p:nvPr/>
@@ -14872,6 +14817,374 @@
           </a:p>
         </p:txBody>
       </p:sp>
+      <p:sp>
+        <p:nvSpPr>
+          <p:cNvPr id="29" name="Google Shape;93;p16">
+            <a:extLst>
+              <a:ext uri="{FF2B5EF4-FFF2-40B4-BE49-F238E27FC236}">
+                <a16:creationId xmlns:a16="http://schemas.microsoft.com/office/drawing/2014/main" id="{EFB6C51E-B9E0-4CF1-9F4F-068984839219}"/>
+              </a:ext>
+            </a:extLst>
+          </p:cNvPr>
+          <p:cNvSpPr txBox="1"/>
+          <p:nvPr/>
+        </p:nvSpPr>
+        <p:spPr>
+          <a:xfrm>
+            <a:off x="6592475" y="1936586"/>
+            <a:ext cx="2483400" cy="415500"/>
+          </a:xfrm>
+          <a:prstGeom prst="rect">
+            <a:avLst/>
+          </a:prstGeom>
+          <a:noFill/>
+          <a:ln>
+            <a:noFill/>
+          </a:ln>
+        </p:spPr>
+        <p:txBody>
+          <a:bodyPr spcFirstLastPara="1" wrap="square" lIns="91425" tIns="91425" rIns="91425" bIns="91425" anchor="t" anchorCtr="0">
+            <a:noAutofit/>
+          </a:bodyPr>
+          <a:lstStyle/>
+          <a:p>
+            <a:pPr marL="0" lvl="0" indent="0" algn="l" rtl="0">
+              <a:spcBef>
+                <a:spcPts val="0"/>
+              </a:spcBef>
+              <a:spcAft>
+                <a:spcPts val="0"/>
+              </a:spcAft>
+              <a:buNone/>
+            </a:pPr>
+            <a:r>
+              <a:rPr lang="en" sz="1100" dirty="0">
+                <a:solidFill>
+                  <a:schemeClr val="dk1"/>
+                </a:solidFill>
+                <a:latin typeface="Open Sans"/>
+                <a:ea typeface="Open Sans"/>
+                <a:cs typeface="Open Sans"/>
+                <a:sym typeface="Open Sans"/>
+              </a:rPr>
+              <a:t>UC1: </a:t>
+            </a:r>
+            <a:r>
+              <a:rPr lang="en-US" sz="1100" dirty="0">
+                <a:solidFill>
+                  <a:schemeClr val="dk1"/>
+                </a:solidFill>
+                <a:latin typeface="Open Sans"/>
+                <a:ea typeface="Open Sans"/>
+                <a:cs typeface="Open Sans"/>
+                <a:sym typeface="Open Sans"/>
+              </a:rPr>
+              <a:t>Quality Control with CV</a:t>
+            </a:r>
+            <a:endParaRPr sz="1100" dirty="0">
+              <a:solidFill>
+                <a:schemeClr val="dk1"/>
+              </a:solidFill>
+              <a:latin typeface="Open Sans"/>
+              <a:ea typeface="Open Sans"/>
+              <a:cs typeface="Open Sans"/>
+              <a:sym typeface="Open Sans"/>
+            </a:endParaRPr>
+          </a:p>
+        </p:txBody>
+      </p:sp>
+      <p:sp>
+        <p:nvSpPr>
+          <p:cNvPr id="30" name="Google Shape;94;p16">
+            <a:extLst>
+              <a:ext uri="{FF2B5EF4-FFF2-40B4-BE49-F238E27FC236}">
+                <a16:creationId xmlns:a16="http://schemas.microsoft.com/office/drawing/2014/main" id="{02C99310-701F-4F1B-88FA-5589E2280C73}"/>
+              </a:ext>
+            </a:extLst>
+          </p:cNvPr>
+          <p:cNvSpPr txBox="1"/>
+          <p:nvPr/>
+        </p:nvSpPr>
+        <p:spPr>
+          <a:xfrm>
+            <a:off x="6592475" y="2315251"/>
+            <a:ext cx="2483400" cy="415500"/>
+          </a:xfrm>
+          <a:prstGeom prst="rect">
+            <a:avLst/>
+          </a:prstGeom>
+          <a:noFill/>
+          <a:ln>
+            <a:noFill/>
+          </a:ln>
+        </p:spPr>
+        <p:txBody>
+          <a:bodyPr spcFirstLastPara="1" wrap="square" lIns="91425" tIns="91425" rIns="91425" bIns="91425" anchor="t" anchorCtr="0">
+            <a:noAutofit/>
+          </a:bodyPr>
+          <a:lstStyle/>
+          <a:p>
+            <a:pPr marL="0" lvl="0" indent="0" algn="l" rtl="0">
+              <a:spcBef>
+                <a:spcPts val="0"/>
+              </a:spcBef>
+              <a:spcAft>
+                <a:spcPts val="0"/>
+              </a:spcAft>
+              <a:buNone/>
+            </a:pPr>
+            <a:r>
+              <a:rPr lang="en" sz="1050" dirty="0">
+                <a:solidFill>
+                  <a:schemeClr val="dk1"/>
+                </a:solidFill>
+                <a:latin typeface="Open Sans"/>
+                <a:ea typeface="Open Sans"/>
+                <a:cs typeface="Open Sans"/>
+                <a:sym typeface="Open Sans"/>
+              </a:rPr>
+              <a:t>UC2: </a:t>
+            </a:r>
+            <a:r>
+              <a:rPr lang="en-US" sz="1050" dirty="0">
+                <a:solidFill>
+                  <a:schemeClr val="dk1"/>
+                </a:solidFill>
+                <a:latin typeface="Open Sans"/>
+                <a:ea typeface="Open Sans"/>
+                <a:cs typeface="Open Sans"/>
+                <a:sym typeface="Open Sans"/>
+              </a:rPr>
+              <a:t>Optimal tax strategy predictor</a:t>
+            </a:r>
+            <a:endParaRPr sz="1050" dirty="0">
+              <a:solidFill>
+                <a:schemeClr val="dk1"/>
+              </a:solidFill>
+              <a:latin typeface="Open Sans"/>
+              <a:ea typeface="Open Sans"/>
+              <a:cs typeface="Open Sans"/>
+              <a:sym typeface="Open Sans"/>
+            </a:endParaRPr>
+          </a:p>
+        </p:txBody>
+      </p:sp>
+      <p:sp>
+        <p:nvSpPr>
+          <p:cNvPr id="31" name="Google Shape;95;p16">
+            <a:extLst>
+              <a:ext uri="{FF2B5EF4-FFF2-40B4-BE49-F238E27FC236}">
+                <a16:creationId xmlns:a16="http://schemas.microsoft.com/office/drawing/2014/main" id="{6CF5BE7C-B445-4376-A73D-98EA66E74410}"/>
+              </a:ext>
+            </a:extLst>
+          </p:cNvPr>
+          <p:cNvSpPr txBox="1"/>
+          <p:nvPr/>
+        </p:nvSpPr>
+        <p:spPr>
+          <a:xfrm>
+            <a:off x="6592475" y="2693917"/>
+            <a:ext cx="2483400" cy="415500"/>
+          </a:xfrm>
+          <a:prstGeom prst="rect">
+            <a:avLst/>
+          </a:prstGeom>
+          <a:noFill/>
+          <a:ln>
+            <a:noFill/>
+          </a:ln>
+        </p:spPr>
+        <p:txBody>
+          <a:bodyPr spcFirstLastPara="1" wrap="square" lIns="91425" tIns="91425" rIns="91425" bIns="91425" anchor="t" anchorCtr="0">
+            <a:noAutofit/>
+          </a:bodyPr>
+          <a:lstStyle/>
+          <a:p>
+            <a:pPr marL="0" lvl="0" indent="0" algn="l" rtl="0">
+              <a:spcBef>
+                <a:spcPts val="0"/>
+              </a:spcBef>
+              <a:spcAft>
+                <a:spcPts val="0"/>
+              </a:spcAft>
+              <a:buNone/>
+            </a:pPr>
+            <a:r>
+              <a:rPr lang="en-US" sz="1100" dirty="0">
+                <a:solidFill>
+                  <a:schemeClr val="dk1"/>
+                </a:solidFill>
+                <a:latin typeface="Open Sans"/>
+                <a:ea typeface="Open Sans"/>
+                <a:cs typeface="Open Sans"/>
+                <a:sym typeface="Open Sans"/>
+              </a:rPr>
+              <a:t>UC3: Car detection of customer ID</a:t>
+            </a:r>
+            <a:endParaRPr sz="1100" dirty="0">
+              <a:solidFill>
+                <a:schemeClr val="dk1"/>
+              </a:solidFill>
+              <a:latin typeface="Open Sans"/>
+              <a:ea typeface="Open Sans"/>
+              <a:cs typeface="Open Sans"/>
+              <a:sym typeface="Open Sans"/>
+            </a:endParaRPr>
+          </a:p>
+        </p:txBody>
+      </p:sp>
+      <p:sp>
+        <p:nvSpPr>
+          <p:cNvPr id="32" name="Google Shape;96;p16">
+            <a:extLst>
+              <a:ext uri="{FF2B5EF4-FFF2-40B4-BE49-F238E27FC236}">
+                <a16:creationId xmlns:a16="http://schemas.microsoft.com/office/drawing/2014/main" id="{8947F74F-0D1C-41A4-B240-4959F7D417E6}"/>
+              </a:ext>
+            </a:extLst>
+          </p:cNvPr>
+          <p:cNvSpPr txBox="1"/>
+          <p:nvPr/>
+        </p:nvSpPr>
+        <p:spPr>
+          <a:xfrm>
+            <a:off x="6592475" y="3072582"/>
+            <a:ext cx="2483400" cy="415500"/>
+          </a:xfrm>
+          <a:prstGeom prst="rect">
+            <a:avLst/>
+          </a:prstGeom>
+          <a:noFill/>
+          <a:ln>
+            <a:noFill/>
+          </a:ln>
+        </p:spPr>
+        <p:txBody>
+          <a:bodyPr spcFirstLastPara="1" wrap="square" lIns="91425" tIns="91425" rIns="91425" bIns="91425" anchor="t" anchorCtr="0">
+            <a:noAutofit/>
+          </a:bodyPr>
+          <a:lstStyle/>
+          <a:p>
+            <a:pPr marL="0" lvl="0" indent="0" algn="l" rtl="0">
+              <a:spcBef>
+                <a:spcPts val="0"/>
+              </a:spcBef>
+              <a:spcAft>
+                <a:spcPts val="0"/>
+              </a:spcAft>
+              <a:buNone/>
+            </a:pPr>
+            <a:r>
+              <a:rPr lang="en" sz="1050" dirty="0">
+                <a:solidFill>
+                  <a:schemeClr val="dk1"/>
+                </a:solidFill>
+                <a:latin typeface="Open Sans"/>
+                <a:ea typeface="Open Sans"/>
+                <a:cs typeface="Open Sans"/>
+                <a:sym typeface="Open Sans"/>
+              </a:rPr>
+              <a:t>UC4: </a:t>
+            </a:r>
+            <a:r>
+              <a:rPr lang="en-US" sz="1050" dirty="0">
+                <a:solidFill>
+                  <a:schemeClr val="dk1"/>
+                </a:solidFill>
+                <a:latin typeface="Open Sans"/>
+                <a:ea typeface="Open Sans"/>
+                <a:cs typeface="Open Sans"/>
+                <a:sym typeface="Open Sans"/>
+              </a:rPr>
+              <a:t>Car maintenance Expectation</a:t>
+            </a:r>
+            <a:endParaRPr sz="1050" dirty="0">
+              <a:solidFill>
+                <a:schemeClr val="dk1"/>
+              </a:solidFill>
+              <a:latin typeface="Open Sans"/>
+              <a:ea typeface="Open Sans"/>
+              <a:cs typeface="Open Sans"/>
+              <a:sym typeface="Open Sans"/>
+            </a:endParaRPr>
+          </a:p>
+        </p:txBody>
+      </p:sp>
+      <p:sp>
+        <p:nvSpPr>
+          <p:cNvPr id="33" name="Google Shape;97;p16">
+            <a:extLst>
+              <a:ext uri="{FF2B5EF4-FFF2-40B4-BE49-F238E27FC236}">
+                <a16:creationId xmlns:a16="http://schemas.microsoft.com/office/drawing/2014/main" id="{1996F8F0-18F7-41EA-9556-C36C34886DD8}"/>
+              </a:ext>
+            </a:extLst>
+          </p:cNvPr>
+          <p:cNvSpPr txBox="1"/>
+          <p:nvPr/>
+        </p:nvSpPr>
+        <p:spPr>
+          <a:xfrm>
+            <a:off x="6592475" y="3451247"/>
+            <a:ext cx="2483400" cy="415500"/>
+          </a:xfrm>
+          <a:prstGeom prst="rect">
+            <a:avLst/>
+          </a:prstGeom>
+          <a:noFill/>
+          <a:ln>
+            <a:noFill/>
+          </a:ln>
+        </p:spPr>
+        <p:txBody>
+          <a:bodyPr spcFirstLastPara="1" wrap="square" lIns="91425" tIns="91425" rIns="91425" bIns="91425" anchor="t" anchorCtr="0">
+            <a:noAutofit/>
+          </a:bodyPr>
+          <a:lstStyle/>
+          <a:p>
+            <a:pPr marL="0" lvl="0" indent="0" algn="l" rtl="0">
+              <a:spcBef>
+                <a:spcPts val="0"/>
+              </a:spcBef>
+              <a:spcAft>
+                <a:spcPts val="0"/>
+              </a:spcAft>
+              <a:buNone/>
+            </a:pPr>
+            <a:r>
+              <a:rPr lang="en" sz="1100" dirty="0">
+                <a:solidFill>
+                  <a:schemeClr val="dk1"/>
+                </a:solidFill>
+                <a:latin typeface="Open Sans"/>
+                <a:ea typeface="Open Sans"/>
+                <a:cs typeface="Open Sans"/>
+                <a:sym typeface="Open Sans"/>
+              </a:rPr>
+              <a:t>UC5: </a:t>
+            </a:r>
+            <a:r>
+              <a:rPr lang="en-US" sz="1100" dirty="0">
+                <a:solidFill>
+                  <a:schemeClr val="dk1"/>
+                </a:solidFill>
+                <a:latin typeface="Open Sans"/>
+                <a:ea typeface="Open Sans"/>
+                <a:cs typeface="Open Sans"/>
+                <a:sym typeface="Open Sans"/>
+              </a:rPr>
+              <a:t>Supply Chain Costs Predictor</a:t>
+            </a:r>
+            <a:endParaRPr sz="1100" dirty="0">
+              <a:solidFill>
+                <a:schemeClr val="dk1"/>
+              </a:solidFill>
+              <a:latin typeface="Open Sans"/>
+              <a:ea typeface="Open Sans"/>
+              <a:cs typeface="Open Sans"/>
+              <a:sym typeface="Open Sans"/>
+            </a:endParaRPr>
+          </a:p>
+        </p:txBody>
+      </p:sp>
     </p:spTree>
   </p:cSld>
   <p:clrMapOvr>
@@ -16660,20 +16973,16 @@
           </a:bodyPr>
           <a:lstStyle/>
           <a:p>
-            <a:pPr marL="0" lvl="0" indent="0" algn="l" rtl="0">
-              <a:spcBef>
-                <a:spcPts val="0"/>
-              </a:spcBef>
-              <a:spcAft>
-                <a:spcPts val="0"/>
-              </a:spcAft>
-              <a:buNone/>
-            </a:pPr>
-            <a:r>
-              <a:rPr lang="en"/>
-              <a:t>Verbatim Quotes - &lt;Enter Use Case Name 1&gt;</a:t>
-            </a:r>
-            <a:endParaRPr/>
+            <a:pPr lvl="0"/>
+            <a:r>
+              <a:rPr lang="en" dirty="0"/>
+              <a:t>Verbatim Quotes - </a:t>
+            </a:r>
+            <a:r>
+              <a:rPr lang="en-US" dirty="0"/>
+              <a:t>Quality Control with CV</a:t>
+            </a:r>
+            <a:endParaRPr dirty="0"/>
           </a:p>
         </p:txBody>
       </p:sp>
@@ -16702,17 +17011,9 @@
           </a:bodyPr>
           <a:lstStyle/>
           <a:p>
-            <a:pPr marL="0" lvl="0" indent="0" algn="l" rtl="0">
-              <a:spcBef>
-                <a:spcPts val="0"/>
-              </a:spcBef>
-              <a:spcAft>
-                <a:spcPts val="0"/>
-              </a:spcAft>
-              <a:buNone/>
-            </a:pPr>
-            <a:r>
-              <a:rPr lang="en" sz="1800">
+            <a:pPr lvl="0"/>
+            <a:r>
+              <a:rPr lang="en-US" sz="1800" dirty="0">
                 <a:solidFill>
                   <a:schemeClr val="dk1"/>
                 </a:solidFill>
@@ -16721,9 +17022,9 @@
                 <a:cs typeface="Roboto"/>
                 <a:sym typeface="Roboto"/>
               </a:rPr>
-              <a:t>&lt;Enter verbatim quote 1 here&gt;</a:t>
-            </a:r>
-            <a:endParaRPr sz="1800">
+              <a:t>The computer vison-based approach proposed is helpful in detecting detectives without labor intervention </a:t>
+            </a:r>
+            <a:endParaRPr sz="1800" dirty="0">
               <a:solidFill>
                 <a:schemeClr val="dk1"/>
               </a:solidFill>
@@ -16770,7 +17071,7 @@
               <a:buNone/>
             </a:pPr>
             <a:r>
-              <a:rPr lang="en" sz="1800">
+              <a:rPr lang="en-US" sz="1800" dirty="0">
                 <a:solidFill>
                   <a:schemeClr val="dk1"/>
                 </a:solidFill>
@@ -16779,9 +17080,9 @@
                 <a:cs typeface="Roboto"/>
                 <a:sym typeface="Roboto"/>
               </a:rPr>
-              <a:t>&lt;Enter verbatim quote 2 here&gt;</a:t>
-            </a:r>
-            <a:endParaRPr sz="1800">
+              <a:t>With high quality cameras, the automation process will be accurate</a:t>
+            </a:r>
+            <a:endParaRPr sz="1800" dirty="0">
               <a:solidFill>
                 <a:schemeClr val="dk1"/>
               </a:solidFill>
@@ -16828,7 +17129,7 @@
               <a:buNone/>
             </a:pPr>
             <a:r>
-              <a:rPr lang="en" sz="1800">
+              <a:rPr lang="en-US" sz="1800" dirty="0">
                 <a:solidFill>
                   <a:schemeClr val="dk1"/>
                 </a:solidFill>
@@ -16837,9 +17138,9 @@
                 <a:cs typeface="Roboto"/>
                 <a:sym typeface="Roboto"/>
               </a:rPr>
-              <a:t>&lt;Enter verbatim quote 3 here&gt;</a:t>
-            </a:r>
-            <a:endParaRPr sz="1800">
+              <a:t>Adopting deep neural networks in the classification phase will enable more accurate classification in addition to more classes can be handled at the same time. </a:t>
+            </a:r>
+            <a:endParaRPr sz="1800" dirty="0">
               <a:solidFill>
                 <a:schemeClr val="dk1"/>
               </a:solidFill>
@@ -16901,20 +17202,16 @@
           </a:bodyPr>
           <a:lstStyle/>
           <a:p>
-            <a:pPr marL="0" lvl="0" indent="0" algn="l" rtl="0">
-              <a:spcBef>
-                <a:spcPts val="0"/>
-              </a:spcBef>
-              <a:spcAft>
-                <a:spcPts val="0"/>
-              </a:spcAft>
-              <a:buNone/>
-            </a:pPr>
-            <a:r>
-              <a:rPr lang="en"/>
-              <a:t>Visualization - &lt;Enter Use Case Name 1&gt;</a:t>
-            </a:r>
-            <a:endParaRPr/>
+            <a:pPr lvl="0"/>
+            <a:r>
+              <a:rPr lang="en" dirty="0"/>
+              <a:t>Visualization - </a:t>
+            </a:r>
+            <a:r>
+              <a:rPr lang="en-US" dirty="0"/>
+              <a:t>Quality Control with CV</a:t>
+            </a:r>
+            <a:endParaRPr dirty="0"/>
           </a:p>
         </p:txBody>
       </p:sp>
@@ -16974,6 +17271,53 @@
           </a:p>
         </p:txBody>
       </p:sp>
+      <p:pic>
+        <p:nvPicPr>
+          <p:cNvPr id="1026" name="Picture 2" descr="Forms response chart. Question title: Based on the description above, how familiar would you say you are with the area being discussed in Use Case 1?. Number of responses: .">
+            <a:extLst>
+              <a:ext uri="{FF2B5EF4-FFF2-40B4-BE49-F238E27FC236}">
+                <a16:creationId xmlns:a16="http://schemas.microsoft.com/office/drawing/2014/main" id="{C67D799D-CE8B-48BB-8F13-CD66003AF9C7}"/>
+              </a:ext>
+            </a:extLst>
+          </p:cNvPr>
+          <p:cNvPicPr>
+            <a:picLocks noChangeAspect="1" noChangeArrowheads="1"/>
+          </p:cNvPicPr>
+          <p:nvPr/>
+        </p:nvPicPr>
+        <p:blipFill>
+          <a:blip r:embed="rId3">
+            <a:extLst>
+              <a:ext uri="{28A0092B-C50C-407E-A947-70E740481C1C}">
+                <a14:useLocalDpi xmlns:a14="http://schemas.microsoft.com/office/drawing/2010/main" val="0"/>
+              </a:ext>
+            </a:extLst>
+          </a:blip>
+          <a:srcRect/>
+          <a:stretch>
+            <a:fillRect/>
+          </a:stretch>
+        </p:blipFill>
+        <p:spPr bwMode="auto">
+          <a:xfrm>
+            <a:off x="1461655" y="1578596"/>
+            <a:ext cx="5638800" cy="2942749"/>
+          </a:xfrm>
+          <a:prstGeom prst="rect">
+            <a:avLst/>
+          </a:prstGeom>
+          <a:noFill/>
+          <a:extLst>
+            <a:ext uri="{909E8E84-426E-40DD-AFC4-6F175D3DCCD1}">
+              <a14:hiddenFill xmlns:a14="http://schemas.microsoft.com/office/drawing/2010/main">
+                <a:solidFill>
+                  <a:srgbClr val="FFFFFF"/>
+                </a:solidFill>
+              </a14:hiddenFill>
+            </a:ext>
+          </a:extLst>
+        </p:spPr>
+      </p:pic>
     </p:spTree>
   </p:cSld>
   <p:clrMapOvr>
@@ -17024,20 +17368,16 @@
           </a:bodyPr>
           <a:lstStyle/>
           <a:p>
-            <a:pPr marL="0" lvl="0" indent="0" algn="l" rtl="0">
-              <a:spcBef>
-                <a:spcPts val="0"/>
-              </a:spcBef>
-              <a:spcAft>
-                <a:spcPts val="0"/>
-              </a:spcAft>
-              <a:buNone/>
-            </a:pPr>
-            <a:r>
-              <a:rPr lang="en"/>
-              <a:t>Verbatim Quotes - &lt;Enter Use Case Name 2&gt;</a:t>
-            </a:r>
-            <a:endParaRPr/>
+            <a:pPr lvl="0"/>
+            <a:r>
+              <a:rPr lang="en" dirty="0"/>
+              <a:t>Verbatim Quotes : </a:t>
+            </a:r>
+            <a:r>
+              <a:rPr lang="en-US" dirty="0"/>
+              <a:t>Car maintenance Expectation</a:t>
+            </a:r>
+            <a:endParaRPr dirty="0"/>
           </a:p>
         </p:txBody>
       </p:sp>
@@ -17076,7 +17416,7 @@
               <a:buNone/>
             </a:pPr>
             <a:r>
-              <a:rPr lang="en" sz="1800">
+              <a:rPr lang="en-US" sz="1800" dirty="0">
                 <a:solidFill>
                   <a:schemeClr val="dk1"/>
                 </a:solidFill>
@@ -17085,9 +17425,9 @@
                 <a:cs typeface="Roboto"/>
                 <a:sym typeface="Roboto"/>
               </a:rPr>
-              <a:t>&lt;Enter verbatim quote 1 here&gt;</a:t>
-            </a:r>
-            <a:endParaRPr sz="1800">
+              <a:t>Thanks to AI models, we can expect the next car failure ahead of time. </a:t>
+            </a:r>
+            <a:endParaRPr sz="1800" dirty="0">
               <a:solidFill>
                 <a:schemeClr val="dk1"/>
               </a:solidFill>
@@ -17134,7 +17474,7 @@
               <a:buNone/>
             </a:pPr>
             <a:r>
-              <a:rPr lang="en" sz="1800">
+              <a:rPr lang="en-US" sz="1800" dirty="0">
                 <a:solidFill>
                   <a:schemeClr val="dk1"/>
                 </a:solidFill>
@@ -17143,9 +17483,9 @@
                 <a:cs typeface="Roboto"/>
                 <a:sym typeface="Roboto"/>
               </a:rPr>
-              <a:t>&lt;Enter verbatim quote 2 here&gt;</a:t>
-            </a:r>
-            <a:endParaRPr sz="1800">
+              <a:t>Multiple reading of sensors is not totally dependable. Hardware failure of sensors may occur</a:t>
+            </a:r>
+            <a:endParaRPr sz="1800" dirty="0">
               <a:solidFill>
                 <a:schemeClr val="dk1"/>
               </a:solidFill>
@@ -17192,7 +17532,7 @@
               <a:buNone/>
             </a:pPr>
             <a:r>
-              <a:rPr lang="en" sz="1800">
+              <a:rPr lang="en-US" sz="1800" dirty="0">
                 <a:solidFill>
                   <a:schemeClr val="dk1"/>
                 </a:solidFill>
@@ -17201,9 +17541,9 @@
                 <a:cs typeface="Roboto"/>
                 <a:sym typeface="Roboto"/>
               </a:rPr>
-              <a:t>&lt;Enter verbatim quote 3 here&gt;</a:t>
-            </a:r>
-            <a:endParaRPr sz="1800">
+              <a:t>Some sensor readings may not be important in the expectation process. A method must be found to found those sensors. </a:t>
+            </a:r>
+            <a:endParaRPr sz="1800" dirty="0">
               <a:solidFill>
                 <a:schemeClr val="dk1"/>
               </a:solidFill>
@@ -17265,20 +17605,16 @@
           </a:bodyPr>
           <a:lstStyle/>
           <a:p>
-            <a:pPr marL="0" lvl="0" indent="0" algn="l" rtl="0">
-              <a:spcBef>
-                <a:spcPts val="0"/>
-              </a:spcBef>
-              <a:spcAft>
-                <a:spcPts val="0"/>
-              </a:spcAft>
-              <a:buNone/>
-            </a:pPr>
-            <a:r>
-              <a:rPr lang="en"/>
-              <a:t>Visualization - &lt;Enter Use Case Name 2&gt;</a:t>
-            </a:r>
-            <a:endParaRPr/>
+            <a:pPr lvl="0"/>
+            <a:r>
+              <a:rPr lang="en" dirty="0"/>
+              <a:t>Visualization - </a:t>
+            </a:r>
+            <a:r>
+              <a:rPr lang="en-US" dirty="0"/>
+              <a:t>Car maintenance Expectation</a:t>
+            </a:r>
+            <a:endParaRPr dirty="0"/>
           </a:p>
         </p:txBody>
       </p:sp>
@@ -17338,6 +17674,36 @@
           </a:p>
         </p:txBody>
       </p:sp>
+      <p:pic>
+        <p:nvPicPr>
+          <p:cNvPr id="2" name="Picture 1">
+            <a:extLst>
+              <a:ext uri="{FF2B5EF4-FFF2-40B4-BE49-F238E27FC236}">
+                <a16:creationId xmlns:a16="http://schemas.microsoft.com/office/drawing/2014/main" id="{F0DC8E92-F19C-4A1E-B7CF-1B16FB025779}"/>
+              </a:ext>
+            </a:extLst>
+          </p:cNvPr>
+          <p:cNvPicPr>
+            <a:picLocks noChangeAspect="1"/>
+          </p:cNvPicPr>
+          <p:nvPr/>
+        </p:nvPicPr>
+        <p:blipFill>
+          <a:blip r:embed="rId3"/>
+          <a:stretch>
+            <a:fillRect/>
+          </a:stretch>
+        </p:blipFill>
+        <p:spPr>
+          <a:xfrm>
+            <a:off x="681037" y="1111637"/>
+            <a:ext cx="7781925" cy="3533775"/>
+          </a:xfrm>
+          <a:prstGeom prst="rect">
+            <a:avLst/>
+          </a:prstGeom>
+        </p:spPr>
+      </p:pic>
     </p:spTree>
   </p:cSld>
   <p:clrMapOvr>
@@ -19305,6 +19671,164 @@
               <a:ea typeface="Roboto"/>
               <a:cs typeface="Roboto"/>
               <a:sym typeface="Roboto"/>
+            </a:endParaRPr>
+          </a:p>
+        </p:txBody>
+      </p:sp>
+      <p:sp>
+        <p:nvSpPr>
+          <p:cNvPr id="24" name="Google Shape;329;p43">
+            <a:extLst>
+              <a:ext uri="{FF2B5EF4-FFF2-40B4-BE49-F238E27FC236}">
+                <a16:creationId xmlns:a16="http://schemas.microsoft.com/office/drawing/2014/main" id="{83693FCD-34F1-454A-BB5B-36606FBA5622}"/>
+              </a:ext>
+            </a:extLst>
+          </p:cNvPr>
+          <p:cNvSpPr/>
+          <p:nvPr/>
+        </p:nvSpPr>
+        <p:spPr>
+          <a:xfrm>
+            <a:off x="1697200" y="1765875"/>
+            <a:ext cx="345000" cy="338400"/>
+          </a:xfrm>
+          <a:prstGeom prst="ellipse">
+            <a:avLst/>
+          </a:prstGeom>
+          <a:solidFill>
+            <a:schemeClr val="dk1"/>
+          </a:solidFill>
+          <a:ln w="9525" cap="flat" cmpd="sng">
+            <a:solidFill>
+              <a:srgbClr val="666666"/>
+            </a:solidFill>
+            <a:prstDash val="solid"/>
+            <a:round/>
+            <a:headEnd type="none" w="sm" len="sm"/>
+            <a:tailEnd type="none" w="sm" len="sm"/>
+          </a:ln>
+        </p:spPr>
+        <p:txBody>
+          <a:bodyPr spcFirstLastPara="1" wrap="square" lIns="0" tIns="0" rIns="0" bIns="0" anchor="ctr" anchorCtr="0">
+            <a:noAutofit/>
+          </a:bodyPr>
+          <a:lstStyle/>
+          <a:p>
+            <a:pPr marL="0" lvl="0" indent="0" algn="ctr" rtl="0">
+              <a:spcBef>
+                <a:spcPts val="0"/>
+              </a:spcBef>
+              <a:spcAft>
+                <a:spcPts val="0"/>
+              </a:spcAft>
+              <a:buNone/>
+            </a:pPr>
+            <a:r>
+              <a:rPr lang="en" sz="900">
+                <a:solidFill>
+                  <a:srgbClr val="FFFFFF"/>
+                </a:solidFill>
+              </a:rPr>
+              <a:t>UC</a:t>
+            </a:r>
+            <a:br>
+              <a:rPr lang="en" sz="900">
+                <a:solidFill>
+                  <a:srgbClr val="FFFFFF"/>
+                </a:solidFill>
+              </a:rPr>
+            </a:br>
+            <a:r>
+              <a:rPr lang="en" sz="900">
+                <a:solidFill>
+                  <a:srgbClr val="FFFFFF"/>
+                </a:solidFill>
+              </a:rPr>
+              <a:t>1</a:t>
+            </a:r>
+            <a:endParaRPr sz="900">
+              <a:solidFill>
+                <a:srgbClr val="FFFFFF"/>
+              </a:solidFill>
+            </a:endParaRPr>
+          </a:p>
+        </p:txBody>
+      </p:sp>
+      <p:sp>
+        <p:nvSpPr>
+          <p:cNvPr id="25" name="Google Shape;331;p43">
+            <a:extLst>
+              <a:ext uri="{FF2B5EF4-FFF2-40B4-BE49-F238E27FC236}">
+                <a16:creationId xmlns:a16="http://schemas.microsoft.com/office/drawing/2014/main" id="{79B783B6-442B-40B4-8F14-31C7A809C5D1}"/>
+              </a:ext>
+            </a:extLst>
+          </p:cNvPr>
+          <p:cNvSpPr/>
+          <p:nvPr/>
+        </p:nvSpPr>
+        <p:spPr>
+          <a:xfrm>
+            <a:off x="1684356" y="2270475"/>
+            <a:ext cx="345000" cy="338400"/>
+          </a:xfrm>
+          <a:prstGeom prst="ellipse">
+            <a:avLst/>
+          </a:prstGeom>
+          <a:solidFill>
+            <a:schemeClr val="dk1"/>
+          </a:solidFill>
+          <a:ln w="9525" cap="flat" cmpd="sng">
+            <a:solidFill>
+              <a:srgbClr val="666666"/>
+            </a:solidFill>
+            <a:prstDash val="solid"/>
+            <a:round/>
+            <a:headEnd type="none" w="sm" len="sm"/>
+            <a:tailEnd type="none" w="sm" len="sm"/>
+          </a:ln>
+        </p:spPr>
+        <p:txBody>
+          <a:bodyPr spcFirstLastPara="1" wrap="square" lIns="0" tIns="0" rIns="0" bIns="0" anchor="ctr" anchorCtr="0">
+            <a:noAutofit/>
+          </a:bodyPr>
+          <a:lstStyle/>
+          <a:p>
+            <a:pPr marL="0" lvl="0" indent="0" algn="ctr" rtl="0">
+              <a:spcBef>
+                <a:spcPts val="0"/>
+              </a:spcBef>
+              <a:spcAft>
+                <a:spcPts val="0"/>
+              </a:spcAft>
+              <a:buNone/>
+            </a:pPr>
+            <a:r>
+              <a:rPr lang="en" sz="900">
+                <a:solidFill>
+                  <a:srgbClr val="FFFFFF"/>
+                </a:solidFill>
+              </a:rPr>
+              <a:t>UC</a:t>
+            </a:r>
+            <a:br>
+              <a:rPr lang="en" sz="900">
+                <a:solidFill>
+                  <a:srgbClr val="FFFFFF"/>
+                </a:solidFill>
+              </a:rPr>
+            </a:br>
+            <a:r>
+              <a:rPr lang="en" sz="900">
+                <a:solidFill>
+                  <a:srgbClr val="FFFFFF"/>
+                </a:solidFill>
+              </a:rPr>
+              <a:t>3</a:t>
+            </a:r>
+            <a:endParaRPr sz="900">
+              <a:solidFill>
+                <a:srgbClr val="FFFFFF"/>
+              </a:solidFill>
             </a:endParaRPr>
           </a:p>
         </p:txBody>

</xml_diff>

<commit_message>
completed the final report
</commit_message>
<xml_diff>
--- a/02_project-steps-aibl.pptx
+++ b/02_project-steps-aibl.pptx
@@ -320,7 +320,7 @@
   <pc:docChgLst>
     <pc:chgData name="Osama Mohammed Moustafa Hosam Elde" userId="ab8f451e-a635-42ee-be12-e2dde55852bf" providerId="ADAL" clId="{B6D8E2E3-C58C-42AC-BD6D-A79F41996BB5}"/>
     <pc:docChg chg="undo custSel modSld">
-      <pc:chgData name="Osama Mohammed Moustafa Hosam Elde" userId="ab8f451e-a635-42ee-be12-e2dde55852bf" providerId="ADAL" clId="{B6D8E2E3-C58C-42AC-BD6D-A79F41996BB5}" dt="2020-02-18T20:11:27.263" v="3721" actId="571"/>
+      <pc:chgData name="Osama Mohammed Moustafa Hosam Elde" userId="ab8f451e-a635-42ee-be12-e2dde55852bf" providerId="ADAL" clId="{B6D8E2E3-C58C-42AC-BD6D-A79F41996BB5}" dt="2020-02-18T20:57:11.275" v="3723" actId="478"/>
       <pc:docMkLst>
         <pc:docMk/>
       </pc:docMkLst>
@@ -711,7 +711,7 @@
         </pc:picChg>
       </pc:sldChg>
       <pc:sldChg chg="addSp delSp modSp">
-        <pc:chgData name="Osama Mohammed Moustafa Hosam Elde" userId="ab8f451e-a635-42ee-be12-e2dde55852bf" providerId="ADAL" clId="{B6D8E2E3-C58C-42AC-BD6D-A79F41996BB5}" dt="2020-02-16T20:57:46.068" v="704" actId="1076"/>
+        <pc:chgData name="Osama Mohammed Moustafa Hosam Elde" userId="ab8f451e-a635-42ee-be12-e2dde55852bf" providerId="ADAL" clId="{B6D8E2E3-C58C-42AC-BD6D-A79F41996BB5}" dt="2020-02-18T20:57:11.275" v="3723" actId="478"/>
         <pc:sldMkLst>
           <pc:docMk/>
           <pc:sldMk cId="0" sldId="267"/>
@@ -772,8 +772,8 @@
             <ac:spMk id="19" creationId="{C0C53420-1E7A-4B66-8E8D-021E3BE393C9}"/>
           </ac:spMkLst>
         </pc:spChg>
-        <pc:spChg chg="mod">
-          <ac:chgData name="Osama Mohammed Moustafa Hosam Elde" userId="ab8f451e-a635-42ee-be12-e2dde55852bf" providerId="ADAL" clId="{B6D8E2E3-C58C-42AC-BD6D-A79F41996BB5}" dt="2020-02-16T20:17:29.925" v="472" actId="14100"/>
+        <pc:spChg chg="add del mod">
+          <ac:chgData name="Osama Mohammed Moustafa Hosam Elde" userId="ab8f451e-a635-42ee-be12-e2dde55852bf" providerId="ADAL" clId="{B6D8E2E3-C58C-42AC-BD6D-A79F41996BB5}" dt="2020-02-18T20:57:11.275" v="3723" actId="478"/>
           <ac:spMkLst>
             <pc:docMk/>
             <pc:sldMk cId="0" sldId="267"/>

</xml_diff>

<commit_message>
updated use cases in the excel sheet
</commit_message>
<xml_diff>
--- a/02_project-steps-aibl.pptx
+++ b/02_project-steps-aibl.pptx
@@ -320,7 +320,7 @@
   <pc:docChgLst>
     <pc:chgData name="Osama Mohammed Moustafa Hosam Elde" userId="ab8f451e-a635-42ee-be12-e2dde55852bf" providerId="ADAL" clId="{B6D8E2E3-C58C-42AC-BD6D-A79F41996BB5}"/>
     <pc:docChg chg="undo custSel modSld">
-      <pc:chgData name="Osama Mohammed Moustafa Hosam Elde" userId="ab8f451e-a635-42ee-be12-e2dde55852bf" providerId="ADAL" clId="{B6D8E2E3-C58C-42AC-BD6D-A79F41996BB5}" dt="2020-03-05T14:10:23.939" v="3743" actId="20577"/>
+      <pc:chgData name="Osama Mohammed Moustafa Hosam Elde" userId="ab8f451e-a635-42ee-be12-e2dde55852bf" providerId="ADAL" clId="{B6D8E2E3-C58C-42AC-BD6D-A79F41996BB5}" dt="2020-03-05T19:50:13.517" v="4002" actId="20577"/>
       <pc:docMkLst>
         <pc:docMk/>
       </pc:docMkLst>
@@ -1029,13 +1029,13 @@
         </pc:spChg>
       </pc:sldChg>
       <pc:sldChg chg="addSp delSp modSp">
-        <pc:chgData name="Osama Mohammed Moustafa Hosam Elde" userId="ab8f451e-a635-42ee-be12-e2dde55852bf" providerId="ADAL" clId="{B6D8E2E3-C58C-42AC-BD6D-A79F41996BB5}" dt="2020-02-17T14:27:05.457" v="1779" actId="20577"/>
+        <pc:chgData name="Osama Mohammed Moustafa Hosam Elde" userId="ab8f451e-a635-42ee-be12-e2dde55852bf" providerId="ADAL" clId="{B6D8E2E3-C58C-42AC-BD6D-A79F41996BB5}" dt="2020-03-05T19:50:13.517" v="4002" actId="20577"/>
         <pc:sldMkLst>
           <pc:docMk/>
           <pc:sldMk cId="0" sldId="276"/>
         </pc:sldMkLst>
         <pc:spChg chg="mod">
-          <ac:chgData name="Osama Mohammed Moustafa Hosam Elde" userId="ab8f451e-a635-42ee-be12-e2dde55852bf" providerId="ADAL" clId="{B6D8E2E3-C58C-42AC-BD6D-A79F41996BB5}" dt="2020-02-17T14:27:05.457" v="1779" actId="20577"/>
+          <ac:chgData name="Osama Mohammed Moustafa Hosam Elde" userId="ab8f451e-a635-42ee-be12-e2dde55852bf" providerId="ADAL" clId="{B6D8E2E3-C58C-42AC-BD6D-A79F41996BB5}" dt="2020-03-05T19:50:13.517" v="4002" actId="20577"/>
           <ac:spMkLst>
             <pc:docMk/>
             <pc:sldMk cId="0" sldId="276"/>
@@ -16176,7 +16176,7 @@
                 <a:cs typeface="Roboto"/>
                 <a:sym typeface="Roboto"/>
               </a:rPr>
-              <a:t>The quality control can be controlled totally on visual classification. In which it can be either binary classifier, so the classifier can detect the existence/absence of the defect. But the defect will be then examined manually. </a:t>
+              <a:t>The quality control can be controlled totally on visual classification. In which it can be either binary classifier, so the classifier can detect the existence/absence of the defect. But the defect will be then examined manually, i.e. extra step is needed.</a:t>
             </a:r>
           </a:p>
           <a:p>
@@ -16216,7 +16216,27 @@
                 <a:cs typeface="Roboto"/>
                 <a:sym typeface="Roboto"/>
               </a:rPr>
-              <a:t>Business rule are then be implied to see what you will do with the defective devices. After discovery, what the quality engineer will do ? Will he count the number of defectives and if increased on threshold he will stop line/machine? Or he will calculate some probability and if the probability of defective &gt; threshold he will stop line/machine. </a:t>
+              <a:t>Business rule are then be implied to see what you will do with the defective devices. After discovery, what the quality engineer will do ? Will he count the number of defectives and if increased on threshold he will stop line/machine? Or he will calculate some probability and if the probability of defective &gt; threshold he will stop line/machine. Or he will simply git rid of the defective device. </a:t>
+            </a:r>
+          </a:p>
+          <a:p>
+            <a:pPr marL="0" lvl="0" indent="0" algn="l" rtl="0">
+              <a:spcBef>
+                <a:spcPts val="0"/>
+              </a:spcBef>
+              <a:spcAft>
+                <a:spcPts val="0"/>
+              </a:spcAft>
+              <a:buNone/>
+            </a:pPr>
+            <a:r>
+              <a:rPr lang="en-US" sz="1200" dirty="0">
+                <a:latin typeface="Roboto"/>
+                <a:ea typeface="Roboto"/>
+                <a:cs typeface="Roboto"/>
+                <a:sym typeface="Roboto"/>
+              </a:rPr>
+              <a:t>One concern for multiple classes is the existence of new class of defectives. We shall train the model again</a:t>
             </a:r>
             <a:endParaRPr sz="1200" dirty="0">
               <a:latin typeface="Roboto"/>

</xml_diff>

<commit_message>
updated Car Maintennce expectator use case
</commit_message>
<xml_diff>
--- a/02_project-steps-aibl.pptx
+++ b/02_project-steps-aibl.pptx
@@ -310,7 +310,7 @@
 <file path=ppt/revisionInfo.xml><?xml version="1.0" encoding="utf-8"?>
 <p1510:revInfo xmlns:a="http://schemas.openxmlformats.org/drawingml/2006/main" xmlns:r="http://schemas.openxmlformats.org/officeDocument/2006/relationships" xmlns:p1510="http://schemas.microsoft.com/office/powerpoint/2015/10/main">
   <p1510:revLst>
-    <p1510:client id="{B6D8E2E3-C58C-42AC-BD6D-A79F41996BB5}" v="103" dt="2020-02-18T20:11:27.264"/>
+    <p1510:client id="{B6D8E2E3-C58C-42AC-BD6D-A79F41996BB5}" v="128" dt="2020-03-06T20:22:39.520"/>
   </p1510:revLst>
 </p1510:revInfo>
 </file>
@@ -320,7 +320,7 @@
   <pc:docChgLst>
     <pc:chgData name="Osama Mohammed Moustafa Hosam Elde" userId="ab8f451e-a635-42ee-be12-e2dde55852bf" providerId="ADAL" clId="{B6D8E2E3-C58C-42AC-BD6D-A79F41996BB5}"/>
     <pc:docChg chg="undo custSel modSld">
-      <pc:chgData name="Osama Mohammed Moustafa Hosam Elde" userId="ab8f451e-a635-42ee-be12-e2dde55852bf" providerId="ADAL" clId="{B6D8E2E3-C58C-42AC-BD6D-A79F41996BB5}" dt="2020-03-05T19:50:13.517" v="4002" actId="20577"/>
+      <pc:chgData name="Osama Mohammed Moustafa Hosam Elde" userId="ab8f451e-a635-42ee-be12-e2dde55852bf" providerId="ADAL" clId="{B6D8E2E3-C58C-42AC-BD6D-A79F41996BB5}" dt="2020-03-06T20:22:39.519" v="4520" actId="14100"/>
       <pc:docMkLst>
         <pc:docMk/>
       </pc:docMkLst>
@@ -340,13 +340,13 @@
         </pc:spChg>
       </pc:sldChg>
       <pc:sldChg chg="modSp">
-        <pc:chgData name="Osama Mohammed Moustafa Hosam Elde" userId="ab8f451e-a635-42ee-be12-e2dde55852bf" providerId="ADAL" clId="{B6D8E2E3-C58C-42AC-BD6D-A79F41996BB5}" dt="2020-03-05T14:10:23.939" v="3743" actId="20577"/>
+        <pc:chgData name="Osama Mohammed Moustafa Hosam Elde" userId="ab8f451e-a635-42ee-be12-e2dde55852bf" providerId="ADAL" clId="{B6D8E2E3-C58C-42AC-BD6D-A79F41996BB5}" dt="2020-03-06T18:10:24.807" v="4003" actId="6549"/>
         <pc:sldMkLst>
           <pc:docMk/>
           <pc:sldMk cId="0" sldId="257"/>
         </pc:sldMkLst>
         <pc:spChg chg="mod">
-          <ac:chgData name="Osama Mohammed Moustafa Hosam Elde" userId="ab8f451e-a635-42ee-be12-e2dde55852bf" providerId="ADAL" clId="{B6D8E2E3-C58C-42AC-BD6D-A79F41996BB5}" dt="2020-03-05T14:10:23.939" v="3743" actId="20577"/>
+          <ac:chgData name="Osama Mohammed Moustafa Hosam Elde" userId="ab8f451e-a635-42ee-be12-e2dde55852bf" providerId="ADAL" clId="{B6D8E2E3-C58C-42AC-BD6D-A79F41996BB5}" dt="2020-03-06T18:10:24.807" v="4003" actId="6549"/>
           <ac:spMkLst>
             <pc:docMk/>
             <pc:sldMk cId="0" sldId="257"/>
@@ -355,13 +355,13 @@
         </pc:spChg>
       </pc:sldChg>
       <pc:sldChg chg="addSp modSp">
-        <pc:chgData name="Osama Mohammed Moustafa Hosam Elde" userId="ab8f451e-a635-42ee-be12-e2dde55852bf" providerId="ADAL" clId="{B6D8E2E3-C58C-42AC-BD6D-A79F41996BB5}" dt="2020-02-24T14:27:47.505" v="3729" actId="1076"/>
+        <pc:chgData name="Osama Mohammed Moustafa Hosam Elde" userId="ab8f451e-a635-42ee-be12-e2dde55852bf" providerId="ADAL" clId="{B6D8E2E3-C58C-42AC-BD6D-A79F41996BB5}" dt="2020-03-06T19:39:48.046" v="4048" actId="207"/>
         <pc:sldMkLst>
           <pc:docMk/>
           <pc:sldMk cId="0" sldId="259"/>
         </pc:sldMkLst>
         <pc:spChg chg="add mod">
-          <ac:chgData name="Osama Mohammed Moustafa Hosam Elde" userId="ab8f451e-a635-42ee-be12-e2dde55852bf" providerId="ADAL" clId="{B6D8E2E3-C58C-42AC-BD6D-A79F41996BB5}" dt="2020-02-24T14:27:47.505" v="3729" actId="1076"/>
+          <ac:chgData name="Osama Mohammed Moustafa Hosam Elde" userId="ab8f451e-a635-42ee-be12-e2dde55852bf" providerId="ADAL" clId="{B6D8E2E3-C58C-42AC-BD6D-A79F41996BB5}" dt="2020-03-06T19:38:57.715" v="4040" actId="1076"/>
           <ac:spMkLst>
             <pc:docMk/>
             <pc:sldMk cId="0" sldId="259"/>
@@ -369,7 +369,7 @@
           </ac:spMkLst>
         </pc:spChg>
         <pc:spChg chg="add mod">
-          <ac:chgData name="Osama Mohammed Moustafa Hosam Elde" userId="ab8f451e-a635-42ee-be12-e2dde55852bf" providerId="ADAL" clId="{B6D8E2E3-C58C-42AC-BD6D-A79F41996BB5}" dt="2020-02-24T14:27:39.657" v="3725" actId="1076"/>
+          <ac:chgData name="Osama Mohammed Moustafa Hosam Elde" userId="ab8f451e-a635-42ee-be12-e2dde55852bf" providerId="ADAL" clId="{B6D8E2E3-C58C-42AC-BD6D-A79F41996BB5}" dt="2020-03-06T19:39:12.995" v="4044" actId="1076"/>
           <ac:spMkLst>
             <pc:docMk/>
             <pc:sldMk cId="0" sldId="259"/>
@@ -377,7 +377,7 @@
           </ac:spMkLst>
         </pc:spChg>
         <pc:spChg chg="add mod">
-          <ac:chgData name="Osama Mohammed Moustafa Hosam Elde" userId="ab8f451e-a635-42ee-be12-e2dde55852bf" providerId="ADAL" clId="{B6D8E2E3-C58C-42AC-BD6D-A79F41996BB5}" dt="2020-02-24T14:27:37.514" v="3724" actId="1076"/>
+          <ac:chgData name="Osama Mohammed Moustafa Hosam Elde" userId="ab8f451e-a635-42ee-be12-e2dde55852bf" providerId="ADAL" clId="{B6D8E2E3-C58C-42AC-BD6D-A79F41996BB5}" dt="2020-03-06T19:39:48.046" v="4048" actId="207"/>
           <ac:spMkLst>
             <pc:docMk/>
             <pc:sldMk cId="0" sldId="259"/>
@@ -385,7 +385,7 @@
           </ac:spMkLst>
         </pc:spChg>
         <pc:spChg chg="add mod">
-          <ac:chgData name="Osama Mohammed Moustafa Hosam Elde" userId="ab8f451e-a635-42ee-be12-e2dde55852bf" providerId="ADAL" clId="{B6D8E2E3-C58C-42AC-BD6D-A79F41996BB5}" dt="2020-02-24T14:27:44.377" v="3727" actId="1076"/>
+          <ac:chgData name="Osama Mohammed Moustafa Hosam Elde" userId="ab8f451e-a635-42ee-be12-e2dde55852bf" providerId="ADAL" clId="{B6D8E2E3-C58C-42AC-BD6D-A79F41996BB5}" dt="2020-03-06T19:37:21.619" v="4038" actId="1076"/>
           <ac:spMkLst>
             <pc:docMk/>
             <pc:sldMk cId="0" sldId="259"/>
@@ -393,7 +393,7 @@
           </ac:spMkLst>
         </pc:spChg>
         <pc:spChg chg="add mod">
-          <ac:chgData name="Osama Mohammed Moustafa Hosam Elde" userId="ab8f451e-a635-42ee-be12-e2dde55852bf" providerId="ADAL" clId="{B6D8E2E3-C58C-42AC-BD6D-A79F41996BB5}" dt="2020-02-24T14:27:42.218" v="3726" actId="1076"/>
+          <ac:chgData name="Osama Mohammed Moustafa Hosam Elde" userId="ab8f451e-a635-42ee-be12-e2dde55852bf" providerId="ADAL" clId="{B6D8E2E3-C58C-42AC-BD6D-A79F41996BB5}" dt="2020-03-06T19:39:30.924" v="4047" actId="207"/>
           <ac:spMkLst>
             <pc:docMk/>
             <pc:sldMk cId="0" sldId="259"/>
@@ -425,7 +425,7 @@
           </ac:spMkLst>
         </pc:spChg>
         <pc:spChg chg="mod">
-          <ac:chgData name="Osama Mohammed Moustafa Hosam Elde" userId="ab8f451e-a635-42ee-be12-e2dde55852bf" providerId="ADAL" clId="{B6D8E2E3-C58C-42AC-BD6D-A79F41996BB5}" dt="2020-02-16T18:17:34.884" v="57" actId="404"/>
+          <ac:chgData name="Osama Mohammed Moustafa Hosam Elde" userId="ab8f451e-a635-42ee-be12-e2dde55852bf" providerId="ADAL" clId="{B6D8E2E3-C58C-42AC-BD6D-A79F41996BB5}" dt="2020-03-06T18:10:48.723" v="4022" actId="20577"/>
           <ac:spMkLst>
             <pc:docMk/>
             <pc:sldMk cId="0" sldId="259"/>
@@ -520,13 +520,13 @@
         </pc:picChg>
       </pc:sldChg>
       <pc:sldChg chg="addSp delSp modSp">
-        <pc:chgData name="Osama Mohammed Moustafa Hosam Elde" userId="ab8f451e-a635-42ee-be12-e2dde55852bf" providerId="ADAL" clId="{B6D8E2E3-C58C-42AC-BD6D-A79F41996BB5}" dt="2020-02-16T20:53:53.116" v="672" actId="207"/>
+        <pc:chgData name="Osama Mohammed Moustafa Hosam Elde" userId="ab8f451e-a635-42ee-be12-e2dde55852bf" providerId="ADAL" clId="{B6D8E2E3-C58C-42AC-BD6D-A79F41996BB5}" dt="2020-03-06T19:47:11.164" v="4113" actId="1076"/>
         <pc:sldMkLst>
           <pc:docMk/>
           <pc:sldMk cId="0" sldId="266"/>
         </pc:sldMkLst>
         <pc:spChg chg="add mod">
-          <ac:chgData name="Osama Mohammed Moustafa Hosam Elde" userId="ab8f451e-a635-42ee-be12-e2dde55852bf" providerId="ADAL" clId="{B6D8E2E3-C58C-42AC-BD6D-A79F41996BB5}" dt="2020-02-16T20:53:53.116" v="672" actId="207"/>
+          <ac:chgData name="Osama Mohammed Moustafa Hosam Elde" userId="ab8f451e-a635-42ee-be12-e2dde55852bf" providerId="ADAL" clId="{B6D8E2E3-C58C-42AC-BD6D-A79F41996BB5}" dt="2020-03-06T19:45:14.500" v="4055" actId="20577"/>
           <ac:spMkLst>
             <pc:docMk/>
             <pc:sldMk cId="0" sldId="266"/>
@@ -534,7 +534,7 @@
           </ac:spMkLst>
         </pc:spChg>
         <pc:spChg chg="add mod">
-          <ac:chgData name="Osama Mohammed Moustafa Hosam Elde" userId="ab8f451e-a635-42ee-be12-e2dde55852bf" providerId="ADAL" clId="{B6D8E2E3-C58C-42AC-BD6D-A79F41996BB5}" dt="2020-02-16T20:15:03.069" v="470" actId="2085"/>
+          <ac:chgData name="Osama Mohammed Moustafa Hosam Elde" userId="ab8f451e-a635-42ee-be12-e2dde55852bf" providerId="ADAL" clId="{B6D8E2E3-C58C-42AC-BD6D-A79F41996BB5}" dt="2020-03-06T19:47:06.340" v="4112" actId="14100"/>
           <ac:spMkLst>
             <pc:docMk/>
             <pc:sldMk cId="0" sldId="266"/>
@@ -542,7 +542,7 @@
           </ac:spMkLst>
         </pc:spChg>
         <pc:spChg chg="add mod">
-          <ac:chgData name="Osama Mohammed Moustafa Hosam Elde" userId="ab8f451e-a635-42ee-be12-e2dde55852bf" providerId="ADAL" clId="{B6D8E2E3-C58C-42AC-BD6D-A79F41996BB5}" dt="2020-02-16T20:53:50.434" v="671" actId="207"/>
+          <ac:chgData name="Osama Mohammed Moustafa Hosam Elde" userId="ab8f451e-a635-42ee-be12-e2dde55852bf" providerId="ADAL" clId="{B6D8E2E3-C58C-42AC-BD6D-A79F41996BB5}" dt="2020-03-06T19:46:27.156" v="4080" actId="20577"/>
           <ac:spMkLst>
             <pc:docMk/>
             <pc:sldMk cId="0" sldId="266"/>
@@ -694,7 +694,7 @@
           </ac:picMkLst>
         </pc:picChg>
         <pc:picChg chg="add mod">
-          <ac:chgData name="Osama Mohammed Moustafa Hosam Elde" userId="ab8f451e-a635-42ee-be12-e2dde55852bf" providerId="ADAL" clId="{B6D8E2E3-C58C-42AC-BD6D-A79F41996BB5}" dt="2020-02-16T20:03:47.421" v="419" actId="688"/>
+          <ac:chgData name="Osama Mohammed Moustafa Hosam Elde" userId="ab8f451e-a635-42ee-be12-e2dde55852bf" providerId="ADAL" clId="{B6D8E2E3-C58C-42AC-BD6D-A79F41996BB5}" dt="2020-03-06T19:47:11.164" v="4113" actId="1076"/>
           <ac:picMkLst>
             <pc:docMk/>
             <pc:sldMk cId="0" sldId="266"/>
@@ -702,7 +702,7 @@
           </ac:picMkLst>
         </pc:picChg>
         <pc:picChg chg="add mod">
-          <ac:chgData name="Osama Mohammed Moustafa Hosam Elde" userId="ab8f451e-a635-42ee-be12-e2dde55852bf" providerId="ADAL" clId="{B6D8E2E3-C58C-42AC-BD6D-A79F41996BB5}" dt="2020-02-16T20:03:58.605" v="421" actId="1076"/>
+          <ac:chgData name="Osama Mohammed Moustafa Hosam Elde" userId="ab8f451e-a635-42ee-be12-e2dde55852bf" providerId="ADAL" clId="{B6D8E2E3-C58C-42AC-BD6D-A79F41996BB5}" dt="2020-03-06T19:46:59.700" v="4110" actId="14100"/>
           <ac:picMkLst>
             <pc:docMk/>
             <pc:sldMk cId="0" sldId="266"/>
@@ -711,13 +711,13 @@
         </pc:picChg>
       </pc:sldChg>
       <pc:sldChg chg="addSp delSp modSp">
-        <pc:chgData name="Osama Mohammed Moustafa Hosam Elde" userId="ab8f451e-a635-42ee-be12-e2dde55852bf" providerId="ADAL" clId="{B6D8E2E3-C58C-42AC-BD6D-A79F41996BB5}" dt="2020-02-18T20:57:11.275" v="3723" actId="478"/>
+        <pc:chgData name="Osama Mohammed Moustafa Hosam Elde" userId="ab8f451e-a635-42ee-be12-e2dde55852bf" providerId="ADAL" clId="{B6D8E2E3-C58C-42AC-BD6D-A79F41996BB5}" dt="2020-03-06T20:22:39.519" v="4520" actId="14100"/>
         <pc:sldMkLst>
           <pc:docMk/>
           <pc:sldMk cId="0" sldId="267"/>
         </pc:sldMkLst>
-        <pc:spChg chg="add mod">
-          <ac:chgData name="Osama Mohammed Moustafa Hosam Elde" userId="ab8f451e-a635-42ee-be12-e2dde55852bf" providerId="ADAL" clId="{B6D8E2E3-C58C-42AC-BD6D-A79F41996BB5}" dt="2020-02-16T20:57:22.725" v="700" actId="207"/>
+        <pc:spChg chg="add del mod">
+          <ac:chgData name="Osama Mohammed Moustafa Hosam Elde" userId="ab8f451e-a635-42ee-be12-e2dde55852bf" providerId="ADAL" clId="{B6D8E2E3-C58C-42AC-BD6D-A79F41996BB5}" dt="2020-03-06T20:12:19.935" v="4186" actId="478"/>
           <ac:spMkLst>
             <pc:docMk/>
             <pc:sldMk cId="0" sldId="267"/>
@@ -725,7 +725,7 @@
           </ac:spMkLst>
         </pc:spChg>
         <pc:spChg chg="add mod">
-          <ac:chgData name="Osama Mohammed Moustafa Hosam Elde" userId="ab8f451e-a635-42ee-be12-e2dde55852bf" providerId="ADAL" clId="{B6D8E2E3-C58C-42AC-BD6D-A79F41996BB5}" dt="2020-02-16T20:40:27.997" v="499" actId="20577"/>
+          <ac:chgData name="Osama Mohammed Moustafa Hosam Elde" userId="ab8f451e-a635-42ee-be12-e2dde55852bf" providerId="ADAL" clId="{B6D8E2E3-C58C-42AC-BD6D-A79F41996BB5}" dt="2020-03-06T20:12:15.839" v="4185" actId="20577"/>
           <ac:spMkLst>
             <pc:docMk/>
             <pc:sldMk cId="0" sldId="267"/>
@@ -749,7 +749,7 @@
           </ac:spMkLst>
         </pc:spChg>
         <pc:spChg chg="add mod">
-          <ac:chgData name="Osama Mohammed Moustafa Hosam Elde" userId="ab8f451e-a635-42ee-be12-e2dde55852bf" providerId="ADAL" clId="{B6D8E2E3-C58C-42AC-BD6D-A79F41996BB5}" dt="2020-02-16T20:52:25.077" v="660" actId="1076"/>
+          <ac:chgData name="Osama Mohammed Moustafa Hosam Elde" userId="ab8f451e-a635-42ee-be12-e2dde55852bf" providerId="ADAL" clId="{B6D8E2E3-C58C-42AC-BD6D-A79F41996BB5}" dt="2020-03-06T20:22:06.752" v="4515" actId="1076"/>
           <ac:spMkLst>
             <pc:docMk/>
             <pc:sldMk cId="0" sldId="267"/>
@@ -770,6 +770,30 @@
             <pc:docMk/>
             <pc:sldMk cId="0" sldId="267"/>
             <ac:spMk id="19" creationId="{C0C53420-1E7A-4B66-8E8D-021E3BE393C9}"/>
+          </ac:spMkLst>
+        </pc:spChg>
+        <pc:spChg chg="add mod">
+          <ac:chgData name="Osama Mohammed Moustafa Hosam Elde" userId="ab8f451e-a635-42ee-be12-e2dde55852bf" providerId="ADAL" clId="{B6D8E2E3-C58C-42AC-BD6D-A79F41996BB5}" dt="2020-03-06T20:20:55.463" v="4512" actId="14100"/>
+          <ac:spMkLst>
+            <pc:docMk/>
+            <pc:sldMk cId="0" sldId="267"/>
+            <ac:spMk id="25" creationId="{2B93345C-0F0D-4A72-B1C0-41F7906B4645}"/>
+          </ac:spMkLst>
+        </pc:spChg>
+        <pc:spChg chg="add mod">
+          <ac:chgData name="Osama Mohammed Moustafa Hosam Elde" userId="ab8f451e-a635-42ee-be12-e2dde55852bf" providerId="ADAL" clId="{B6D8E2E3-C58C-42AC-BD6D-A79F41996BB5}" dt="2020-03-06T20:19:35.823" v="4424" actId="14100"/>
+          <ac:spMkLst>
+            <pc:docMk/>
+            <pc:sldMk cId="0" sldId="267"/>
+            <ac:spMk id="30" creationId="{39DF618B-650F-4494-80DF-AA71A17737DB}"/>
+          </ac:spMkLst>
+        </pc:spChg>
+        <pc:spChg chg="add mod">
+          <ac:chgData name="Osama Mohammed Moustafa Hosam Elde" userId="ab8f451e-a635-42ee-be12-e2dde55852bf" providerId="ADAL" clId="{B6D8E2E3-C58C-42AC-BD6D-A79F41996BB5}" dt="2020-03-06T20:17:01.906" v="4310" actId="404"/>
+          <ac:spMkLst>
+            <pc:docMk/>
+            <pc:sldMk cId="0" sldId="267"/>
+            <ac:spMk id="31" creationId="{984A4F76-9906-40AB-9C05-F092E3CE2242}"/>
           </ac:spMkLst>
         </pc:spChg>
         <pc:spChg chg="add del mod">
@@ -796,8 +820,8 @@
             <ac:picMk id="4" creationId="{F98504D6-F593-44E9-8B97-C8BBD8B7A6CF}"/>
           </ac:picMkLst>
         </pc:picChg>
-        <pc:picChg chg="add mod">
-          <ac:chgData name="Osama Mohammed Moustafa Hosam Elde" userId="ab8f451e-a635-42ee-be12-e2dde55852bf" providerId="ADAL" clId="{B6D8E2E3-C58C-42AC-BD6D-A79F41996BB5}" dt="2020-02-16T20:56:46.931" v="697" actId="1076"/>
+        <pc:picChg chg="add del mod">
+          <ac:chgData name="Osama Mohammed Moustafa Hosam Elde" userId="ab8f451e-a635-42ee-be12-e2dde55852bf" providerId="ADAL" clId="{B6D8E2E3-C58C-42AC-BD6D-A79F41996BB5}" dt="2020-03-06T20:10:54.233" v="4114" actId="478"/>
           <ac:picMkLst>
             <pc:docMk/>
             <pc:sldMk cId="0" sldId="267"/>
@@ -818,6 +842,14 @@
             <pc:docMk/>
             <pc:sldMk cId="0" sldId="267"/>
             <ac:picMk id="10" creationId="{B33E3436-FE8E-4D09-932E-3720A43DB9BF}"/>
+          </ac:picMkLst>
+        </pc:picChg>
+        <pc:picChg chg="add mod">
+          <ac:chgData name="Osama Mohammed Moustafa Hosam Elde" userId="ab8f451e-a635-42ee-be12-e2dde55852bf" providerId="ADAL" clId="{B6D8E2E3-C58C-42AC-BD6D-A79F41996BB5}" dt="2020-03-06T20:13:41.390" v="4189" actId="1076"/>
+          <ac:picMkLst>
+            <pc:docMk/>
+            <pc:sldMk cId="0" sldId="267"/>
+            <ac:picMk id="11" creationId="{99DA74EC-974D-4F37-BA02-BD0782BA2D25}"/>
           </ac:picMkLst>
         </pc:picChg>
         <pc:picChg chg="add del mod">
@@ -845,7 +877,7 @@
           </ac:picMkLst>
         </pc:picChg>
         <pc:picChg chg="add mod">
-          <ac:chgData name="Osama Mohammed Moustafa Hosam Elde" userId="ab8f451e-a635-42ee-be12-e2dde55852bf" providerId="ADAL" clId="{B6D8E2E3-C58C-42AC-BD6D-A79F41996BB5}" dt="2020-02-16T20:52:25.077" v="660" actId="1076"/>
+          <ac:chgData name="Osama Mohammed Moustafa Hosam Elde" userId="ab8f451e-a635-42ee-be12-e2dde55852bf" providerId="ADAL" clId="{B6D8E2E3-C58C-42AC-BD6D-A79F41996BB5}" dt="2020-03-06T20:22:06.752" v="4515" actId="1076"/>
           <ac:picMkLst>
             <pc:docMk/>
             <pc:sldMk cId="0" sldId="267"/>
@@ -853,7 +885,7 @@
           </ac:picMkLst>
         </pc:picChg>
         <pc:picChg chg="add mod">
-          <ac:chgData name="Osama Mohammed Moustafa Hosam Elde" userId="ab8f451e-a635-42ee-be12-e2dde55852bf" providerId="ADAL" clId="{B6D8E2E3-C58C-42AC-BD6D-A79F41996BB5}" dt="2020-02-16T20:52:38.108" v="662" actId="1076"/>
+          <ac:chgData name="Osama Mohammed Moustafa Hosam Elde" userId="ab8f451e-a635-42ee-be12-e2dde55852bf" providerId="ADAL" clId="{B6D8E2E3-C58C-42AC-BD6D-A79F41996BB5}" dt="2020-03-06T20:22:06.752" v="4515" actId="1076"/>
           <ac:picMkLst>
             <pc:docMk/>
             <pc:sldMk cId="0" sldId="267"/>
@@ -885,7 +917,39 @@
           </ac:picMkLst>
         </pc:picChg>
         <pc:picChg chg="add mod">
-          <ac:chgData name="Osama Mohammed Moustafa Hosam Elde" userId="ab8f451e-a635-42ee-be12-e2dde55852bf" providerId="ADAL" clId="{B6D8E2E3-C58C-42AC-BD6D-A79F41996BB5}" dt="2020-02-16T20:48:31.356" v="547" actId="1076"/>
+          <ac:chgData name="Osama Mohammed Moustafa Hosam Elde" userId="ab8f451e-a635-42ee-be12-e2dde55852bf" providerId="ADAL" clId="{B6D8E2E3-C58C-42AC-BD6D-A79F41996BB5}" dt="2020-03-06T20:20:15.055" v="4426" actId="14100"/>
+          <ac:picMkLst>
+            <pc:docMk/>
+            <pc:sldMk cId="0" sldId="267"/>
+            <ac:picMk id="24" creationId="{FEDA1FA8-B4CF-4094-8567-95CECD5A92B0}"/>
+          </ac:picMkLst>
+        </pc:picChg>
+        <pc:picChg chg="add mod">
+          <ac:chgData name="Osama Mohammed Moustafa Hosam Elde" userId="ab8f451e-a635-42ee-be12-e2dde55852bf" providerId="ADAL" clId="{B6D8E2E3-C58C-42AC-BD6D-A79F41996BB5}" dt="2020-03-06T20:11:33.661" v="4157" actId="571"/>
+          <ac:picMkLst>
+            <pc:docMk/>
+            <pc:sldMk cId="0" sldId="267"/>
+            <ac:picMk id="26" creationId="{07F6FD48-032A-4D81-83E9-A2F5A5104E47}"/>
+          </ac:picMkLst>
+        </pc:picChg>
+        <pc:picChg chg="add mod">
+          <ac:chgData name="Osama Mohammed Moustafa Hosam Elde" userId="ab8f451e-a635-42ee-be12-e2dde55852bf" providerId="ADAL" clId="{B6D8E2E3-C58C-42AC-BD6D-A79F41996BB5}" dt="2020-03-06T20:14:00.126" v="4194" actId="1076"/>
+          <ac:picMkLst>
+            <pc:docMk/>
+            <pc:sldMk cId="0" sldId="267"/>
+            <ac:picMk id="27" creationId="{5DFF966E-B329-491C-8550-EDC2D789B81A}"/>
+          </ac:picMkLst>
+        </pc:picChg>
+        <pc:picChg chg="add mod">
+          <ac:chgData name="Osama Mohammed Moustafa Hosam Elde" userId="ab8f451e-a635-42ee-be12-e2dde55852bf" providerId="ADAL" clId="{B6D8E2E3-C58C-42AC-BD6D-A79F41996BB5}" dt="2020-03-06T20:13:53.398" v="4191" actId="1076"/>
+          <ac:picMkLst>
+            <pc:docMk/>
+            <pc:sldMk cId="0" sldId="267"/>
+            <ac:picMk id="28" creationId="{BBABF1ED-4219-4020-99D0-44B935E3266D}"/>
+          </ac:picMkLst>
+        </pc:picChg>
+        <pc:picChg chg="add mod">
+          <ac:chgData name="Osama Mohammed Moustafa Hosam Elde" userId="ab8f451e-a635-42ee-be12-e2dde55852bf" providerId="ADAL" clId="{B6D8E2E3-C58C-42AC-BD6D-A79F41996BB5}" dt="2020-03-06T20:13:57.615" v="4193" actId="1076"/>
           <ac:picMkLst>
             <pc:docMk/>
             <pc:sldMk cId="0" sldId="267"/>
@@ -893,13 +957,37 @@
           </ac:picMkLst>
         </pc:picChg>
         <pc:picChg chg="add mod">
-          <ac:chgData name="Osama Mohammed Moustafa Hosam Elde" userId="ab8f451e-a635-42ee-be12-e2dde55852bf" providerId="ADAL" clId="{B6D8E2E3-C58C-42AC-BD6D-A79F41996BB5}" dt="2020-02-16T20:52:25.077" v="660" actId="1076"/>
+          <ac:chgData name="Osama Mohammed Moustafa Hosam Elde" userId="ab8f451e-a635-42ee-be12-e2dde55852bf" providerId="ADAL" clId="{B6D8E2E3-C58C-42AC-BD6D-A79F41996BB5}" dt="2020-03-06T20:22:39.519" v="4520" actId="14100"/>
           <ac:picMkLst>
             <pc:docMk/>
             <pc:sldMk cId="0" sldId="267"/>
             <ac:picMk id="1028" creationId="{DCF610E6-9DF4-47A7-B071-BA7284998852}"/>
           </ac:picMkLst>
         </pc:picChg>
+        <pc:cxnChg chg="add del mod">
+          <ac:chgData name="Osama Mohammed Moustafa Hosam Elde" userId="ab8f451e-a635-42ee-be12-e2dde55852bf" providerId="ADAL" clId="{B6D8E2E3-C58C-42AC-BD6D-A79F41996BB5}" dt="2020-03-06T20:21:55.260" v="4514" actId="11529"/>
+          <ac:cxnSpMkLst>
+            <pc:docMk/>
+            <pc:sldMk cId="0" sldId="267"/>
+            <ac:cxnSpMk id="23" creationId="{75930B46-ECFD-44C3-AC44-A859729DE22C}"/>
+          </ac:cxnSpMkLst>
+        </pc:cxnChg>
+        <pc:cxnChg chg="add mod">
+          <ac:chgData name="Osama Mohammed Moustafa Hosam Elde" userId="ab8f451e-a635-42ee-be12-e2dde55852bf" providerId="ADAL" clId="{B6D8E2E3-C58C-42AC-BD6D-A79F41996BB5}" dt="2020-03-06T20:22:35.937" v="4519" actId="14100"/>
+          <ac:cxnSpMkLst>
+            <pc:docMk/>
+            <pc:sldMk cId="0" sldId="267"/>
+            <ac:cxnSpMk id="32" creationId="{B4EA17E6-010C-4C95-B48F-1609A331D0CB}"/>
+          </ac:cxnSpMkLst>
+        </pc:cxnChg>
+        <pc:cxnChg chg="add mod">
+          <ac:chgData name="Osama Mohammed Moustafa Hosam Elde" userId="ab8f451e-a635-42ee-be12-e2dde55852bf" providerId="ADAL" clId="{B6D8E2E3-C58C-42AC-BD6D-A79F41996BB5}" dt="2020-03-06T20:22:27.511" v="4517" actId="11529"/>
+          <ac:cxnSpMkLst>
+            <pc:docMk/>
+            <pc:sldMk cId="0" sldId="267"/>
+            <ac:cxnSpMk id="34" creationId="{71644542-6604-4402-BBC6-96D7BED2797E}"/>
+          </ac:cxnSpMkLst>
+        </pc:cxnChg>
       </pc:sldChg>
       <pc:sldChg chg="addSp delSp modSp">
         <pc:chgData name="Osama Mohammed Moustafa Hosam Elde" userId="ab8f451e-a635-42ee-be12-e2dde55852bf" providerId="ADAL" clId="{B6D8E2E3-C58C-42AC-BD6D-A79F41996BB5}" dt="2020-02-24T14:28:50.250" v="3731" actId="1076"/>
@@ -11780,7 +11868,7 @@
                   <a:schemeClr val="bg2"/>
                 </a:solidFill>
               </a:rPr>
-              <a:t>Retrieve the corresponding preferences from DB</a:t>
+              <a:t>Retrieve the corresponding user ID from DB</a:t>
             </a:r>
           </a:p>
         </p:txBody>
@@ -11970,7 +12058,7 @@
                   <a:schemeClr val="bg2"/>
                 </a:solidFill>
               </a:rPr>
-              <a:t>Automatically Update Preferences</a:t>
+              <a:t>Automatically Respond to the User</a:t>
             </a:r>
           </a:p>
         </p:txBody>
@@ -11997,7 +12085,7 @@
         </p:blipFill>
         <p:spPr>
           <a:xfrm rot="10800000">
-            <a:off x="5956594" y="1484805"/>
+            <a:off x="5834047" y="1515929"/>
             <a:ext cx="428625" cy="114300"/>
           </a:xfrm>
           <a:prstGeom prst="rect">
@@ -12031,8 +12119,8 @@
         </p:blipFill>
         <p:spPr>
           <a:xfrm>
-            <a:off x="5468847" y="454344"/>
-            <a:ext cx="1239549" cy="558872"/>
+            <a:off x="4938281" y="454344"/>
+            <a:ext cx="2220158" cy="558872"/>
           </a:xfrm>
           <a:prstGeom prst="rect">
             <a:avLst/>
@@ -12053,8 +12141,8 @@
         </p:nvSpPr>
         <p:spPr>
           <a:xfrm>
-            <a:off x="5597236" y="528186"/>
-            <a:ext cx="969819" cy="424581"/>
+            <a:off x="5160818" y="528186"/>
+            <a:ext cx="1835727" cy="424581"/>
           </a:xfrm>
           <a:prstGeom prst="rect">
             <a:avLst/>
@@ -12091,7 +12179,7 @@
                   <a:schemeClr val="bg2"/>
                 </a:solidFill>
               </a:rPr>
-              <a:t>Deliver to User</a:t>
+              <a:t>Signals to confirm user ID</a:t>
             </a:r>
           </a:p>
         </p:txBody>
@@ -12241,7 +12329,7 @@
         </p:blipFill>
         <p:spPr bwMode="auto">
           <a:xfrm>
-            <a:off x="4433832" y="3553281"/>
+            <a:off x="4217775" y="3597230"/>
             <a:ext cx="1750717" cy="1235800"/>
           </a:xfrm>
           <a:prstGeom prst="rect">
@@ -12345,73 +12433,7 @@
                   <a:schemeClr val="bg2"/>
                 </a:solidFill>
               </a:rPr>
-              <a:t>Car with sensors</a:t>
-            </a:r>
-          </a:p>
-        </p:txBody>
-      </p:sp>
-      <p:sp>
-        <p:nvSpPr>
-          <p:cNvPr id="2" name="Cylinder 1">
-            <a:extLst>
-              <a:ext uri="{FF2B5EF4-FFF2-40B4-BE49-F238E27FC236}">
-                <a16:creationId xmlns:a16="http://schemas.microsoft.com/office/drawing/2014/main" id="{35ABDFFA-6AB7-4E1B-800D-6BEE4DD8EB6D}"/>
-              </a:ext>
-            </a:extLst>
-          </p:cNvPr>
-          <p:cNvSpPr/>
-          <p:nvPr/>
-        </p:nvSpPr>
-        <p:spPr>
-          <a:xfrm>
-            <a:off x="1157814" y="3664088"/>
-            <a:ext cx="921488" cy="1098698"/>
-          </a:xfrm>
-          <a:prstGeom prst="can">
-            <a:avLst>
-              <a:gd name="adj" fmla="val 34231"/>
-            </a:avLst>
-          </a:prstGeom>
-          <a:solidFill>
-            <a:schemeClr val="tx2">
-              <a:lumMod val="40000"/>
-              <a:lumOff val="60000"/>
-            </a:schemeClr>
-          </a:solidFill>
-          <a:ln>
-            <a:solidFill>
-              <a:schemeClr val="bg2"/>
-            </a:solidFill>
-          </a:ln>
-        </p:spPr>
-        <p:style>
-          <a:lnRef idx="2">
-            <a:schemeClr val="accent1">
-              <a:shade val="50000"/>
-            </a:schemeClr>
-          </a:lnRef>
-          <a:fillRef idx="1">
-            <a:schemeClr val="accent1"/>
-          </a:fillRef>
-          <a:effectRef idx="0">
-            <a:schemeClr val="accent1"/>
-          </a:effectRef>
-          <a:fontRef idx="minor">
-            <a:schemeClr val="lt1"/>
-          </a:fontRef>
-        </p:style>
-        <p:txBody>
-          <a:bodyPr rtlCol="0" anchor="ctr"/>
-          <a:lstStyle/>
-          <a:p>
-            <a:pPr algn="ctr"/>
-            <a:r>
-              <a:rPr lang="en-US" dirty="0">
-                <a:solidFill>
-                  <a:schemeClr val="bg2"/>
-                </a:solidFill>
-              </a:rPr>
-              <a:t>DB</a:t>
+              <a:t>Car fleet with sensors</a:t>
             </a:r>
           </a:p>
         </p:txBody>
@@ -12674,8 +12696,8 @@
         </p:blipFill>
         <p:spPr bwMode="auto">
           <a:xfrm>
-            <a:off x="3420966" y="173182"/>
-            <a:ext cx="968594" cy="603666"/>
+            <a:off x="2777219" y="100992"/>
+            <a:ext cx="1218125" cy="759184"/>
           </a:xfrm>
           <a:prstGeom prst="rect">
             <a:avLst/>
@@ -12706,7 +12728,7 @@
         </p:nvSpPr>
         <p:spPr>
           <a:xfrm>
-            <a:off x="2803021" y="730849"/>
+            <a:off x="2777219" y="1063208"/>
             <a:ext cx="2204484" cy="424581"/>
           </a:xfrm>
           <a:prstGeom prst="rect">
@@ -12771,7 +12793,7 @@
         </p:blipFill>
         <p:spPr>
           <a:xfrm>
-            <a:off x="3690950" y="1041130"/>
+            <a:off x="3665149" y="985244"/>
             <a:ext cx="428625" cy="114300"/>
           </a:xfrm>
           <a:prstGeom prst="rect">
@@ -12805,7 +12827,7 @@
         </p:blipFill>
         <p:spPr>
           <a:xfrm>
-            <a:off x="3690949" y="1444318"/>
+            <a:off x="3648573" y="1479685"/>
             <a:ext cx="428625" cy="163962"/>
           </a:xfrm>
           <a:prstGeom prst="rect">
@@ -13066,10 +13088,10 @@
       </p:sp>
       <p:pic>
         <p:nvPicPr>
-          <p:cNvPr id="7" name="Picture 6">
+          <p:cNvPr id="24" name="Picture 23">
             <a:extLst>
               <a:ext uri="{FF2B5EF4-FFF2-40B4-BE49-F238E27FC236}">
-                <a16:creationId xmlns:a16="http://schemas.microsoft.com/office/drawing/2014/main" id="{CEF821E8-734A-4B05-ADBE-7550091422C2}"/>
+                <a16:creationId xmlns:a16="http://schemas.microsoft.com/office/drawing/2014/main" id="{FEDA1FA8-B4CF-4094-8567-95CECD5A92B0}"/>
               </a:ext>
             </a:extLst>
           </p:cNvPr>
@@ -13086,14 +13108,423 @@
         </p:blipFill>
         <p:spPr>
           <a:xfrm>
-            <a:off x="6045738" y="565289"/>
-            <a:ext cx="367468" cy="530118"/>
+            <a:off x="4121727" y="343122"/>
+            <a:ext cx="3834809" cy="558872"/>
           </a:xfrm>
           <a:prstGeom prst="rect">
             <a:avLst/>
           </a:prstGeom>
         </p:spPr>
       </p:pic>
+      <p:sp>
+        <p:nvSpPr>
+          <p:cNvPr id="25" name="Rectangle 24">
+            <a:extLst>
+              <a:ext uri="{FF2B5EF4-FFF2-40B4-BE49-F238E27FC236}">
+                <a16:creationId xmlns:a16="http://schemas.microsoft.com/office/drawing/2014/main" id="{2B93345C-0F0D-4A72-B1C0-41F7906B4645}"/>
+              </a:ext>
+            </a:extLst>
+          </p:cNvPr>
+          <p:cNvSpPr/>
+          <p:nvPr/>
+        </p:nvSpPr>
+        <p:spPr>
+          <a:xfrm>
+            <a:off x="4468091" y="416964"/>
+            <a:ext cx="3332018" cy="424581"/>
+          </a:xfrm>
+          <a:prstGeom prst="rect">
+            <a:avLst/>
+          </a:prstGeom>
+          <a:noFill/>
+          <a:ln>
+            <a:noFill/>
+          </a:ln>
+        </p:spPr>
+        <p:style>
+          <a:lnRef idx="2">
+            <a:schemeClr val="accent1">
+              <a:shade val="50000"/>
+            </a:schemeClr>
+          </a:lnRef>
+          <a:fillRef idx="1">
+            <a:schemeClr val="accent1"/>
+          </a:fillRef>
+          <a:effectRef idx="0">
+            <a:schemeClr val="accent1"/>
+          </a:effectRef>
+          <a:fontRef idx="minor">
+            <a:schemeClr val="lt1"/>
+          </a:fontRef>
+        </p:style>
+        <p:txBody>
+          <a:bodyPr rtlCol="0" anchor="ctr"/>
+          <a:lstStyle/>
+          <a:p>
+            <a:pPr algn="ctr"/>
+            <a:r>
+              <a:rPr lang="en-US" dirty="0">
+                <a:solidFill>
+                  <a:schemeClr val="bg2"/>
+                </a:solidFill>
+              </a:rPr>
+              <a:t>Car Owner see red lights on car screen, lights are originally green colored</a:t>
+            </a:r>
+          </a:p>
+        </p:txBody>
+      </p:sp>
+      <p:pic>
+        <p:nvPicPr>
+          <p:cNvPr id="26" name="Google Shape;164;p21">
+            <a:extLst>
+              <a:ext uri="{FF2B5EF4-FFF2-40B4-BE49-F238E27FC236}">
+                <a16:creationId xmlns:a16="http://schemas.microsoft.com/office/drawing/2014/main" id="{07F6FD48-032A-4D81-83E9-A2F5A5104E47}"/>
+              </a:ext>
+            </a:extLst>
+          </p:cNvPr>
+          <p:cNvPicPr preferRelativeResize="0"/>
+          <p:nvPr/>
+        </p:nvPicPr>
+        <p:blipFill>
+          <a:blip r:embed="rId9">
+            <a:alphaModFix/>
+          </a:blip>
+          <a:stretch>
+            <a:fillRect/>
+          </a:stretch>
+        </p:blipFill>
+        <p:spPr>
+          <a:xfrm rot="10800000">
+            <a:off x="6045738" y="942197"/>
+            <a:ext cx="428625" cy="163962"/>
+          </a:xfrm>
+          <a:prstGeom prst="rect">
+            <a:avLst/>
+          </a:prstGeom>
+          <a:noFill/>
+          <a:ln>
+            <a:noFill/>
+          </a:ln>
+        </p:spPr>
+      </p:pic>
+      <p:pic>
+        <p:nvPicPr>
+          <p:cNvPr id="27" name="Picture 2" descr="نتيجة بحث الصور عن car with sensors all around drawing">
+            <a:extLst>
+              <a:ext uri="{FF2B5EF4-FFF2-40B4-BE49-F238E27FC236}">
+                <a16:creationId xmlns:a16="http://schemas.microsoft.com/office/drawing/2014/main" id="{5DFF966E-B329-491C-8550-EDC2D789B81A}"/>
+              </a:ext>
+            </a:extLst>
+          </p:cNvPr>
+          <p:cNvPicPr>
+            <a:picLocks noChangeAspect="1" noChangeArrowheads="1"/>
+          </p:cNvPicPr>
+          <p:nvPr/>
+        </p:nvPicPr>
+        <p:blipFill>
+          <a:blip r:embed="rId4">
+            <a:extLst>
+              <a:ext uri="{28A0092B-C50C-407E-A947-70E740481C1C}">
+                <a14:useLocalDpi xmlns:a14="http://schemas.microsoft.com/office/drawing/2010/main" val="0"/>
+              </a:ext>
+            </a:extLst>
+          </a:blip>
+          <a:srcRect/>
+          <a:stretch>
+            <a:fillRect/>
+          </a:stretch>
+        </p:blipFill>
+        <p:spPr bwMode="auto">
+          <a:xfrm>
+            <a:off x="5093133" y="3507525"/>
+            <a:ext cx="1750717" cy="1235800"/>
+          </a:xfrm>
+          <a:prstGeom prst="rect">
+            <a:avLst/>
+          </a:prstGeom>
+          <a:noFill/>
+          <a:extLst>
+            <a:ext uri="{909E8E84-426E-40DD-AFC4-6F175D3DCCD1}">
+              <a14:hiddenFill xmlns:a14="http://schemas.microsoft.com/office/drawing/2010/main">
+                <a:solidFill>
+                  <a:srgbClr val="FFFFFF"/>
+                </a:solidFill>
+              </a14:hiddenFill>
+            </a:ext>
+          </a:extLst>
+        </p:spPr>
+      </p:pic>
+      <p:pic>
+        <p:nvPicPr>
+          <p:cNvPr id="28" name="Picture 2" descr="نتيجة بحث الصور عن car with sensors all around drawing">
+            <a:extLst>
+              <a:ext uri="{FF2B5EF4-FFF2-40B4-BE49-F238E27FC236}">
+                <a16:creationId xmlns:a16="http://schemas.microsoft.com/office/drawing/2014/main" id="{BBABF1ED-4219-4020-99D0-44B935E3266D}"/>
+              </a:ext>
+            </a:extLst>
+          </p:cNvPr>
+          <p:cNvPicPr>
+            <a:picLocks noChangeAspect="1" noChangeArrowheads="1"/>
+          </p:cNvPicPr>
+          <p:nvPr/>
+        </p:nvPicPr>
+        <p:blipFill>
+          <a:blip r:embed="rId4">
+            <a:extLst>
+              <a:ext uri="{28A0092B-C50C-407E-A947-70E740481C1C}">
+                <a14:useLocalDpi xmlns:a14="http://schemas.microsoft.com/office/drawing/2010/main" val="0"/>
+              </a:ext>
+            </a:extLst>
+          </a:blip>
+          <a:srcRect/>
+          <a:stretch>
+            <a:fillRect/>
+          </a:stretch>
+        </p:blipFill>
+        <p:spPr bwMode="auto">
+          <a:xfrm>
+            <a:off x="5833060" y="3376673"/>
+            <a:ext cx="1750717" cy="1235800"/>
+          </a:xfrm>
+          <a:prstGeom prst="rect">
+            <a:avLst/>
+          </a:prstGeom>
+          <a:noFill/>
+          <a:extLst>
+            <a:ext uri="{909E8E84-426E-40DD-AFC4-6F175D3DCCD1}">
+              <a14:hiddenFill xmlns:a14="http://schemas.microsoft.com/office/drawing/2010/main">
+                <a:solidFill>
+                  <a:srgbClr val="FFFFFF"/>
+                </a:solidFill>
+              </a14:hiddenFill>
+            </a:ext>
+          </a:extLst>
+        </p:spPr>
+      </p:pic>
+      <p:pic>
+        <p:nvPicPr>
+          <p:cNvPr id="11" name="Picture 10">
+            <a:extLst>
+              <a:ext uri="{FF2B5EF4-FFF2-40B4-BE49-F238E27FC236}">
+                <a16:creationId xmlns:a16="http://schemas.microsoft.com/office/drawing/2014/main" id="{99DA74EC-974D-4F37-BA02-BD0782BA2D25}"/>
+              </a:ext>
+            </a:extLst>
+          </p:cNvPr>
+          <p:cNvPicPr>
+            <a:picLocks noChangeAspect="1"/>
+          </p:cNvPicPr>
+          <p:nvPr/>
+        </p:nvPicPr>
+        <p:blipFill>
+          <a:blip r:embed="rId11"/>
+          <a:stretch>
+            <a:fillRect/>
+          </a:stretch>
+        </p:blipFill>
+        <p:spPr>
+          <a:xfrm>
+            <a:off x="990928" y="3597230"/>
+            <a:ext cx="1332880" cy="906989"/>
+          </a:xfrm>
+          <a:prstGeom prst="rect">
+            <a:avLst/>
+          </a:prstGeom>
+        </p:spPr>
+      </p:pic>
+      <p:sp>
+        <p:nvSpPr>
+          <p:cNvPr id="30" name="Rectangle 29">
+            <a:extLst>
+              <a:ext uri="{FF2B5EF4-FFF2-40B4-BE49-F238E27FC236}">
+                <a16:creationId xmlns:a16="http://schemas.microsoft.com/office/drawing/2014/main" id="{39DF618B-650F-4494-80DF-AA71A17737DB}"/>
+              </a:ext>
+            </a:extLst>
+          </p:cNvPr>
+          <p:cNvSpPr/>
+          <p:nvPr/>
+        </p:nvSpPr>
+        <p:spPr>
+          <a:xfrm>
+            <a:off x="120835" y="471862"/>
+            <a:ext cx="2564558" cy="424581"/>
+          </a:xfrm>
+          <a:prstGeom prst="rect">
+            <a:avLst/>
+          </a:prstGeom>
+          <a:noFill/>
+          <a:ln>
+            <a:noFill/>
+          </a:ln>
+        </p:spPr>
+        <p:style>
+          <a:lnRef idx="2">
+            <a:schemeClr val="accent1">
+              <a:shade val="50000"/>
+            </a:schemeClr>
+          </a:lnRef>
+          <a:fillRef idx="1">
+            <a:schemeClr val="accent1"/>
+          </a:fillRef>
+          <a:effectRef idx="0">
+            <a:schemeClr val="accent1"/>
+          </a:effectRef>
+          <a:fontRef idx="minor">
+            <a:schemeClr val="lt1"/>
+          </a:fontRef>
+        </p:style>
+        <p:txBody>
+          <a:bodyPr rtlCol="0" anchor="ctr"/>
+          <a:lstStyle/>
+          <a:p>
+            <a:pPr algn="ctr"/>
+            <a:r>
+              <a:rPr lang="en-US" sz="1100" dirty="0">
+                <a:solidFill>
+                  <a:schemeClr val="bg2"/>
+                </a:solidFill>
+              </a:rPr>
+              <a:t>Car user maybe asked to contact cloud from within the car to update latest regression formula</a:t>
+            </a:r>
+          </a:p>
+        </p:txBody>
+      </p:sp>
+      <p:sp>
+        <p:nvSpPr>
+          <p:cNvPr id="31" name="Rectangle 30">
+            <a:extLst>
+              <a:ext uri="{FF2B5EF4-FFF2-40B4-BE49-F238E27FC236}">
+                <a16:creationId xmlns:a16="http://schemas.microsoft.com/office/drawing/2014/main" id="{984A4F76-9906-40AB-9C05-F092E3CE2242}"/>
+              </a:ext>
+            </a:extLst>
+          </p:cNvPr>
+          <p:cNvSpPr/>
+          <p:nvPr/>
+        </p:nvSpPr>
+        <p:spPr>
+          <a:xfrm>
+            <a:off x="41540" y="4551648"/>
+            <a:ext cx="2458525" cy="424581"/>
+          </a:xfrm>
+          <a:prstGeom prst="rect">
+            <a:avLst/>
+          </a:prstGeom>
+          <a:noFill/>
+          <a:ln>
+            <a:noFill/>
+          </a:ln>
+        </p:spPr>
+        <p:style>
+          <a:lnRef idx="2">
+            <a:schemeClr val="accent1">
+              <a:shade val="50000"/>
+            </a:schemeClr>
+          </a:lnRef>
+          <a:fillRef idx="1">
+            <a:schemeClr val="accent1"/>
+          </a:fillRef>
+          <a:effectRef idx="0">
+            <a:schemeClr val="accent1"/>
+          </a:effectRef>
+          <a:fontRef idx="minor">
+            <a:schemeClr val="lt1"/>
+          </a:fontRef>
+        </p:style>
+        <p:txBody>
+          <a:bodyPr rtlCol="0" anchor="ctr"/>
+          <a:lstStyle/>
+          <a:p>
+            <a:pPr algn="ctr"/>
+            <a:r>
+              <a:rPr lang="en-US" sz="1100" dirty="0">
+                <a:solidFill>
+                  <a:schemeClr val="bg2"/>
+                </a:solidFill>
+              </a:rPr>
+              <a:t>IoT is used in this scheme, sensor data is sent to the cloud for analysis</a:t>
+            </a:r>
+          </a:p>
+        </p:txBody>
+      </p:sp>
+      <p:cxnSp>
+        <p:nvCxnSpPr>
+          <p:cNvPr id="32" name="Straight Arrow Connector 31">
+            <a:extLst>
+              <a:ext uri="{FF2B5EF4-FFF2-40B4-BE49-F238E27FC236}">
+                <a16:creationId xmlns:a16="http://schemas.microsoft.com/office/drawing/2014/main" id="{B4EA17E6-010C-4C95-B48F-1609A331D0CB}"/>
+              </a:ext>
+            </a:extLst>
+          </p:cNvPr>
+          <p:cNvCxnSpPr>
+            <a:cxnSpLocks/>
+          </p:cNvCxnSpPr>
+          <p:nvPr/>
+        </p:nvCxnSpPr>
+        <p:spPr>
+          <a:xfrm>
+            <a:off x="3057692" y="717354"/>
+            <a:ext cx="177344" cy="926293"/>
+          </a:xfrm>
+          <a:prstGeom prst="straightConnector1">
+            <a:avLst/>
+          </a:prstGeom>
+          <a:ln>
+            <a:tailEnd type="triangle"/>
+          </a:ln>
+        </p:spPr>
+        <p:style>
+          <a:lnRef idx="1">
+            <a:schemeClr val="accent1"/>
+          </a:lnRef>
+          <a:fillRef idx="0">
+            <a:schemeClr val="accent1"/>
+          </a:fillRef>
+          <a:effectRef idx="0">
+            <a:schemeClr val="accent1"/>
+          </a:effectRef>
+          <a:fontRef idx="minor">
+            <a:schemeClr val="tx1"/>
+          </a:fontRef>
+        </p:style>
+      </p:cxnSp>
+      <p:cxnSp>
+        <p:nvCxnSpPr>
+          <p:cNvPr id="34" name="Straight Arrow Connector 33">
+            <a:extLst>
+              <a:ext uri="{FF2B5EF4-FFF2-40B4-BE49-F238E27FC236}">
+                <a16:creationId xmlns:a16="http://schemas.microsoft.com/office/drawing/2014/main" id="{71644542-6604-4402-BBC6-96D7BED2797E}"/>
+              </a:ext>
+            </a:extLst>
+          </p:cNvPr>
+          <p:cNvCxnSpPr/>
+          <p:nvPr/>
+        </p:nvCxnSpPr>
+        <p:spPr>
+          <a:xfrm flipH="1" flipV="1">
+            <a:off x="2929572" y="644236"/>
+            <a:ext cx="187701" cy="999411"/>
+          </a:xfrm>
+          <a:prstGeom prst="straightConnector1">
+            <a:avLst/>
+          </a:prstGeom>
+          <a:ln>
+            <a:tailEnd type="triangle"/>
+          </a:ln>
+        </p:spPr>
+        <p:style>
+          <a:lnRef idx="1">
+            <a:schemeClr val="accent1"/>
+          </a:lnRef>
+          <a:fillRef idx="0">
+            <a:schemeClr val="accent1"/>
+          </a:fillRef>
+          <a:effectRef idx="0">
+            <a:schemeClr val="accent1"/>
+          </a:effectRef>
+          <a:fontRef idx="minor">
+            <a:schemeClr val="tx1"/>
+          </a:fontRef>
+        </p:style>
+      </p:cxnSp>
     </p:spTree>
   </p:cSld>
   <p:clrMapOvr>
@@ -15793,22 +16224,6 @@
             </a:pPr>
             <a:endParaRPr lang="en" sz="3600" dirty="0"/>
           </a:p>
-          <a:p>
-            <a:pPr marL="0" lvl="0" indent="0" algn="l" rtl="0">
-              <a:spcBef>
-                <a:spcPts val="0"/>
-              </a:spcBef>
-              <a:spcAft>
-                <a:spcPts val="0"/>
-              </a:spcAft>
-              <a:buNone/>
-            </a:pPr>
-            <a:r>
-              <a:rPr lang="en" sz="3600"/>
-              <a:t>Osama</a:t>
-            </a:r>
-            <a:endParaRPr sz="3600"/>
-          </a:p>
         </p:txBody>
       </p:sp>
     </p:spTree>
@@ -20525,7 +20940,7 @@
                 <a:cs typeface="Open Sans"/>
                 <a:sym typeface="Open Sans"/>
               </a:rPr>
-              <a:t>Optimal tax strategy predictor</a:t>
+              <a:t>Recruiting Screener</a:t>
             </a:r>
             <a:endParaRPr sz="1050" dirty="0">
               <a:solidFill>
@@ -21176,7 +21591,7 @@
         </p:nvSpPr>
         <p:spPr>
           <a:xfrm>
-            <a:off x="3262285" y="1280160"/>
+            <a:off x="3124262" y="1680200"/>
             <a:ext cx="345000" cy="338400"/>
           </a:xfrm>
           <a:prstGeom prst="ellipse">
@@ -21255,7 +21670,7 @@
         </p:nvSpPr>
         <p:spPr>
           <a:xfrm>
-            <a:off x="2687411" y="3011350"/>
+            <a:off x="3421350" y="2717864"/>
             <a:ext cx="345000" cy="338400"/>
           </a:xfrm>
           <a:prstGeom prst="ellipse">
@@ -21336,14 +21751,14 @@
         </p:nvSpPr>
         <p:spPr>
           <a:xfrm>
-            <a:off x="3262285" y="2277800"/>
+            <a:off x="3120262" y="2098120"/>
             <a:ext cx="345000" cy="338400"/>
           </a:xfrm>
           <a:prstGeom prst="ellipse">
             <a:avLst/>
           </a:prstGeom>
           <a:solidFill>
-            <a:schemeClr val="dk1"/>
+            <a:schemeClr val="tx1"/>
           </a:solidFill>
           <a:ln w="9525" cap="flat" cmpd="sng">
             <a:solidFill>
@@ -21371,7 +21786,7 @@
               <a:buNone/>
             </a:pPr>
             <a:r>
-              <a:rPr lang="en" sz="900">
+              <a:rPr lang="en" sz="900" dirty="0">
                 <a:solidFill>
                   <a:srgbClr val="FFFFFF"/>
                 </a:solidFill>
@@ -21379,21 +21794,21 @@
               <a:t>UC</a:t>
             </a:r>
             <a:br>
-              <a:rPr lang="en" sz="900">
+              <a:rPr lang="en" sz="900" dirty="0">
                 <a:solidFill>
                   <a:srgbClr val="FFFFFF"/>
                 </a:solidFill>
               </a:rPr>
             </a:br>
             <a:r>
-              <a:rPr lang="en" sz="900">
+              <a:rPr lang="en" sz="900" dirty="0">
                 <a:solidFill>
                   <a:srgbClr val="FFFFFF"/>
                 </a:solidFill>
               </a:rPr>
               <a:t>3</a:t>
             </a:r>
-            <a:endParaRPr sz="900">
+            <a:endParaRPr sz="900" dirty="0">
               <a:solidFill>
                 <a:srgbClr val="FFFFFF"/>
               </a:solidFill>
@@ -21415,7 +21830,7 @@
         </p:nvSpPr>
         <p:spPr>
           <a:xfrm>
-            <a:off x="3772136" y="1780092"/>
+            <a:off x="3523050" y="1660481"/>
             <a:ext cx="345000" cy="338400"/>
           </a:xfrm>
           <a:prstGeom prst="ellipse">
@@ -21494,20 +21909,18 @@
         </p:nvSpPr>
         <p:spPr>
           <a:xfrm>
-            <a:off x="2650383" y="2260450"/>
+            <a:off x="2775262" y="2602093"/>
             <a:ext cx="345000" cy="338400"/>
           </a:xfrm>
           <a:prstGeom prst="ellipse">
             <a:avLst/>
           </a:prstGeom>
           <a:solidFill>
-            <a:schemeClr val="accent4">
-              <a:lumMod val="50000"/>
-            </a:schemeClr>
+            <a:schemeClr val="tx2"/>
           </a:solidFill>
           <a:ln w="9525" cap="flat" cmpd="sng">
             <a:solidFill>
-              <a:srgbClr val="666666"/>
+              <a:schemeClr val="tx2"/>
             </a:solidFill>
             <a:prstDash val="solid"/>
             <a:round/>
@@ -21531,7 +21944,7 @@
               <a:buNone/>
             </a:pPr>
             <a:r>
-              <a:rPr lang="en" sz="900">
+              <a:rPr lang="en" sz="900" dirty="0">
                 <a:solidFill>
                   <a:srgbClr val="FFFFFF"/>
                 </a:solidFill>
@@ -21539,21 +21952,21 @@
               <a:t>UC</a:t>
             </a:r>
             <a:br>
-              <a:rPr lang="en" sz="900">
+              <a:rPr lang="en" sz="900" dirty="0">
                 <a:solidFill>
                   <a:srgbClr val="FFFFFF"/>
                 </a:solidFill>
               </a:rPr>
             </a:br>
             <a:r>
-              <a:rPr lang="en" sz="900">
+              <a:rPr lang="en" sz="900" dirty="0">
                 <a:solidFill>
                   <a:srgbClr val="FFFFFF"/>
                 </a:solidFill>
               </a:rPr>
               <a:t>5</a:t>
             </a:r>
-            <a:endParaRPr sz="900">
+            <a:endParaRPr sz="900" dirty="0">
               <a:solidFill>
                 <a:srgbClr val="FFFFFF"/>
               </a:solidFill>

</xml_diff>

<commit_message>
finished all the required updates from reviewrs
</commit_message>
<xml_diff>
--- a/02_project-steps-aibl.pptx
+++ b/02_project-steps-aibl.pptx
@@ -310,7 +310,7 @@
 <file path=ppt/revisionInfo.xml><?xml version="1.0" encoding="utf-8"?>
 <p1510:revInfo xmlns:a="http://schemas.openxmlformats.org/drawingml/2006/main" xmlns:r="http://schemas.openxmlformats.org/officeDocument/2006/relationships" xmlns:p1510="http://schemas.microsoft.com/office/powerpoint/2015/10/main">
   <p1510:revLst>
-    <p1510:client id="{B6D8E2E3-C58C-42AC-BD6D-A79F41996BB5}" v="128" dt="2020-03-06T20:22:39.520"/>
+    <p1510:client id="{B6D8E2E3-C58C-42AC-BD6D-A79F41996BB5}" v="141" dt="2020-03-09T19:55:27.141"/>
   </p1510:revLst>
 </p1510:revInfo>
 </file>
@@ -320,7 +320,7 @@
   <pc:docChgLst>
     <pc:chgData name="Osama Mohammed Moustafa Hosam Elde" userId="ab8f451e-a635-42ee-be12-e2dde55852bf" providerId="ADAL" clId="{B6D8E2E3-C58C-42AC-BD6D-A79F41996BB5}"/>
     <pc:docChg chg="undo custSel modSld">
-      <pc:chgData name="Osama Mohammed Moustafa Hosam Elde" userId="ab8f451e-a635-42ee-be12-e2dde55852bf" providerId="ADAL" clId="{B6D8E2E3-C58C-42AC-BD6D-A79F41996BB5}" dt="2020-03-06T20:22:39.519" v="4520" actId="14100"/>
+      <pc:chgData name="Osama Mohammed Moustafa Hosam Elde" userId="ab8f451e-a635-42ee-be12-e2dde55852bf" providerId="ADAL" clId="{B6D8E2E3-C58C-42AC-BD6D-A79F41996BB5}" dt="2020-03-09T20:09:22.049" v="5106" actId="20577"/>
       <pc:docMkLst>
         <pc:docMk/>
       </pc:docMkLst>
@@ -990,7 +990,7 @@
         </pc:cxnChg>
       </pc:sldChg>
       <pc:sldChg chg="addSp delSp modSp">
-        <pc:chgData name="Osama Mohammed Moustafa Hosam Elde" userId="ab8f451e-a635-42ee-be12-e2dde55852bf" providerId="ADAL" clId="{B6D8E2E3-C58C-42AC-BD6D-A79F41996BB5}" dt="2020-02-24T14:28:50.250" v="3731" actId="1076"/>
+        <pc:chgData name="Osama Mohammed Moustafa Hosam Elde" userId="ab8f451e-a635-42ee-be12-e2dde55852bf" providerId="ADAL" clId="{B6D8E2E3-C58C-42AC-BD6D-A79F41996BB5}" dt="2020-03-09T19:32:04.997" v="4521"/>
         <pc:sldMkLst>
           <pc:docMk/>
           <pc:sldMk cId="0" sldId="271"/>
@@ -1036,7 +1036,7 @@
           </ac:spMkLst>
         </pc:spChg>
         <pc:spChg chg="add mod">
-          <ac:chgData name="Osama Mohammed Moustafa Hosam Elde" userId="ab8f451e-a635-42ee-be12-e2dde55852bf" providerId="ADAL" clId="{B6D8E2E3-C58C-42AC-BD6D-A79F41996BB5}" dt="2020-02-18T18:24:53.196" v="2875" actId="1036"/>
+          <ac:chgData name="Osama Mohammed Moustafa Hosam Elde" userId="ab8f451e-a635-42ee-be12-e2dde55852bf" providerId="ADAL" clId="{B6D8E2E3-C58C-42AC-BD6D-A79F41996BB5}" dt="2020-03-09T19:32:04.997" v="4521"/>
           <ac:spMkLst>
             <pc:docMk/>
             <pc:sldMk cId="0" sldId="271"/>
@@ -1117,11 +1117,19 @@
         </pc:spChg>
       </pc:sldChg>
       <pc:sldChg chg="addSp delSp modSp">
-        <pc:chgData name="Osama Mohammed Moustafa Hosam Elde" userId="ab8f451e-a635-42ee-be12-e2dde55852bf" providerId="ADAL" clId="{B6D8E2E3-C58C-42AC-BD6D-A79F41996BB5}" dt="2020-03-05T19:50:13.517" v="4002" actId="20577"/>
+        <pc:chgData name="Osama Mohammed Moustafa Hosam Elde" userId="ab8f451e-a635-42ee-be12-e2dde55852bf" providerId="ADAL" clId="{B6D8E2E3-C58C-42AC-BD6D-A79F41996BB5}" dt="2020-03-09T19:32:36.559" v="4558" actId="20577"/>
         <pc:sldMkLst>
           <pc:docMk/>
           <pc:sldMk cId="0" sldId="276"/>
         </pc:sldMkLst>
+        <pc:spChg chg="mod">
+          <ac:chgData name="Osama Mohammed Moustafa Hosam Elde" userId="ab8f451e-a635-42ee-be12-e2dde55852bf" providerId="ADAL" clId="{B6D8E2E3-C58C-42AC-BD6D-A79F41996BB5}" dt="2020-03-09T19:32:36.559" v="4558" actId="20577"/>
+          <ac:spMkLst>
+            <pc:docMk/>
+            <pc:sldMk cId="0" sldId="276"/>
+            <ac:spMk id="259" creationId="{00000000-0000-0000-0000-000000000000}"/>
+          </ac:spMkLst>
+        </pc:spChg>
         <pc:spChg chg="mod">
           <ac:chgData name="Osama Mohammed Moustafa Hosam Elde" userId="ab8f451e-a635-42ee-be12-e2dde55852bf" providerId="ADAL" clId="{B6D8E2E3-C58C-42AC-BD6D-A79F41996BB5}" dt="2020-03-05T19:50:13.517" v="4002" actId="20577"/>
           <ac:spMkLst>
@@ -1140,11 +1148,19 @@
         </pc:picChg>
       </pc:sldChg>
       <pc:sldChg chg="addSp delSp modSp">
-        <pc:chgData name="Osama Mohammed Moustafa Hosam Elde" userId="ab8f451e-a635-42ee-be12-e2dde55852bf" providerId="ADAL" clId="{B6D8E2E3-C58C-42AC-BD6D-A79F41996BB5}" dt="2020-02-17T14:46:11.576" v="2837" actId="478"/>
+        <pc:chgData name="Osama Mohammed Moustafa Hosam Elde" userId="ab8f451e-a635-42ee-be12-e2dde55852bf" providerId="ADAL" clId="{B6D8E2E3-C58C-42AC-BD6D-A79F41996BB5}" dt="2020-03-09T19:33:20.416" v="4597" actId="20577"/>
         <pc:sldMkLst>
           <pc:docMk/>
           <pc:sldMk cId="0" sldId="277"/>
         </pc:sldMkLst>
+        <pc:spChg chg="mod">
+          <ac:chgData name="Osama Mohammed Moustafa Hosam Elde" userId="ab8f451e-a635-42ee-be12-e2dde55852bf" providerId="ADAL" clId="{B6D8E2E3-C58C-42AC-BD6D-A79F41996BB5}" dt="2020-03-09T19:33:20.416" v="4597" actId="20577"/>
+          <ac:spMkLst>
+            <pc:docMk/>
+            <pc:sldMk cId="0" sldId="277"/>
+            <ac:spMk id="265" creationId="{00000000-0000-0000-0000-000000000000}"/>
+          </ac:spMkLst>
+        </pc:spChg>
         <pc:spChg chg="mod">
           <ac:chgData name="Osama Mohammed Moustafa Hosam Elde" userId="ab8f451e-a635-42ee-be12-e2dde55852bf" providerId="ADAL" clId="{B6D8E2E3-C58C-42AC-BD6D-A79F41996BB5}" dt="2020-02-17T14:46:08.330" v="2836" actId="20577"/>
           <ac:spMkLst>
@@ -1162,8 +1178,8 @@
           </ac:picMkLst>
         </pc:picChg>
       </pc:sldChg>
-      <pc:sldChg chg="modSp">
-        <pc:chgData name="Osama Mohammed Moustafa Hosam Elde" userId="ab8f451e-a635-42ee-be12-e2dde55852bf" providerId="ADAL" clId="{B6D8E2E3-C58C-42AC-BD6D-A79F41996BB5}" dt="2020-02-18T19:52:50.688" v="3315" actId="20577"/>
+      <pc:sldChg chg="delSp modSp">
+        <pc:chgData name="Osama Mohammed Moustafa Hosam Elde" userId="ab8f451e-a635-42ee-be12-e2dde55852bf" providerId="ADAL" clId="{B6D8E2E3-C58C-42AC-BD6D-A79F41996BB5}" dt="2020-03-09T19:42:23.382" v="4774" actId="14100"/>
         <pc:sldMkLst>
           <pc:docMk/>
           <pc:sldMk cId="0" sldId="281"/>
@@ -1177,23 +1193,23 @@
           </ac:spMkLst>
         </pc:spChg>
         <pc:spChg chg="mod">
-          <ac:chgData name="Osama Mohammed Moustafa Hosam Elde" userId="ab8f451e-a635-42ee-be12-e2dde55852bf" providerId="ADAL" clId="{B6D8E2E3-C58C-42AC-BD6D-A79F41996BB5}" dt="2020-02-18T19:48:35.536" v="3049" actId="313"/>
+          <ac:chgData name="Osama Mohammed Moustafa Hosam Elde" userId="ab8f451e-a635-42ee-be12-e2dde55852bf" providerId="ADAL" clId="{B6D8E2E3-C58C-42AC-BD6D-A79F41996BB5}" dt="2020-03-09T19:42:23.382" v="4774" actId="14100"/>
           <ac:spMkLst>
             <pc:docMk/>
             <pc:sldMk cId="0" sldId="281"/>
             <ac:spMk id="292" creationId="{00000000-0000-0000-0000-000000000000}"/>
           </ac:spMkLst>
         </pc:spChg>
-        <pc:spChg chg="mod">
-          <ac:chgData name="Osama Mohammed Moustafa Hosam Elde" userId="ab8f451e-a635-42ee-be12-e2dde55852bf" providerId="ADAL" clId="{B6D8E2E3-C58C-42AC-BD6D-A79F41996BB5}" dt="2020-02-18T19:50:26.672" v="3125" actId="20577"/>
+        <pc:spChg chg="del mod">
+          <ac:chgData name="Osama Mohammed Moustafa Hosam Elde" userId="ab8f451e-a635-42ee-be12-e2dde55852bf" providerId="ADAL" clId="{B6D8E2E3-C58C-42AC-BD6D-A79F41996BB5}" dt="2020-03-09T19:41:22.366" v="4757" actId="478"/>
           <ac:spMkLst>
             <pc:docMk/>
             <pc:sldMk cId="0" sldId="281"/>
             <ac:spMk id="293" creationId="{00000000-0000-0000-0000-000000000000}"/>
           </ac:spMkLst>
         </pc:spChg>
-        <pc:spChg chg="mod">
-          <ac:chgData name="Osama Mohammed Moustafa Hosam Elde" userId="ab8f451e-a635-42ee-be12-e2dde55852bf" providerId="ADAL" clId="{B6D8E2E3-C58C-42AC-BD6D-A79F41996BB5}" dt="2020-02-18T19:52:50.688" v="3315" actId="20577"/>
+        <pc:spChg chg="del mod">
+          <ac:chgData name="Osama Mohammed Moustafa Hosam Elde" userId="ab8f451e-a635-42ee-be12-e2dde55852bf" providerId="ADAL" clId="{B6D8E2E3-C58C-42AC-BD6D-A79F41996BB5}" dt="2020-03-09T19:41:17.094" v="4755" actId="478"/>
           <ac:spMkLst>
             <pc:docMk/>
             <pc:sldMk cId="0" sldId="281"/>
@@ -1201,12 +1217,20 @@
           </ac:spMkLst>
         </pc:spChg>
       </pc:sldChg>
-      <pc:sldChg chg="addSp modSp">
-        <pc:chgData name="Osama Mohammed Moustafa Hosam Elde" userId="ab8f451e-a635-42ee-be12-e2dde55852bf" providerId="ADAL" clId="{B6D8E2E3-C58C-42AC-BD6D-A79F41996BB5}" dt="2020-02-18T20:06:16.957" v="3713" actId="1076"/>
+      <pc:sldChg chg="addSp delSp modSp">
+        <pc:chgData name="Osama Mohammed Moustafa Hosam Elde" userId="ab8f451e-a635-42ee-be12-e2dde55852bf" providerId="ADAL" clId="{B6D8E2E3-C58C-42AC-BD6D-A79F41996BB5}" dt="2020-03-09T19:42:35.536" v="4775" actId="313"/>
         <pc:sldMkLst>
           <pc:docMk/>
           <pc:sldMk cId="0" sldId="282"/>
         </pc:sldMkLst>
+        <pc:spChg chg="add mod">
+          <ac:chgData name="Osama Mohammed Moustafa Hosam Elde" userId="ab8f451e-a635-42ee-be12-e2dde55852bf" providerId="ADAL" clId="{B6D8E2E3-C58C-42AC-BD6D-A79F41996BB5}" dt="2020-03-09T19:42:35.536" v="4775" actId="313"/>
+          <ac:spMkLst>
+            <pc:docMk/>
+            <pc:sldMk cId="0" sldId="282"/>
+            <ac:spMk id="3" creationId="{A84A7A65-0D85-4FA6-BDA6-8DCAE55C325F}"/>
+          </ac:spMkLst>
+        </pc:spChg>
         <pc:spChg chg="mod">
           <ac:chgData name="Osama Mohammed Moustafa Hosam Elde" userId="ab8f451e-a635-42ee-be12-e2dde55852bf" providerId="ADAL" clId="{B6D8E2E3-C58C-42AC-BD6D-A79F41996BB5}" dt="2020-02-18T19:53:14.737" v="3318" actId="20577"/>
           <ac:spMkLst>
@@ -1216,7 +1240,15 @@
           </ac:spMkLst>
         </pc:spChg>
         <pc:picChg chg="add mod">
-          <ac:chgData name="Osama Mohammed Moustafa Hosam Elde" userId="ab8f451e-a635-42ee-be12-e2dde55852bf" providerId="ADAL" clId="{B6D8E2E3-C58C-42AC-BD6D-A79F41996BB5}" dt="2020-02-18T20:06:16.957" v="3713" actId="1076"/>
+          <ac:chgData name="Osama Mohammed Moustafa Hosam Elde" userId="ab8f451e-a635-42ee-be12-e2dde55852bf" providerId="ADAL" clId="{B6D8E2E3-C58C-42AC-BD6D-A79F41996BB5}" dt="2020-03-09T19:37:32.662" v="4604" actId="1076"/>
+          <ac:picMkLst>
+            <pc:docMk/>
+            <pc:sldMk cId="0" sldId="282"/>
+            <ac:picMk id="2" creationId="{F4EAA6A1-8A96-40A0-B4F6-28AE41C2EFC5}"/>
+          </ac:picMkLst>
+        </pc:picChg>
+        <pc:picChg chg="add del mod">
+          <ac:chgData name="Osama Mohammed Moustafa Hosam Elde" userId="ab8f451e-a635-42ee-be12-e2dde55852bf" providerId="ADAL" clId="{B6D8E2E3-C58C-42AC-BD6D-A79F41996BB5}" dt="2020-03-09T19:37:07.438" v="4598" actId="478"/>
           <ac:picMkLst>
             <pc:docMk/>
             <pc:sldMk cId="0" sldId="282"/>
@@ -1224,8 +1256,8 @@
           </ac:picMkLst>
         </pc:picChg>
       </pc:sldChg>
-      <pc:sldChg chg="modSp">
-        <pc:chgData name="Osama Mohammed Moustafa Hosam Elde" userId="ab8f451e-a635-42ee-be12-e2dde55852bf" providerId="ADAL" clId="{B6D8E2E3-C58C-42AC-BD6D-A79F41996BB5}" dt="2020-02-18T19:59:45.704" v="3710" actId="20577"/>
+      <pc:sldChg chg="delSp modSp">
+        <pc:chgData name="Osama Mohammed Moustafa Hosam Elde" userId="ab8f451e-a635-42ee-be12-e2dde55852bf" providerId="ADAL" clId="{B6D8E2E3-C58C-42AC-BD6D-A79F41996BB5}" dt="2020-03-09T19:44:13.870" v="4784" actId="14100"/>
         <pc:sldMkLst>
           <pc:docMk/>
           <pc:sldMk cId="0" sldId="283"/>
@@ -1239,23 +1271,23 @@
           </ac:spMkLst>
         </pc:spChg>
         <pc:spChg chg="mod">
-          <ac:chgData name="Osama Mohammed Moustafa Hosam Elde" userId="ab8f451e-a635-42ee-be12-e2dde55852bf" providerId="ADAL" clId="{B6D8E2E3-C58C-42AC-BD6D-A79F41996BB5}" dt="2020-02-18T19:56:49.048" v="3417" actId="20577"/>
+          <ac:chgData name="Osama Mohammed Moustafa Hosam Elde" userId="ab8f451e-a635-42ee-be12-e2dde55852bf" providerId="ADAL" clId="{B6D8E2E3-C58C-42AC-BD6D-A79F41996BB5}" dt="2020-03-09T19:44:13.870" v="4784" actId="14100"/>
           <ac:spMkLst>
             <pc:docMk/>
             <pc:sldMk cId="0" sldId="283"/>
             <ac:spMk id="306" creationId="{00000000-0000-0000-0000-000000000000}"/>
           </ac:spMkLst>
         </pc:spChg>
-        <pc:spChg chg="mod">
-          <ac:chgData name="Osama Mohammed Moustafa Hosam Elde" userId="ab8f451e-a635-42ee-be12-e2dde55852bf" providerId="ADAL" clId="{B6D8E2E3-C58C-42AC-BD6D-A79F41996BB5}" dt="2020-02-18T19:58:32.621" v="3577" actId="313"/>
+        <pc:spChg chg="del mod">
+          <ac:chgData name="Osama Mohammed Moustafa Hosam Elde" userId="ab8f451e-a635-42ee-be12-e2dde55852bf" providerId="ADAL" clId="{B6D8E2E3-C58C-42AC-BD6D-A79F41996BB5}" dt="2020-03-09T19:43:47.343" v="4776" actId="478"/>
           <ac:spMkLst>
             <pc:docMk/>
             <pc:sldMk cId="0" sldId="283"/>
             <ac:spMk id="307" creationId="{00000000-0000-0000-0000-000000000000}"/>
           </ac:spMkLst>
         </pc:spChg>
-        <pc:spChg chg="mod">
-          <ac:chgData name="Osama Mohammed Moustafa Hosam Elde" userId="ab8f451e-a635-42ee-be12-e2dde55852bf" providerId="ADAL" clId="{B6D8E2E3-C58C-42AC-BD6D-A79F41996BB5}" dt="2020-02-18T19:59:45.704" v="3710" actId="20577"/>
+        <pc:spChg chg="del mod">
+          <ac:chgData name="Osama Mohammed Moustafa Hosam Elde" userId="ab8f451e-a635-42ee-be12-e2dde55852bf" providerId="ADAL" clId="{B6D8E2E3-C58C-42AC-BD6D-A79F41996BB5}" dt="2020-03-09T19:43:48.774" v="4777" actId="478"/>
           <ac:spMkLst>
             <pc:docMk/>
             <pc:sldMk cId="0" sldId="283"/>
@@ -1264,11 +1296,19 @@
         </pc:spChg>
       </pc:sldChg>
       <pc:sldChg chg="addSp delSp modSp">
-        <pc:chgData name="Osama Mohammed Moustafa Hosam Elde" userId="ab8f451e-a635-42ee-be12-e2dde55852bf" providerId="ADAL" clId="{B6D8E2E3-C58C-42AC-BD6D-A79F41996BB5}" dt="2020-02-18T20:10:13.902" v="3719" actId="1076"/>
+        <pc:chgData name="Osama Mohammed Moustafa Hosam Elde" userId="ab8f451e-a635-42ee-be12-e2dde55852bf" providerId="ADAL" clId="{B6D8E2E3-C58C-42AC-BD6D-A79F41996BB5}" dt="2020-03-09T20:09:22.049" v="5106" actId="20577"/>
         <pc:sldMkLst>
           <pc:docMk/>
           <pc:sldMk cId="0" sldId="284"/>
         </pc:sldMkLst>
+        <pc:spChg chg="add mod">
+          <ac:chgData name="Osama Mohammed Moustafa Hosam Elde" userId="ab8f451e-a635-42ee-be12-e2dde55852bf" providerId="ADAL" clId="{B6D8E2E3-C58C-42AC-BD6D-A79F41996BB5}" dt="2020-03-09T20:09:22.049" v="5106" actId="20577"/>
+          <ac:spMkLst>
+            <pc:docMk/>
+            <pc:sldMk cId="0" sldId="284"/>
+            <ac:spMk id="4" creationId="{4D30CFB4-E000-4EB9-97B0-54991A647D08}"/>
+          </ac:spMkLst>
+        </pc:spChg>
         <pc:spChg chg="mod">
           <ac:chgData name="Osama Mohammed Moustafa Hosam Elde" userId="ab8f451e-a635-42ee-be12-e2dde55852bf" providerId="ADAL" clId="{B6D8E2E3-C58C-42AC-BD6D-A79F41996BB5}" dt="2020-02-18T19:53:40.943" v="3320"/>
           <ac:spMkLst>
@@ -1277,12 +1317,20 @@
             <ac:spMk id="313" creationId="{00000000-0000-0000-0000-000000000000}"/>
           </ac:spMkLst>
         </pc:spChg>
-        <pc:picChg chg="add mod">
-          <ac:chgData name="Osama Mohammed Moustafa Hosam Elde" userId="ab8f451e-a635-42ee-be12-e2dde55852bf" providerId="ADAL" clId="{B6D8E2E3-C58C-42AC-BD6D-A79F41996BB5}" dt="2020-02-18T20:10:13.902" v="3719" actId="1076"/>
+        <pc:picChg chg="add del mod">
+          <ac:chgData name="Osama Mohammed Moustafa Hosam Elde" userId="ab8f451e-a635-42ee-be12-e2dde55852bf" providerId="ADAL" clId="{B6D8E2E3-C58C-42AC-BD6D-A79F41996BB5}" dt="2020-03-09T19:44:25.182" v="4785" actId="478"/>
           <ac:picMkLst>
             <pc:docMk/>
             <pc:sldMk cId="0" sldId="284"/>
             <ac:picMk id="2" creationId="{F0DC8E92-F19C-4A1E-B7CF-1B16FB025779}"/>
+          </ac:picMkLst>
+        </pc:picChg>
+        <pc:picChg chg="add mod">
+          <ac:chgData name="Osama Mohammed Moustafa Hosam Elde" userId="ab8f451e-a635-42ee-be12-e2dde55852bf" providerId="ADAL" clId="{B6D8E2E3-C58C-42AC-BD6D-A79F41996BB5}" dt="2020-03-09T19:48:09.711" v="4830" actId="1076"/>
+          <ac:picMkLst>
+            <pc:docMk/>
+            <pc:sldMk cId="0" sldId="284"/>
+            <ac:picMk id="3" creationId="{8071826D-668C-4037-8F0B-F0600B7A07E1}"/>
           </ac:picMkLst>
         </pc:picChg>
         <pc:picChg chg="add del mod">
@@ -1294,8 +1342,8 @@
           </ac:picMkLst>
         </pc:picChg>
       </pc:sldChg>
-      <pc:sldChg chg="addSp modSp">
-        <pc:chgData name="Osama Mohammed Moustafa Hosam Elde" userId="ab8f451e-a635-42ee-be12-e2dde55852bf" providerId="ADAL" clId="{B6D8E2E3-C58C-42AC-BD6D-A79F41996BB5}" dt="2020-02-24T14:29:07.641" v="3732" actId="1076"/>
+      <pc:sldChg chg="addSp delSp modSp">
+        <pc:chgData name="Osama Mohammed Moustafa Hosam Elde" userId="ab8f451e-a635-42ee-be12-e2dde55852bf" providerId="ADAL" clId="{B6D8E2E3-C58C-42AC-BD6D-A79F41996BB5}" dt="2020-03-09T19:47:18.639" v="4829" actId="1076"/>
         <pc:sldMkLst>
           <pc:docMk/>
           <pc:sldMk cId="0" sldId="286"/>
@@ -1308,12 +1356,180 @@
             <ac:spMk id="24" creationId="{83693FCD-34F1-454A-BB5B-36606FBA5622}"/>
           </ac:spMkLst>
         </pc:spChg>
-        <pc:spChg chg="add mod">
-          <ac:chgData name="Osama Mohammed Moustafa Hosam Elde" userId="ab8f451e-a635-42ee-be12-e2dde55852bf" providerId="ADAL" clId="{B6D8E2E3-C58C-42AC-BD6D-A79F41996BB5}" dt="2020-02-24T14:29:07.641" v="3732" actId="1076"/>
+        <pc:spChg chg="add del mod">
+          <ac:chgData name="Osama Mohammed Moustafa Hosam Elde" userId="ab8f451e-a635-42ee-be12-e2dde55852bf" providerId="ADAL" clId="{B6D8E2E3-C58C-42AC-BD6D-A79F41996BB5}" dt="2020-03-09T19:47:06.551" v="4827" actId="478"/>
           <ac:spMkLst>
             <pc:docMk/>
             <pc:sldMk cId="0" sldId="286"/>
             <ac:spMk id="25" creationId="{79B783B6-442B-40B4-8F14-31C7A809C5D1}"/>
+          </ac:spMkLst>
+        </pc:spChg>
+        <pc:spChg chg="add mod">
+          <ac:chgData name="Osama Mohammed Moustafa Hosam Elde" userId="ab8f451e-a635-42ee-be12-e2dde55852bf" providerId="ADAL" clId="{B6D8E2E3-C58C-42AC-BD6D-A79F41996BB5}" dt="2020-03-09T19:45:56.297" v="4826" actId="1036"/>
+          <ac:spMkLst>
+            <pc:docMk/>
+            <pc:sldMk cId="0" sldId="286"/>
+            <ac:spMk id="26" creationId="{497D4B41-79E1-4053-941C-43EEDEC1A5B7}"/>
+          </ac:spMkLst>
+        </pc:spChg>
+        <pc:spChg chg="add mod">
+          <ac:chgData name="Osama Mohammed Moustafa Hosam Elde" userId="ab8f451e-a635-42ee-be12-e2dde55852bf" providerId="ADAL" clId="{B6D8E2E3-C58C-42AC-BD6D-A79F41996BB5}" dt="2020-03-09T19:45:56.297" v="4826" actId="1036"/>
+          <ac:spMkLst>
+            <pc:docMk/>
+            <pc:sldMk cId="0" sldId="286"/>
+            <ac:spMk id="27" creationId="{B245F66B-8EB1-4351-9BA6-0B83B375A689}"/>
+          </ac:spMkLst>
+        </pc:spChg>
+        <pc:spChg chg="add mod">
+          <ac:chgData name="Osama Mohammed Moustafa Hosam Elde" userId="ab8f451e-a635-42ee-be12-e2dde55852bf" providerId="ADAL" clId="{B6D8E2E3-C58C-42AC-BD6D-A79F41996BB5}" dt="2020-03-09T19:45:56.297" v="4826" actId="1036"/>
+          <ac:spMkLst>
+            <pc:docMk/>
+            <pc:sldMk cId="0" sldId="286"/>
+            <ac:spMk id="28" creationId="{F74BA752-440A-470D-83F0-67B4D0CEB8E4}"/>
+          </ac:spMkLst>
+        </pc:spChg>
+        <pc:spChg chg="add mod">
+          <ac:chgData name="Osama Mohammed Moustafa Hosam Elde" userId="ab8f451e-a635-42ee-be12-e2dde55852bf" providerId="ADAL" clId="{B6D8E2E3-C58C-42AC-BD6D-A79F41996BB5}" dt="2020-03-09T19:45:56.297" v="4826" actId="1036"/>
+          <ac:spMkLst>
+            <pc:docMk/>
+            <pc:sldMk cId="0" sldId="286"/>
+            <ac:spMk id="29" creationId="{E82EDC6A-6D71-43F9-96B1-AC411DE2C1D8}"/>
+          </ac:spMkLst>
+        </pc:spChg>
+        <pc:spChg chg="add mod">
+          <ac:chgData name="Osama Mohammed Moustafa Hosam Elde" userId="ab8f451e-a635-42ee-be12-e2dde55852bf" providerId="ADAL" clId="{B6D8E2E3-C58C-42AC-BD6D-A79F41996BB5}" dt="2020-03-09T19:45:56.297" v="4826" actId="1036"/>
+          <ac:spMkLst>
+            <pc:docMk/>
+            <pc:sldMk cId="0" sldId="286"/>
+            <ac:spMk id="30" creationId="{7E24E198-F807-424E-8CAC-D637D6AE49FF}"/>
+          </ac:spMkLst>
+        </pc:spChg>
+        <pc:spChg chg="add mod">
+          <ac:chgData name="Osama Mohammed Moustafa Hosam Elde" userId="ab8f451e-a635-42ee-be12-e2dde55852bf" providerId="ADAL" clId="{B6D8E2E3-C58C-42AC-BD6D-A79F41996BB5}" dt="2020-03-09T19:45:56.297" v="4826" actId="1036"/>
+          <ac:spMkLst>
+            <pc:docMk/>
+            <pc:sldMk cId="0" sldId="286"/>
+            <ac:spMk id="31" creationId="{A96E1BC9-E3F5-492F-A6EF-FC80C8BD750F}"/>
+          </ac:spMkLst>
+        </pc:spChg>
+        <pc:spChg chg="add mod">
+          <ac:chgData name="Osama Mohammed Moustafa Hosam Elde" userId="ab8f451e-a635-42ee-be12-e2dde55852bf" providerId="ADAL" clId="{B6D8E2E3-C58C-42AC-BD6D-A79F41996BB5}" dt="2020-03-09T19:45:56.297" v="4826" actId="1036"/>
+          <ac:spMkLst>
+            <pc:docMk/>
+            <pc:sldMk cId="0" sldId="286"/>
+            <ac:spMk id="32" creationId="{AA78509D-C43A-4810-8D67-FA864282F38C}"/>
+          </ac:spMkLst>
+        </pc:spChg>
+        <pc:spChg chg="add mod">
+          <ac:chgData name="Osama Mohammed Moustafa Hosam Elde" userId="ab8f451e-a635-42ee-be12-e2dde55852bf" providerId="ADAL" clId="{B6D8E2E3-C58C-42AC-BD6D-A79F41996BB5}" dt="2020-03-09T19:45:56.297" v="4826" actId="1036"/>
+          <ac:spMkLst>
+            <pc:docMk/>
+            <pc:sldMk cId="0" sldId="286"/>
+            <ac:spMk id="33" creationId="{1D75455D-7654-4E69-A67F-AD5F5EEB319A}"/>
+          </ac:spMkLst>
+        </pc:spChg>
+        <pc:spChg chg="add mod">
+          <ac:chgData name="Osama Mohammed Moustafa Hosam Elde" userId="ab8f451e-a635-42ee-be12-e2dde55852bf" providerId="ADAL" clId="{B6D8E2E3-C58C-42AC-BD6D-A79F41996BB5}" dt="2020-03-09T19:45:56.297" v="4826" actId="1036"/>
+          <ac:spMkLst>
+            <pc:docMk/>
+            <pc:sldMk cId="0" sldId="286"/>
+            <ac:spMk id="34" creationId="{F4450D74-6D36-4053-BF27-39ABE9920F59}"/>
+          </ac:spMkLst>
+        </pc:spChg>
+        <pc:spChg chg="add mod">
+          <ac:chgData name="Osama Mohammed Moustafa Hosam Elde" userId="ab8f451e-a635-42ee-be12-e2dde55852bf" providerId="ADAL" clId="{B6D8E2E3-C58C-42AC-BD6D-A79F41996BB5}" dt="2020-03-09T19:45:56.297" v="4826" actId="1036"/>
+          <ac:spMkLst>
+            <pc:docMk/>
+            <pc:sldMk cId="0" sldId="286"/>
+            <ac:spMk id="35" creationId="{6A1ABCB7-E434-4D77-B196-0B87B427255E}"/>
+          </ac:spMkLst>
+        </pc:spChg>
+        <pc:spChg chg="add mod">
+          <ac:chgData name="Osama Mohammed Moustafa Hosam Elde" userId="ab8f451e-a635-42ee-be12-e2dde55852bf" providerId="ADAL" clId="{B6D8E2E3-C58C-42AC-BD6D-A79F41996BB5}" dt="2020-03-09T19:47:18.639" v="4829" actId="1076"/>
+          <ac:spMkLst>
+            <pc:docMk/>
+            <pc:sldMk cId="0" sldId="286"/>
+            <ac:spMk id="36" creationId="{4F244A06-07D2-4238-B992-0AFA2C445E78}"/>
+          </ac:spMkLst>
+        </pc:spChg>
+        <pc:spChg chg="del">
+          <ac:chgData name="Osama Mohammed Moustafa Hosam Elde" userId="ab8f451e-a635-42ee-be12-e2dde55852bf" providerId="ADAL" clId="{B6D8E2E3-C58C-42AC-BD6D-A79F41996BB5}" dt="2020-03-09T19:45:49.327" v="4791" actId="478"/>
+          <ac:spMkLst>
+            <pc:docMk/>
+            <pc:sldMk cId="0" sldId="286"/>
+            <ac:spMk id="329" creationId="{00000000-0000-0000-0000-000000000000}"/>
+          </ac:spMkLst>
+        </pc:spChg>
+        <pc:spChg chg="del">
+          <ac:chgData name="Osama Mohammed Moustafa Hosam Elde" userId="ab8f451e-a635-42ee-be12-e2dde55852bf" providerId="ADAL" clId="{B6D8E2E3-C58C-42AC-BD6D-A79F41996BB5}" dt="2020-03-09T19:45:49.327" v="4791" actId="478"/>
+          <ac:spMkLst>
+            <pc:docMk/>
+            <pc:sldMk cId="0" sldId="286"/>
+            <ac:spMk id="330" creationId="{00000000-0000-0000-0000-000000000000}"/>
+          </ac:spMkLst>
+        </pc:spChg>
+        <pc:spChg chg="del">
+          <ac:chgData name="Osama Mohammed Moustafa Hosam Elde" userId="ab8f451e-a635-42ee-be12-e2dde55852bf" providerId="ADAL" clId="{B6D8E2E3-C58C-42AC-BD6D-A79F41996BB5}" dt="2020-03-09T19:45:49.327" v="4791" actId="478"/>
+          <ac:spMkLst>
+            <pc:docMk/>
+            <pc:sldMk cId="0" sldId="286"/>
+            <ac:spMk id="331" creationId="{00000000-0000-0000-0000-000000000000}"/>
+          </ac:spMkLst>
+        </pc:spChg>
+        <pc:spChg chg="del">
+          <ac:chgData name="Osama Mohammed Moustafa Hosam Elde" userId="ab8f451e-a635-42ee-be12-e2dde55852bf" providerId="ADAL" clId="{B6D8E2E3-C58C-42AC-BD6D-A79F41996BB5}" dt="2020-03-09T19:45:49.327" v="4791" actId="478"/>
+          <ac:spMkLst>
+            <pc:docMk/>
+            <pc:sldMk cId="0" sldId="286"/>
+            <ac:spMk id="332" creationId="{00000000-0000-0000-0000-000000000000}"/>
+          </ac:spMkLst>
+        </pc:spChg>
+        <pc:spChg chg="del">
+          <ac:chgData name="Osama Mohammed Moustafa Hosam Elde" userId="ab8f451e-a635-42ee-be12-e2dde55852bf" providerId="ADAL" clId="{B6D8E2E3-C58C-42AC-BD6D-A79F41996BB5}" dt="2020-03-09T19:45:49.327" v="4791" actId="478"/>
+          <ac:spMkLst>
+            <pc:docMk/>
+            <pc:sldMk cId="0" sldId="286"/>
+            <ac:spMk id="333" creationId="{00000000-0000-0000-0000-000000000000}"/>
+          </ac:spMkLst>
+        </pc:spChg>
+        <pc:spChg chg="del">
+          <ac:chgData name="Osama Mohammed Moustafa Hosam Elde" userId="ab8f451e-a635-42ee-be12-e2dde55852bf" providerId="ADAL" clId="{B6D8E2E3-C58C-42AC-BD6D-A79F41996BB5}" dt="2020-03-09T19:45:49.327" v="4791" actId="478"/>
+          <ac:spMkLst>
+            <pc:docMk/>
+            <pc:sldMk cId="0" sldId="286"/>
+            <ac:spMk id="334" creationId="{00000000-0000-0000-0000-000000000000}"/>
+          </ac:spMkLst>
+        </pc:spChg>
+        <pc:spChg chg="del">
+          <ac:chgData name="Osama Mohammed Moustafa Hosam Elde" userId="ab8f451e-a635-42ee-be12-e2dde55852bf" providerId="ADAL" clId="{B6D8E2E3-C58C-42AC-BD6D-A79F41996BB5}" dt="2020-03-09T19:45:49.327" v="4791" actId="478"/>
+          <ac:spMkLst>
+            <pc:docMk/>
+            <pc:sldMk cId="0" sldId="286"/>
+            <ac:spMk id="335" creationId="{00000000-0000-0000-0000-000000000000}"/>
+          </ac:spMkLst>
+        </pc:spChg>
+        <pc:spChg chg="del">
+          <ac:chgData name="Osama Mohammed Moustafa Hosam Elde" userId="ab8f451e-a635-42ee-be12-e2dde55852bf" providerId="ADAL" clId="{B6D8E2E3-C58C-42AC-BD6D-A79F41996BB5}" dt="2020-03-09T19:45:49.327" v="4791" actId="478"/>
+          <ac:spMkLst>
+            <pc:docMk/>
+            <pc:sldMk cId="0" sldId="286"/>
+            <ac:spMk id="336" creationId="{00000000-0000-0000-0000-000000000000}"/>
+          </ac:spMkLst>
+        </pc:spChg>
+        <pc:spChg chg="del">
+          <ac:chgData name="Osama Mohammed Moustafa Hosam Elde" userId="ab8f451e-a635-42ee-be12-e2dde55852bf" providerId="ADAL" clId="{B6D8E2E3-C58C-42AC-BD6D-A79F41996BB5}" dt="2020-03-09T19:45:49.327" v="4791" actId="478"/>
+          <ac:spMkLst>
+            <pc:docMk/>
+            <pc:sldMk cId="0" sldId="286"/>
+            <ac:spMk id="337" creationId="{00000000-0000-0000-0000-000000000000}"/>
+          </ac:spMkLst>
+        </pc:spChg>
+        <pc:spChg chg="del">
+          <ac:chgData name="Osama Mohammed Moustafa Hosam Elde" userId="ab8f451e-a635-42ee-be12-e2dde55852bf" providerId="ADAL" clId="{B6D8E2E3-C58C-42AC-BD6D-A79F41996BB5}" dt="2020-03-09T19:45:49.327" v="4791" actId="478"/>
+          <ac:spMkLst>
+            <pc:docMk/>
+            <pc:sldMk cId="0" sldId="286"/>
+            <ac:spMk id="338" creationId="{00000000-0000-0000-0000-000000000000}"/>
           </ac:spMkLst>
         </pc:spChg>
       </pc:sldChg>
@@ -14203,7 +14419,7 @@
               <a:buNone/>
             </a:pPr>
             <a:r>
-              <a:rPr lang="en" sz="900">
+              <a:rPr lang="en" sz="900" dirty="0">
                 <a:solidFill>
                   <a:srgbClr val="FFFFFF"/>
                 </a:solidFill>
@@ -14211,21 +14427,21 @@
               <a:t>UC</a:t>
             </a:r>
             <a:br>
-              <a:rPr lang="en" sz="900">
+              <a:rPr lang="en" sz="900" dirty="0">
                 <a:solidFill>
                   <a:srgbClr val="FFFFFF"/>
                 </a:solidFill>
               </a:rPr>
             </a:br>
             <a:r>
-              <a:rPr lang="en" sz="900">
+              <a:rPr lang="en" sz="900" dirty="0">
                 <a:solidFill>
                   <a:srgbClr val="FFFFFF"/>
                 </a:solidFill>
               </a:rPr>
               <a:t>1</a:t>
             </a:r>
-            <a:endParaRPr sz="900">
+            <a:endParaRPr sz="900" dirty="0">
               <a:solidFill>
                 <a:srgbClr val="FFFFFF"/>
               </a:solidFill>
@@ -15355,15 +15571,7 @@
           </a:bodyPr>
           <a:lstStyle/>
           <a:p>
-            <a:pPr marL="0" lvl="0" indent="0" algn="l" rtl="0">
-              <a:spcBef>
-                <a:spcPts val="0"/>
-              </a:spcBef>
-              <a:spcAft>
-                <a:spcPts val="0"/>
-              </a:spcAft>
-              <a:buNone/>
-            </a:pPr>
+            <a:pPr lvl="0"/>
             <a:r>
               <a:rPr lang="en" sz="1050" dirty="0">
                 <a:solidFill>
@@ -15386,7 +15594,7 @@
                 <a:cs typeface="Open Sans"/>
                 <a:sym typeface="Open Sans"/>
               </a:rPr>
-              <a:t>Optimal tax strategy predictor</a:t>
+              <a:t>Recruiting Screener</a:t>
             </a:r>
             <a:endParaRPr sz="1050" dirty="0">
               <a:solidFill>
@@ -16506,10 +16714,14 @@
               <a:buNone/>
             </a:pPr>
             <a:r>
-              <a:rPr lang="en"/>
-              <a:t>First Use Case</a:t>
-            </a:r>
-            <a:endParaRPr/>
+              <a:rPr lang="en" dirty="0"/>
+              <a:t>First Use Case – </a:t>
+            </a:r>
+            <a:r>
+              <a:rPr lang="en-US" dirty="0"/>
+              <a:t>Quality control with CV</a:t>
+            </a:r>
+            <a:endParaRPr dirty="0"/>
           </a:p>
         </p:txBody>
       </p:sp>
@@ -16722,10 +16934,14 @@
               <a:buNone/>
             </a:pPr>
             <a:r>
-              <a:rPr lang="en"/>
-              <a:t>Second Use Case</a:t>
-            </a:r>
-            <a:endParaRPr/>
+              <a:rPr lang="en" dirty="0"/>
+              <a:t>Second Use Case – </a:t>
+            </a:r>
+            <a:r>
+              <a:rPr lang="en-US" dirty="0"/>
+              <a:t>Car Maintenance Expectation</a:t>
+            </a:r>
+            <a:endParaRPr dirty="0"/>
           </a:p>
         </p:txBody>
       </p:sp>
@@ -17456,8 +17672,8 @@
         </p:nvSpPr>
         <p:spPr>
           <a:xfrm>
-            <a:off x="568125" y="1204450"/>
-            <a:ext cx="5166300" cy="704400"/>
+            <a:off x="734380" y="1017414"/>
+            <a:ext cx="5153802" cy="704400"/>
           </a:xfrm>
           <a:prstGeom prst="rect">
             <a:avLst/>
@@ -17484,9 +17700,12 @@
                 <a:cs typeface="Roboto"/>
                 <a:sym typeface="Roboto"/>
               </a:rPr>
-              <a:t>The computer vison-based approach proposed is helpful in detecting detectives without labor intervention </a:t>
-            </a:r>
-            <a:endParaRPr sz="1800" dirty="0">
+              <a:t>computers are more accurate in quality control than human especially with massive production.</a:t>
+            </a:r>
+          </a:p>
+          <a:p>
+            <a:pPr lvl="0"/>
+            <a:endParaRPr lang="en-US" sz="1800" dirty="0">
               <a:solidFill>
                 <a:schemeClr val="dk1"/>
               </a:solidFill>
@@ -17496,42 +17715,8 @@
               <a:sym typeface="Roboto"/>
             </a:endParaRPr>
           </a:p>
-        </p:txBody>
-      </p:sp>
-      <p:sp>
-        <p:nvSpPr>
-          <p:cNvPr id="293" name="Google Shape;293;p38"/>
-          <p:cNvSpPr txBox="1"/>
-          <p:nvPr/>
-        </p:nvSpPr>
-        <p:spPr>
-          <a:xfrm>
-            <a:off x="568125" y="2129513"/>
-            <a:ext cx="5166300" cy="704400"/>
-          </a:xfrm>
-          <a:prstGeom prst="rect">
-            <a:avLst/>
-          </a:prstGeom>
-          <a:noFill/>
-          <a:ln>
-            <a:noFill/>
-          </a:ln>
-        </p:spPr>
-        <p:txBody>
-          <a:bodyPr spcFirstLastPara="1" wrap="square" lIns="91425" tIns="91425" rIns="91425" bIns="91425" anchor="t" anchorCtr="0">
-            <a:noAutofit/>
-          </a:bodyPr>
-          <a:lstStyle/>
-          <a:p>
-            <a:pPr marL="0" lvl="0" indent="0" algn="l" rtl="0">
-              <a:spcBef>
-                <a:spcPts val="0"/>
-              </a:spcBef>
-              <a:spcAft>
-                <a:spcPts val="0"/>
-              </a:spcAft>
-              <a:buNone/>
-            </a:pPr>
+          <a:p>
+            <a:pPr lvl="0"/>
             <a:r>
               <a:rPr lang="en-US" sz="1800" dirty="0">
                 <a:solidFill>
@@ -17542,9 +17727,12 @@
                 <a:cs typeface="Roboto"/>
                 <a:sym typeface="Roboto"/>
               </a:rPr>
-              <a:t>With high quality cameras, the automation process will be accurate</a:t>
-            </a:r>
-            <a:endParaRPr sz="1800" dirty="0">
+              <a:t>If the proposed solution Could be developed it will make the process of inspecting the quality of products easy</a:t>
+            </a:r>
+          </a:p>
+          <a:p>
+            <a:pPr lvl="0"/>
+            <a:endParaRPr lang="en-US" sz="1800" dirty="0">
               <a:solidFill>
                 <a:schemeClr val="dk1"/>
               </a:solidFill>
@@ -17554,42 +17742,8 @@
               <a:sym typeface="Roboto"/>
             </a:endParaRPr>
           </a:p>
-        </p:txBody>
-      </p:sp>
-      <p:sp>
-        <p:nvSpPr>
-          <p:cNvPr id="294" name="Google Shape;294;p38"/>
-          <p:cNvSpPr txBox="1"/>
-          <p:nvPr/>
-        </p:nvSpPr>
-        <p:spPr>
-          <a:xfrm>
-            <a:off x="568125" y="3054575"/>
-            <a:ext cx="5166300" cy="704400"/>
-          </a:xfrm>
-          <a:prstGeom prst="rect">
-            <a:avLst/>
-          </a:prstGeom>
-          <a:noFill/>
-          <a:ln>
-            <a:noFill/>
-          </a:ln>
-        </p:spPr>
-        <p:txBody>
-          <a:bodyPr spcFirstLastPara="1" wrap="square" lIns="91425" tIns="91425" rIns="91425" bIns="91425" anchor="t" anchorCtr="0">
-            <a:noAutofit/>
-          </a:bodyPr>
-          <a:lstStyle/>
-          <a:p>
-            <a:pPr marL="0" lvl="0" indent="0" algn="l" rtl="0">
-              <a:spcBef>
-                <a:spcPts val="0"/>
-              </a:spcBef>
-              <a:spcAft>
-                <a:spcPts val="0"/>
-              </a:spcAft>
-              <a:buNone/>
-            </a:pPr>
+          <a:p>
+            <a:pPr lvl="0"/>
             <a:r>
               <a:rPr lang="en-US" sz="1800" dirty="0">
                 <a:solidFill>
@@ -17600,7 +17754,34 @@
                 <a:cs typeface="Roboto"/>
                 <a:sym typeface="Roboto"/>
               </a:rPr>
-              <a:t>Adopting deep neural networks in the classification phase will enable more accurate classification in addition to more classes can be handled at the same time. </a:t>
+              <a:t>Value added with automatic inspection</a:t>
+            </a:r>
+          </a:p>
+          <a:p>
+            <a:pPr lvl="0"/>
+            <a:endParaRPr lang="en-US" sz="1800" dirty="0">
+              <a:solidFill>
+                <a:schemeClr val="dk1"/>
+              </a:solidFill>
+              <a:latin typeface="Roboto"/>
+              <a:ea typeface="Roboto"/>
+              <a:cs typeface="Roboto"/>
+              <a:sym typeface="Roboto"/>
+            </a:endParaRPr>
+          </a:p>
+          <a:p>
+            <a:pPr lvl="0"/>
+            <a:r>
+              <a:rPr lang="en-US" sz="1800" dirty="0">
+                <a:solidFill>
+                  <a:schemeClr val="dk1"/>
+                </a:solidFill>
+                <a:latin typeface="Roboto"/>
+                <a:ea typeface="Roboto"/>
+                <a:cs typeface="Roboto"/>
+                <a:sym typeface="Roboto"/>
+              </a:rPr>
+              <a:t>Training the classifier to predict n classes.</a:t>
             </a:r>
             <a:endParaRPr sz="1800" dirty="0">
               <a:solidFill>
@@ -17735,51 +17916,69 @@
       </p:sp>
       <p:pic>
         <p:nvPicPr>
-          <p:cNvPr id="1026" name="Picture 2" descr="Forms response chart. Question title: Based on the description above, how familiar would you say you are with the area being discussed in Use Case 1?. Number of responses: .">
+          <p:cNvPr id="2" name="Picture 1">
             <a:extLst>
               <a:ext uri="{FF2B5EF4-FFF2-40B4-BE49-F238E27FC236}">
-                <a16:creationId xmlns:a16="http://schemas.microsoft.com/office/drawing/2014/main" id="{C67D799D-CE8B-48BB-8F13-CD66003AF9C7}"/>
+                <a16:creationId xmlns:a16="http://schemas.microsoft.com/office/drawing/2014/main" id="{F4EAA6A1-8A96-40A0-B4F6-28AE41C2EFC5}"/>
               </a:ext>
             </a:extLst>
           </p:cNvPr>
           <p:cNvPicPr>
-            <a:picLocks noChangeAspect="1" noChangeArrowheads="1"/>
+            <a:picLocks noChangeAspect="1"/>
           </p:cNvPicPr>
           <p:nvPr/>
         </p:nvPicPr>
         <p:blipFill>
-          <a:blip r:embed="rId3">
-            <a:extLst>
-              <a:ext uri="{28A0092B-C50C-407E-A947-70E740481C1C}">
-                <a14:useLocalDpi xmlns:a14="http://schemas.microsoft.com/office/drawing/2010/main" val="0"/>
-              </a:ext>
-            </a:extLst>
-          </a:blip>
-          <a:srcRect/>
+          <a:blip r:embed="rId3"/>
           <a:stretch>
             <a:fillRect/>
           </a:stretch>
         </p:blipFill>
-        <p:spPr bwMode="auto">
-          <a:xfrm>
-            <a:off x="1461655" y="1578596"/>
-            <a:ext cx="5638800" cy="2942749"/>
+        <p:spPr>
+          <a:xfrm>
+            <a:off x="1727219" y="826868"/>
+            <a:ext cx="5269327" cy="3381084"/>
           </a:xfrm>
           <a:prstGeom prst="rect">
             <a:avLst/>
           </a:prstGeom>
+        </p:spPr>
+      </p:pic>
+      <p:sp>
+        <p:nvSpPr>
+          <p:cNvPr id="3" name="TextBox 2">
+            <a:extLst>
+              <a:ext uri="{FF2B5EF4-FFF2-40B4-BE49-F238E27FC236}">
+                <a16:creationId xmlns:a16="http://schemas.microsoft.com/office/drawing/2014/main" id="{A84A7A65-0D85-4FA6-BDA6-8DCAE55C325F}"/>
+              </a:ext>
+            </a:extLst>
+          </p:cNvPr>
+          <p:cNvSpPr txBox="1"/>
+          <p:nvPr/>
+        </p:nvSpPr>
+        <p:spPr>
+          <a:xfrm>
+            <a:off x="1877291" y="4426527"/>
+            <a:ext cx="5389418" cy="523220"/>
+          </a:xfrm>
+          <a:prstGeom prst="rect">
+            <a:avLst/>
+          </a:prstGeom>
           <a:noFill/>
-          <a:extLst>
-            <a:ext uri="{909E8E84-426E-40DD-AFC4-6F175D3DCCD1}">
-              <a14:hiddenFill xmlns:a14="http://schemas.microsoft.com/office/drawing/2010/main">
-                <a:solidFill>
-                  <a:srgbClr val="FFFFFF"/>
-                </a:solidFill>
-              </a14:hiddenFill>
-            </a:ext>
-          </a:extLst>
-        </p:spPr>
-      </p:pic>
+        </p:spPr>
+        <p:txBody>
+          <a:bodyPr wrap="square" rtlCol="0">
+            <a:spAutoFit/>
+          </a:bodyPr>
+          <a:lstStyle/>
+          <a:p>
+            <a:r>
+              <a:rPr lang="en-US" dirty="0"/>
+              <a:t>Seems we have an agreement that UC1 will introduce powerful enhancement in business</a:t>
+            </a:r>
+          </a:p>
+        </p:txBody>
+      </p:sp>
     </p:spTree>
   </p:cSld>
   <p:clrMapOvr>
@@ -17852,7 +18051,7 @@
         <p:spPr>
           <a:xfrm>
             <a:off x="568125" y="1204450"/>
-            <a:ext cx="5166300" cy="704400"/>
+            <a:ext cx="6033566" cy="2965768"/>
           </a:xfrm>
           <a:prstGeom prst="rect">
             <a:avLst/>
@@ -17868,15 +18067,7 @@
           </a:bodyPr>
           <a:lstStyle/>
           <a:p>
-            <a:pPr marL="0" lvl="0" indent="0" algn="l" rtl="0">
-              <a:spcBef>
-                <a:spcPts val="0"/>
-              </a:spcBef>
-              <a:spcAft>
-                <a:spcPts val="0"/>
-              </a:spcAft>
-              <a:buNone/>
-            </a:pPr>
+            <a:pPr lvl="0"/>
             <a:r>
               <a:rPr lang="en-US" sz="1800" dirty="0">
                 <a:solidFill>
@@ -17887,9 +18078,12 @@
                 <a:cs typeface="Roboto"/>
                 <a:sym typeface="Roboto"/>
               </a:rPr>
-              <a:t>Thanks to AI models, we can expect the next car failure ahead of time. </a:t>
-            </a:r>
-            <a:endParaRPr sz="1800" dirty="0">
+              <a:t>Imagine that I have a solution to tell me that you will be sick next week Sunday. It will be amazing if it is done in automobile industry</a:t>
+            </a:r>
+          </a:p>
+          <a:p>
+            <a:pPr lvl="0"/>
+            <a:endParaRPr lang="en-US" sz="1800" dirty="0">
               <a:solidFill>
                 <a:schemeClr val="dk1"/>
               </a:solidFill>
@@ -17899,42 +18093,8 @@
               <a:sym typeface="Roboto"/>
             </a:endParaRPr>
           </a:p>
-        </p:txBody>
-      </p:sp>
-      <p:sp>
-        <p:nvSpPr>
-          <p:cNvPr id="307" name="Google Shape;307;p40"/>
-          <p:cNvSpPr txBox="1"/>
-          <p:nvPr/>
-        </p:nvSpPr>
-        <p:spPr>
-          <a:xfrm>
-            <a:off x="568125" y="2129513"/>
-            <a:ext cx="5166300" cy="704400"/>
-          </a:xfrm>
-          <a:prstGeom prst="rect">
-            <a:avLst/>
-          </a:prstGeom>
-          <a:noFill/>
-          <a:ln>
-            <a:noFill/>
-          </a:ln>
-        </p:spPr>
-        <p:txBody>
-          <a:bodyPr spcFirstLastPara="1" wrap="square" lIns="91425" tIns="91425" rIns="91425" bIns="91425" anchor="t" anchorCtr="0">
-            <a:noAutofit/>
-          </a:bodyPr>
-          <a:lstStyle/>
-          <a:p>
-            <a:pPr marL="0" lvl="0" indent="0" algn="l" rtl="0">
-              <a:spcBef>
-                <a:spcPts val="0"/>
-              </a:spcBef>
-              <a:spcAft>
-                <a:spcPts val="0"/>
-              </a:spcAft>
-              <a:buNone/>
-            </a:pPr>
+          <a:p>
+            <a:pPr lvl="0"/>
             <a:r>
               <a:rPr lang="en-US" sz="1800" dirty="0">
                 <a:solidFill>
@@ -17945,9 +18105,12 @@
                 <a:cs typeface="Roboto"/>
                 <a:sym typeface="Roboto"/>
               </a:rPr>
-              <a:t>Multiple reading of sensors is not totally dependable. Hardware failure of sensors may occur</a:t>
-            </a:r>
-            <a:endParaRPr sz="1800" dirty="0">
+              <a:t>It will solve a problem faced by a lot of users</a:t>
+            </a:r>
+          </a:p>
+          <a:p>
+            <a:pPr lvl="0"/>
+            <a:endParaRPr lang="en-US" sz="1800" dirty="0">
               <a:solidFill>
                 <a:schemeClr val="dk1"/>
               </a:solidFill>
@@ -17957,42 +18120,8 @@
               <a:sym typeface="Roboto"/>
             </a:endParaRPr>
           </a:p>
-        </p:txBody>
-      </p:sp>
-      <p:sp>
-        <p:nvSpPr>
-          <p:cNvPr id="308" name="Google Shape;308;p40"/>
-          <p:cNvSpPr txBox="1"/>
-          <p:nvPr/>
-        </p:nvSpPr>
-        <p:spPr>
-          <a:xfrm>
-            <a:off x="568125" y="3054575"/>
-            <a:ext cx="5166300" cy="704400"/>
-          </a:xfrm>
-          <a:prstGeom prst="rect">
-            <a:avLst/>
-          </a:prstGeom>
-          <a:noFill/>
-          <a:ln>
-            <a:noFill/>
-          </a:ln>
-        </p:spPr>
-        <p:txBody>
-          <a:bodyPr spcFirstLastPara="1" wrap="square" lIns="91425" tIns="91425" rIns="91425" bIns="91425" anchor="t" anchorCtr="0">
-            <a:noAutofit/>
-          </a:bodyPr>
-          <a:lstStyle/>
-          <a:p>
-            <a:pPr marL="0" lvl="0" indent="0" algn="l" rtl="0">
-              <a:spcBef>
-                <a:spcPts val="0"/>
-              </a:spcBef>
-              <a:spcAft>
-                <a:spcPts val="0"/>
-              </a:spcAft>
-              <a:buNone/>
-            </a:pPr>
+          <a:p>
+            <a:pPr lvl="0"/>
             <a:r>
               <a:rPr lang="en-US" sz="1800" dirty="0">
                 <a:solidFill>
@@ -18003,7 +18132,46 @@
                 <a:cs typeface="Roboto"/>
                 <a:sym typeface="Roboto"/>
               </a:rPr>
-              <a:t>Some sensor readings may not be important in the expectation process. A method must be found to found those sensors. </a:t>
+              <a:t>Its an Application of IOT Field, So it will capture the interest of a lot of people</a:t>
+            </a:r>
+          </a:p>
+          <a:p>
+            <a:pPr lvl="0"/>
+            <a:endParaRPr lang="en-US" sz="1800" dirty="0">
+              <a:solidFill>
+                <a:schemeClr val="dk1"/>
+              </a:solidFill>
+              <a:latin typeface="Roboto"/>
+              <a:ea typeface="Roboto"/>
+              <a:cs typeface="Roboto"/>
+              <a:sym typeface="Roboto"/>
+            </a:endParaRPr>
+          </a:p>
+          <a:p>
+            <a:pPr lvl="0"/>
+            <a:endParaRPr lang="en-US" sz="1800" dirty="0">
+              <a:solidFill>
+                <a:schemeClr val="dk1"/>
+              </a:solidFill>
+              <a:latin typeface="Roboto"/>
+              <a:ea typeface="Roboto"/>
+              <a:cs typeface="Roboto"/>
+              <a:sym typeface="Roboto"/>
+            </a:endParaRPr>
+          </a:p>
+          <a:p>
+            <a:pPr lvl="0"/>
+            <a:r>
+              <a:rPr lang="en-US" sz="1800" dirty="0">
+                <a:solidFill>
+                  <a:schemeClr val="dk1"/>
+                </a:solidFill>
+                <a:latin typeface="Roboto"/>
+                <a:ea typeface="Roboto"/>
+                <a:cs typeface="Roboto"/>
+                <a:sym typeface="Roboto"/>
+              </a:rPr>
+              <a:t>The usage of regression method in such problem.</a:t>
             </a:r>
             <a:endParaRPr sz="1800" dirty="0">
               <a:solidFill>
@@ -18138,10 +18306,10 @@
       </p:sp>
       <p:pic>
         <p:nvPicPr>
-          <p:cNvPr id="2" name="Picture 1">
+          <p:cNvPr id="3" name="Picture 2">
             <a:extLst>
               <a:ext uri="{FF2B5EF4-FFF2-40B4-BE49-F238E27FC236}">
-                <a16:creationId xmlns:a16="http://schemas.microsoft.com/office/drawing/2014/main" id="{F0DC8E92-F19C-4A1E-B7CF-1B16FB025779}"/>
+                <a16:creationId xmlns:a16="http://schemas.microsoft.com/office/drawing/2014/main" id="{8071826D-668C-4037-8F0B-F0600B7A07E1}"/>
               </a:ext>
             </a:extLst>
           </p:cNvPr>
@@ -18158,14 +18326,67 @@
         </p:blipFill>
         <p:spPr>
           <a:xfrm>
-            <a:off x="681037" y="1111637"/>
-            <a:ext cx="7781925" cy="3533775"/>
+            <a:off x="2704667" y="929796"/>
+            <a:ext cx="5912860" cy="3760252"/>
           </a:xfrm>
           <a:prstGeom prst="rect">
             <a:avLst/>
           </a:prstGeom>
         </p:spPr>
       </p:pic>
+      <p:sp>
+        <p:nvSpPr>
+          <p:cNvPr id="4" name="TextBox 3">
+            <a:extLst>
+              <a:ext uri="{FF2B5EF4-FFF2-40B4-BE49-F238E27FC236}">
+                <a16:creationId xmlns:a16="http://schemas.microsoft.com/office/drawing/2014/main" id="{4D30CFB4-E000-4EB9-97B0-54991A647D08}"/>
+              </a:ext>
+            </a:extLst>
+          </p:cNvPr>
+          <p:cNvSpPr txBox="1"/>
+          <p:nvPr/>
+        </p:nvSpPr>
+        <p:spPr>
+          <a:xfrm>
+            <a:off x="0" y="1018309"/>
+            <a:ext cx="2611582" cy="2893100"/>
+          </a:xfrm>
+          <a:prstGeom prst="rect">
+            <a:avLst/>
+          </a:prstGeom>
+          <a:noFill/>
+        </p:spPr>
+        <p:txBody>
+          <a:bodyPr wrap="square" rtlCol="0">
+            <a:spAutoFit/>
+          </a:bodyPr>
+          <a:lstStyle/>
+          <a:p>
+            <a:r>
+              <a:rPr lang="en-US" dirty="0"/>
+              <a:t>There is</a:t>
+            </a:r>
+            <a:r>
+              <a:rPr lang="ar-SA" dirty="0"/>
+              <a:t> </a:t>
+            </a:r>
+            <a:r>
+              <a:rPr lang="en-US" dirty="0"/>
+              <a:t>concern regarding security as stated by one of the stakeholders “The linked between machine learning concepts &amp; computer security.”</a:t>
+            </a:r>
+            <a:br>
+              <a:rPr lang="en-US" dirty="0"/>
+            </a:br>
+            <a:br>
+              <a:rPr lang="en-US" dirty="0"/>
+            </a:br>
+            <a:r>
+              <a:rPr lang="en-US" dirty="0"/>
+              <a:t>So implementing UC1 has higher probability than implementing UC2, as UC2 has security concern, the data will be transformed through the internet. </a:t>
+            </a:r>
+          </a:p>
+        </p:txBody>
+      </p:sp>
     </p:spTree>
   </p:cSld>
   <p:clrMapOvr>
@@ -19016,661 +19237,6 @@
       </p:sp>
       <p:sp>
         <p:nvSpPr>
-          <p:cNvPr id="329" name="Google Shape;329;p43"/>
-          <p:cNvSpPr/>
-          <p:nvPr/>
-        </p:nvSpPr>
-        <p:spPr>
-          <a:xfrm>
-            <a:off x="6315588" y="1765875"/>
-            <a:ext cx="345000" cy="338400"/>
-          </a:xfrm>
-          <a:prstGeom prst="ellipse">
-            <a:avLst/>
-          </a:prstGeom>
-          <a:solidFill>
-            <a:schemeClr val="dk1"/>
-          </a:solidFill>
-          <a:ln w="9525" cap="flat" cmpd="sng">
-            <a:solidFill>
-              <a:srgbClr val="666666"/>
-            </a:solidFill>
-            <a:prstDash val="solid"/>
-            <a:round/>
-            <a:headEnd type="none" w="sm" len="sm"/>
-            <a:tailEnd type="none" w="sm" len="sm"/>
-          </a:ln>
-        </p:spPr>
-        <p:txBody>
-          <a:bodyPr spcFirstLastPara="1" wrap="square" lIns="0" tIns="0" rIns="0" bIns="0" anchor="ctr" anchorCtr="0">
-            <a:noAutofit/>
-          </a:bodyPr>
-          <a:lstStyle/>
-          <a:p>
-            <a:pPr marL="0" lvl="0" indent="0" algn="ctr" rtl="0">
-              <a:spcBef>
-                <a:spcPts val="0"/>
-              </a:spcBef>
-              <a:spcAft>
-                <a:spcPts val="0"/>
-              </a:spcAft>
-              <a:buNone/>
-            </a:pPr>
-            <a:r>
-              <a:rPr lang="en" sz="900">
-                <a:solidFill>
-                  <a:srgbClr val="FFFFFF"/>
-                </a:solidFill>
-              </a:rPr>
-              <a:t>UC</a:t>
-            </a:r>
-            <a:br>
-              <a:rPr lang="en" sz="900">
-                <a:solidFill>
-                  <a:srgbClr val="FFFFFF"/>
-                </a:solidFill>
-              </a:rPr>
-            </a:br>
-            <a:r>
-              <a:rPr lang="en" sz="900">
-                <a:solidFill>
-                  <a:srgbClr val="FFFFFF"/>
-                </a:solidFill>
-              </a:rPr>
-              <a:t>1</a:t>
-            </a:r>
-            <a:endParaRPr sz="900">
-              <a:solidFill>
-                <a:srgbClr val="FFFFFF"/>
-              </a:solidFill>
-            </a:endParaRPr>
-          </a:p>
-        </p:txBody>
-      </p:sp>
-      <p:sp>
-        <p:nvSpPr>
-          <p:cNvPr id="330" name="Google Shape;330;p43"/>
-          <p:cNvSpPr/>
-          <p:nvPr/>
-        </p:nvSpPr>
-        <p:spPr>
-          <a:xfrm>
-            <a:off x="6315588" y="2149319"/>
-            <a:ext cx="345000" cy="338400"/>
-          </a:xfrm>
-          <a:prstGeom prst="ellipse">
-            <a:avLst/>
-          </a:prstGeom>
-          <a:solidFill>
-            <a:schemeClr val="dk1"/>
-          </a:solidFill>
-          <a:ln w="9525" cap="flat" cmpd="sng">
-            <a:solidFill>
-              <a:srgbClr val="666666"/>
-            </a:solidFill>
-            <a:prstDash val="solid"/>
-            <a:round/>
-            <a:headEnd type="none" w="sm" len="sm"/>
-            <a:tailEnd type="none" w="sm" len="sm"/>
-          </a:ln>
-        </p:spPr>
-        <p:txBody>
-          <a:bodyPr spcFirstLastPara="1" wrap="square" lIns="0" tIns="0" rIns="0" bIns="0" anchor="ctr" anchorCtr="0">
-            <a:noAutofit/>
-          </a:bodyPr>
-          <a:lstStyle/>
-          <a:p>
-            <a:pPr marL="0" lvl="0" indent="0" algn="ctr" rtl="0">
-              <a:spcBef>
-                <a:spcPts val="0"/>
-              </a:spcBef>
-              <a:spcAft>
-                <a:spcPts val="0"/>
-              </a:spcAft>
-              <a:buNone/>
-            </a:pPr>
-            <a:r>
-              <a:rPr lang="en" sz="900">
-                <a:solidFill>
-                  <a:srgbClr val="FFFFFF"/>
-                </a:solidFill>
-              </a:rPr>
-              <a:t>UC</a:t>
-            </a:r>
-            <a:br>
-              <a:rPr lang="en" sz="900">
-                <a:solidFill>
-                  <a:srgbClr val="FFFFFF"/>
-                </a:solidFill>
-              </a:rPr>
-            </a:br>
-            <a:r>
-              <a:rPr lang="en" sz="900">
-                <a:solidFill>
-                  <a:srgbClr val="FFFFFF"/>
-                </a:solidFill>
-              </a:rPr>
-              <a:t>2</a:t>
-            </a:r>
-            <a:endParaRPr sz="900">
-              <a:solidFill>
-                <a:srgbClr val="FFFFFF"/>
-              </a:solidFill>
-            </a:endParaRPr>
-          </a:p>
-        </p:txBody>
-      </p:sp>
-      <p:sp>
-        <p:nvSpPr>
-          <p:cNvPr id="331" name="Google Shape;331;p43"/>
-          <p:cNvSpPr/>
-          <p:nvPr/>
-        </p:nvSpPr>
-        <p:spPr>
-          <a:xfrm>
-            <a:off x="6315588" y="2532764"/>
-            <a:ext cx="345000" cy="338400"/>
-          </a:xfrm>
-          <a:prstGeom prst="ellipse">
-            <a:avLst/>
-          </a:prstGeom>
-          <a:solidFill>
-            <a:schemeClr val="dk1"/>
-          </a:solidFill>
-          <a:ln w="9525" cap="flat" cmpd="sng">
-            <a:solidFill>
-              <a:srgbClr val="666666"/>
-            </a:solidFill>
-            <a:prstDash val="solid"/>
-            <a:round/>
-            <a:headEnd type="none" w="sm" len="sm"/>
-            <a:tailEnd type="none" w="sm" len="sm"/>
-          </a:ln>
-        </p:spPr>
-        <p:txBody>
-          <a:bodyPr spcFirstLastPara="1" wrap="square" lIns="0" tIns="0" rIns="0" bIns="0" anchor="ctr" anchorCtr="0">
-            <a:noAutofit/>
-          </a:bodyPr>
-          <a:lstStyle/>
-          <a:p>
-            <a:pPr marL="0" lvl="0" indent="0" algn="ctr" rtl="0">
-              <a:spcBef>
-                <a:spcPts val="0"/>
-              </a:spcBef>
-              <a:spcAft>
-                <a:spcPts val="0"/>
-              </a:spcAft>
-              <a:buNone/>
-            </a:pPr>
-            <a:r>
-              <a:rPr lang="en" sz="900">
-                <a:solidFill>
-                  <a:srgbClr val="FFFFFF"/>
-                </a:solidFill>
-              </a:rPr>
-              <a:t>UC</a:t>
-            </a:r>
-            <a:br>
-              <a:rPr lang="en" sz="900">
-                <a:solidFill>
-                  <a:srgbClr val="FFFFFF"/>
-                </a:solidFill>
-              </a:rPr>
-            </a:br>
-            <a:r>
-              <a:rPr lang="en" sz="900">
-                <a:solidFill>
-                  <a:srgbClr val="FFFFFF"/>
-                </a:solidFill>
-              </a:rPr>
-              <a:t>3</a:t>
-            </a:r>
-            <a:endParaRPr sz="900">
-              <a:solidFill>
-                <a:srgbClr val="FFFFFF"/>
-              </a:solidFill>
-            </a:endParaRPr>
-          </a:p>
-        </p:txBody>
-      </p:sp>
-      <p:sp>
-        <p:nvSpPr>
-          <p:cNvPr id="332" name="Google Shape;332;p43"/>
-          <p:cNvSpPr/>
-          <p:nvPr/>
-        </p:nvSpPr>
-        <p:spPr>
-          <a:xfrm>
-            <a:off x="6315588" y="2916208"/>
-            <a:ext cx="345000" cy="338400"/>
-          </a:xfrm>
-          <a:prstGeom prst="ellipse">
-            <a:avLst/>
-          </a:prstGeom>
-          <a:solidFill>
-            <a:schemeClr val="dk1"/>
-          </a:solidFill>
-          <a:ln w="9525" cap="flat" cmpd="sng">
-            <a:solidFill>
-              <a:srgbClr val="666666"/>
-            </a:solidFill>
-            <a:prstDash val="solid"/>
-            <a:round/>
-            <a:headEnd type="none" w="sm" len="sm"/>
-            <a:tailEnd type="none" w="sm" len="sm"/>
-          </a:ln>
-        </p:spPr>
-        <p:txBody>
-          <a:bodyPr spcFirstLastPara="1" wrap="square" lIns="0" tIns="0" rIns="0" bIns="0" anchor="ctr" anchorCtr="0">
-            <a:noAutofit/>
-          </a:bodyPr>
-          <a:lstStyle/>
-          <a:p>
-            <a:pPr marL="0" lvl="0" indent="0" algn="ctr" rtl="0">
-              <a:spcBef>
-                <a:spcPts val="0"/>
-              </a:spcBef>
-              <a:spcAft>
-                <a:spcPts val="0"/>
-              </a:spcAft>
-              <a:buNone/>
-            </a:pPr>
-            <a:r>
-              <a:rPr lang="en" sz="900">
-                <a:solidFill>
-                  <a:srgbClr val="FFFFFF"/>
-                </a:solidFill>
-              </a:rPr>
-              <a:t>UC</a:t>
-            </a:r>
-            <a:br>
-              <a:rPr lang="en" sz="900">
-                <a:solidFill>
-                  <a:srgbClr val="FFFFFF"/>
-                </a:solidFill>
-              </a:rPr>
-            </a:br>
-            <a:r>
-              <a:rPr lang="en" sz="900">
-                <a:solidFill>
-                  <a:srgbClr val="FFFFFF"/>
-                </a:solidFill>
-              </a:rPr>
-              <a:t>4</a:t>
-            </a:r>
-            <a:endParaRPr sz="900">
-              <a:solidFill>
-                <a:srgbClr val="FFFFFF"/>
-              </a:solidFill>
-            </a:endParaRPr>
-          </a:p>
-        </p:txBody>
-      </p:sp>
-      <p:sp>
-        <p:nvSpPr>
-          <p:cNvPr id="333" name="Google Shape;333;p43"/>
-          <p:cNvSpPr/>
-          <p:nvPr/>
-        </p:nvSpPr>
-        <p:spPr>
-          <a:xfrm>
-            <a:off x="6315588" y="3299653"/>
-            <a:ext cx="345000" cy="338400"/>
-          </a:xfrm>
-          <a:prstGeom prst="ellipse">
-            <a:avLst/>
-          </a:prstGeom>
-          <a:solidFill>
-            <a:schemeClr val="dk1"/>
-          </a:solidFill>
-          <a:ln w="9525" cap="flat" cmpd="sng">
-            <a:solidFill>
-              <a:srgbClr val="666666"/>
-            </a:solidFill>
-            <a:prstDash val="solid"/>
-            <a:round/>
-            <a:headEnd type="none" w="sm" len="sm"/>
-            <a:tailEnd type="none" w="sm" len="sm"/>
-          </a:ln>
-        </p:spPr>
-        <p:txBody>
-          <a:bodyPr spcFirstLastPara="1" wrap="square" lIns="0" tIns="0" rIns="0" bIns="0" anchor="ctr" anchorCtr="0">
-            <a:noAutofit/>
-          </a:bodyPr>
-          <a:lstStyle/>
-          <a:p>
-            <a:pPr marL="0" lvl="0" indent="0" algn="ctr" rtl="0">
-              <a:spcBef>
-                <a:spcPts val="0"/>
-              </a:spcBef>
-              <a:spcAft>
-                <a:spcPts val="0"/>
-              </a:spcAft>
-              <a:buNone/>
-            </a:pPr>
-            <a:r>
-              <a:rPr lang="en" sz="900">
-                <a:solidFill>
-                  <a:srgbClr val="FFFFFF"/>
-                </a:solidFill>
-              </a:rPr>
-              <a:t>UC</a:t>
-            </a:r>
-            <a:br>
-              <a:rPr lang="en" sz="900">
-                <a:solidFill>
-                  <a:srgbClr val="FFFFFF"/>
-                </a:solidFill>
-              </a:rPr>
-            </a:br>
-            <a:r>
-              <a:rPr lang="en" sz="900">
-                <a:solidFill>
-                  <a:srgbClr val="FFFFFF"/>
-                </a:solidFill>
-              </a:rPr>
-              <a:t>5</a:t>
-            </a:r>
-            <a:endParaRPr sz="900">
-              <a:solidFill>
-                <a:srgbClr val="FFFFFF"/>
-              </a:solidFill>
-            </a:endParaRPr>
-          </a:p>
-        </p:txBody>
-      </p:sp>
-      <p:sp>
-        <p:nvSpPr>
-          <p:cNvPr id="334" name="Google Shape;334;p43"/>
-          <p:cNvSpPr txBox="1"/>
-          <p:nvPr/>
-        </p:nvSpPr>
-        <p:spPr>
-          <a:xfrm>
-            <a:off x="6660600" y="1765875"/>
-            <a:ext cx="2483400" cy="415500"/>
-          </a:xfrm>
-          <a:prstGeom prst="rect">
-            <a:avLst/>
-          </a:prstGeom>
-          <a:noFill/>
-          <a:ln>
-            <a:noFill/>
-          </a:ln>
-        </p:spPr>
-        <p:txBody>
-          <a:bodyPr spcFirstLastPara="1" wrap="square" lIns="91425" tIns="91425" rIns="91425" bIns="91425" anchor="t" anchorCtr="0">
-            <a:noAutofit/>
-          </a:bodyPr>
-          <a:lstStyle/>
-          <a:p>
-            <a:pPr marL="0" lvl="0" indent="0" algn="l" rtl="0">
-              <a:spcBef>
-                <a:spcPts val="0"/>
-              </a:spcBef>
-              <a:spcAft>
-                <a:spcPts val="0"/>
-              </a:spcAft>
-              <a:buNone/>
-            </a:pPr>
-            <a:r>
-              <a:rPr lang="en" sz="1100">
-                <a:solidFill>
-                  <a:schemeClr val="dk1"/>
-                </a:solidFill>
-                <a:latin typeface="Open Sans"/>
-                <a:ea typeface="Open Sans"/>
-                <a:cs typeface="Open Sans"/>
-                <a:sym typeface="Open Sans"/>
-              </a:rPr>
-              <a:t>UC1: &lt;Enter Name 1 Here&gt;</a:t>
-            </a:r>
-            <a:endParaRPr sz="1100">
-              <a:solidFill>
-                <a:schemeClr val="dk1"/>
-              </a:solidFill>
-              <a:latin typeface="Open Sans"/>
-              <a:ea typeface="Open Sans"/>
-              <a:cs typeface="Open Sans"/>
-              <a:sym typeface="Open Sans"/>
-            </a:endParaRPr>
-          </a:p>
-        </p:txBody>
-      </p:sp>
-      <p:sp>
-        <p:nvSpPr>
-          <p:cNvPr id="335" name="Google Shape;335;p43"/>
-          <p:cNvSpPr txBox="1"/>
-          <p:nvPr/>
-        </p:nvSpPr>
-        <p:spPr>
-          <a:xfrm>
-            <a:off x="6660600" y="2144540"/>
-            <a:ext cx="2483400" cy="415500"/>
-          </a:xfrm>
-          <a:prstGeom prst="rect">
-            <a:avLst/>
-          </a:prstGeom>
-          <a:noFill/>
-          <a:ln>
-            <a:noFill/>
-          </a:ln>
-        </p:spPr>
-        <p:txBody>
-          <a:bodyPr spcFirstLastPara="1" wrap="square" lIns="91425" tIns="91425" rIns="91425" bIns="91425" anchor="t" anchorCtr="0">
-            <a:noAutofit/>
-          </a:bodyPr>
-          <a:lstStyle/>
-          <a:p>
-            <a:pPr marL="0" lvl="0" indent="0" algn="l" rtl="0">
-              <a:spcBef>
-                <a:spcPts val="0"/>
-              </a:spcBef>
-              <a:spcAft>
-                <a:spcPts val="0"/>
-              </a:spcAft>
-              <a:buNone/>
-            </a:pPr>
-            <a:r>
-              <a:rPr lang="en" sz="1100">
-                <a:solidFill>
-                  <a:schemeClr val="dk1"/>
-                </a:solidFill>
-                <a:latin typeface="Open Sans"/>
-                <a:ea typeface="Open Sans"/>
-                <a:cs typeface="Open Sans"/>
-                <a:sym typeface="Open Sans"/>
-              </a:rPr>
-              <a:t>UC2: &lt;Enter Name 2 Here&gt;</a:t>
-            </a:r>
-            <a:endParaRPr sz="1100">
-              <a:solidFill>
-                <a:schemeClr val="dk1"/>
-              </a:solidFill>
-              <a:latin typeface="Open Sans"/>
-              <a:ea typeface="Open Sans"/>
-              <a:cs typeface="Open Sans"/>
-              <a:sym typeface="Open Sans"/>
-            </a:endParaRPr>
-          </a:p>
-        </p:txBody>
-      </p:sp>
-      <p:sp>
-        <p:nvSpPr>
-          <p:cNvPr id="336" name="Google Shape;336;p43"/>
-          <p:cNvSpPr txBox="1"/>
-          <p:nvPr/>
-        </p:nvSpPr>
-        <p:spPr>
-          <a:xfrm>
-            <a:off x="6660600" y="2523206"/>
-            <a:ext cx="2483400" cy="415500"/>
-          </a:xfrm>
-          <a:prstGeom prst="rect">
-            <a:avLst/>
-          </a:prstGeom>
-          <a:noFill/>
-          <a:ln>
-            <a:noFill/>
-          </a:ln>
-        </p:spPr>
-        <p:txBody>
-          <a:bodyPr spcFirstLastPara="1" wrap="square" lIns="91425" tIns="91425" rIns="91425" bIns="91425" anchor="t" anchorCtr="0">
-            <a:noAutofit/>
-          </a:bodyPr>
-          <a:lstStyle/>
-          <a:p>
-            <a:pPr marL="0" lvl="0" indent="0" algn="l" rtl="0">
-              <a:spcBef>
-                <a:spcPts val="0"/>
-              </a:spcBef>
-              <a:spcAft>
-                <a:spcPts val="0"/>
-              </a:spcAft>
-              <a:buNone/>
-            </a:pPr>
-            <a:r>
-              <a:rPr lang="en" sz="1100">
-                <a:solidFill>
-                  <a:schemeClr val="dk1"/>
-                </a:solidFill>
-                <a:latin typeface="Open Sans"/>
-                <a:ea typeface="Open Sans"/>
-                <a:cs typeface="Open Sans"/>
-                <a:sym typeface="Open Sans"/>
-              </a:rPr>
-              <a:t>UC3: &lt;Enter Name 3 Here&gt;</a:t>
-            </a:r>
-            <a:endParaRPr sz="1100">
-              <a:solidFill>
-                <a:schemeClr val="dk1"/>
-              </a:solidFill>
-              <a:latin typeface="Open Sans"/>
-              <a:ea typeface="Open Sans"/>
-              <a:cs typeface="Open Sans"/>
-              <a:sym typeface="Open Sans"/>
-            </a:endParaRPr>
-          </a:p>
-        </p:txBody>
-      </p:sp>
-      <p:sp>
-        <p:nvSpPr>
-          <p:cNvPr id="337" name="Google Shape;337;p43"/>
-          <p:cNvSpPr txBox="1"/>
-          <p:nvPr/>
-        </p:nvSpPr>
-        <p:spPr>
-          <a:xfrm>
-            <a:off x="6660600" y="2901871"/>
-            <a:ext cx="2483400" cy="415500"/>
-          </a:xfrm>
-          <a:prstGeom prst="rect">
-            <a:avLst/>
-          </a:prstGeom>
-          <a:noFill/>
-          <a:ln>
-            <a:noFill/>
-          </a:ln>
-        </p:spPr>
-        <p:txBody>
-          <a:bodyPr spcFirstLastPara="1" wrap="square" lIns="91425" tIns="91425" rIns="91425" bIns="91425" anchor="t" anchorCtr="0">
-            <a:noAutofit/>
-          </a:bodyPr>
-          <a:lstStyle/>
-          <a:p>
-            <a:pPr marL="0" lvl="0" indent="0" algn="l" rtl="0">
-              <a:spcBef>
-                <a:spcPts val="0"/>
-              </a:spcBef>
-              <a:spcAft>
-                <a:spcPts val="0"/>
-              </a:spcAft>
-              <a:buNone/>
-            </a:pPr>
-            <a:r>
-              <a:rPr lang="en" sz="1100">
-                <a:solidFill>
-                  <a:schemeClr val="dk1"/>
-                </a:solidFill>
-                <a:latin typeface="Open Sans"/>
-                <a:ea typeface="Open Sans"/>
-                <a:cs typeface="Open Sans"/>
-                <a:sym typeface="Open Sans"/>
-              </a:rPr>
-              <a:t>UC4: &lt;Enter Name 4 Here&gt;</a:t>
-            </a:r>
-            <a:endParaRPr sz="1100">
-              <a:solidFill>
-                <a:schemeClr val="dk1"/>
-              </a:solidFill>
-              <a:latin typeface="Open Sans"/>
-              <a:ea typeface="Open Sans"/>
-              <a:cs typeface="Open Sans"/>
-              <a:sym typeface="Open Sans"/>
-            </a:endParaRPr>
-          </a:p>
-        </p:txBody>
-      </p:sp>
-      <p:sp>
-        <p:nvSpPr>
-          <p:cNvPr id="338" name="Google Shape;338;p43"/>
-          <p:cNvSpPr txBox="1"/>
-          <p:nvPr/>
-        </p:nvSpPr>
-        <p:spPr>
-          <a:xfrm>
-            <a:off x="6660600" y="3280536"/>
-            <a:ext cx="2483400" cy="415500"/>
-          </a:xfrm>
-          <a:prstGeom prst="rect">
-            <a:avLst/>
-          </a:prstGeom>
-          <a:noFill/>
-          <a:ln>
-            <a:noFill/>
-          </a:ln>
-        </p:spPr>
-        <p:txBody>
-          <a:bodyPr spcFirstLastPara="1" wrap="square" lIns="91425" tIns="91425" rIns="91425" bIns="91425" anchor="t" anchorCtr="0">
-            <a:noAutofit/>
-          </a:bodyPr>
-          <a:lstStyle/>
-          <a:p>
-            <a:pPr marL="0" lvl="0" indent="0" algn="l" rtl="0">
-              <a:spcBef>
-                <a:spcPts val="0"/>
-              </a:spcBef>
-              <a:spcAft>
-                <a:spcPts val="0"/>
-              </a:spcAft>
-              <a:buNone/>
-            </a:pPr>
-            <a:r>
-              <a:rPr lang="en" sz="1100">
-                <a:solidFill>
-                  <a:schemeClr val="dk1"/>
-                </a:solidFill>
-                <a:latin typeface="Open Sans"/>
-                <a:ea typeface="Open Sans"/>
-                <a:cs typeface="Open Sans"/>
-                <a:sym typeface="Open Sans"/>
-              </a:rPr>
-              <a:t>UC5: &lt;Enter Name 5 Here&gt;</a:t>
-            </a:r>
-            <a:endParaRPr sz="1100">
-              <a:solidFill>
-                <a:schemeClr val="dk1"/>
-              </a:solidFill>
-              <a:latin typeface="Open Sans"/>
-              <a:ea typeface="Open Sans"/>
-              <a:cs typeface="Open Sans"/>
-              <a:sym typeface="Open Sans"/>
-            </a:endParaRPr>
-          </a:p>
-        </p:txBody>
-      </p:sp>
-      <p:sp>
-        <p:nvSpPr>
           <p:cNvPr id="339" name="Google Shape;339;p43"/>
           <p:cNvSpPr txBox="1"/>
           <p:nvPr/>
@@ -20218,10 +19784,10 @@
       </p:sp>
       <p:sp>
         <p:nvSpPr>
-          <p:cNvPr id="25" name="Google Shape;331;p43">
+          <p:cNvPr id="26" name="Google Shape;211;p28">
             <a:extLst>
               <a:ext uri="{FF2B5EF4-FFF2-40B4-BE49-F238E27FC236}">
-                <a16:creationId xmlns:a16="http://schemas.microsoft.com/office/drawing/2014/main" id="{79B783B6-442B-40B4-8F14-31C7A809C5D1}"/>
+                <a16:creationId xmlns:a16="http://schemas.microsoft.com/office/drawing/2014/main" id="{497D4B41-79E1-4053-941C-43EEDEC1A5B7}"/>
               </a:ext>
             </a:extLst>
           </p:cNvPr>
@@ -20230,7 +19796,7 @@
         </p:nvSpPr>
         <p:spPr>
           <a:xfrm>
-            <a:off x="3485447" y="2165151"/>
+            <a:off x="6212774" y="1613775"/>
             <a:ext cx="345000" cy="338400"/>
           </a:xfrm>
           <a:prstGeom prst="ellipse">
@@ -20265,7 +19831,7 @@
               <a:buNone/>
             </a:pPr>
             <a:r>
-              <a:rPr lang="en" sz="900">
+              <a:rPr lang="en" sz="900" dirty="0">
                 <a:solidFill>
                   <a:srgbClr val="FFFFFF"/>
                 </a:solidFill>
@@ -20273,19 +19839,774 @@
               <a:t>UC</a:t>
             </a:r>
             <a:br>
-              <a:rPr lang="en" sz="900">
+              <a:rPr lang="en" sz="900" dirty="0">
                 <a:solidFill>
                   <a:srgbClr val="FFFFFF"/>
                 </a:solidFill>
               </a:rPr>
             </a:br>
             <a:r>
+              <a:rPr lang="en" sz="900" dirty="0">
+                <a:solidFill>
+                  <a:srgbClr val="FFFFFF"/>
+                </a:solidFill>
+              </a:rPr>
+              <a:t>1</a:t>
+            </a:r>
+            <a:endParaRPr sz="900" dirty="0">
+              <a:solidFill>
+                <a:srgbClr val="FFFFFF"/>
+              </a:solidFill>
+            </a:endParaRPr>
+          </a:p>
+        </p:txBody>
+      </p:sp>
+      <p:sp>
+        <p:nvSpPr>
+          <p:cNvPr id="27" name="Google Shape;212;p28">
+            <a:extLst>
+              <a:ext uri="{FF2B5EF4-FFF2-40B4-BE49-F238E27FC236}">
+                <a16:creationId xmlns:a16="http://schemas.microsoft.com/office/drawing/2014/main" id="{B245F66B-8EB1-4351-9BA6-0B83B375A689}"/>
+              </a:ext>
+            </a:extLst>
+          </p:cNvPr>
+          <p:cNvSpPr/>
+          <p:nvPr/>
+        </p:nvSpPr>
+        <p:spPr>
+          <a:xfrm>
+            <a:off x="6212774" y="1997219"/>
+            <a:ext cx="345000" cy="338400"/>
+          </a:xfrm>
+          <a:prstGeom prst="ellipse">
+            <a:avLst/>
+          </a:prstGeom>
+          <a:solidFill>
+            <a:schemeClr val="dk1"/>
+          </a:solidFill>
+          <a:ln w="9525" cap="flat" cmpd="sng">
+            <a:solidFill>
+              <a:srgbClr val="666666"/>
+            </a:solidFill>
+            <a:prstDash val="solid"/>
+            <a:round/>
+            <a:headEnd type="none" w="sm" len="sm"/>
+            <a:tailEnd type="none" w="sm" len="sm"/>
+          </a:ln>
+        </p:spPr>
+        <p:txBody>
+          <a:bodyPr spcFirstLastPara="1" wrap="square" lIns="0" tIns="0" rIns="0" bIns="0" anchor="ctr" anchorCtr="0">
+            <a:noAutofit/>
+          </a:bodyPr>
+          <a:lstStyle/>
+          <a:p>
+            <a:pPr marL="0" lvl="0" indent="0" algn="ctr" rtl="0">
+              <a:spcBef>
+                <a:spcPts val="0"/>
+              </a:spcBef>
+              <a:spcAft>
+                <a:spcPts val="0"/>
+              </a:spcAft>
+              <a:buNone/>
+            </a:pPr>
+            <a:r>
+              <a:rPr lang="en" sz="900">
+                <a:solidFill>
+                  <a:srgbClr val="FFFFFF"/>
+                </a:solidFill>
+              </a:rPr>
+              <a:t>UC</a:t>
+            </a:r>
+            <a:br>
+              <a:rPr lang="en" sz="900">
+                <a:solidFill>
+                  <a:srgbClr val="FFFFFF"/>
+                </a:solidFill>
+              </a:rPr>
+            </a:br>
+            <a:r>
+              <a:rPr lang="en" sz="900">
+                <a:solidFill>
+                  <a:srgbClr val="FFFFFF"/>
+                </a:solidFill>
+              </a:rPr>
+              <a:t>2</a:t>
+            </a:r>
+            <a:endParaRPr sz="900">
+              <a:solidFill>
+                <a:srgbClr val="FFFFFF"/>
+              </a:solidFill>
+            </a:endParaRPr>
+          </a:p>
+        </p:txBody>
+      </p:sp>
+      <p:sp>
+        <p:nvSpPr>
+          <p:cNvPr id="28" name="Google Shape;213;p28">
+            <a:extLst>
+              <a:ext uri="{FF2B5EF4-FFF2-40B4-BE49-F238E27FC236}">
+                <a16:creationId xmlns:a16="http://schemas.microsoft.com/office/drawing/2014/main" id="{F74BA752-440A-470D-83F0-67B4D0CEB8E4}"/>
+              </a:ext>
+            </a:extLst>
+          </p:cNvPr>
+          <p:cNvSpPr/>
+          <p:nvPr/>
+        </p:nvSpPr>
+        <p:spPr>
+          <a:xfrm>
+            <a:off x="6212774" y="2380664"/>
+            <a:ext cx="345000" cy="338400"/>
+          </a:xfrm>
+          <a:prstGeom prst="ellipse">
+            <a:avLst/>
+          </a:prstGeom>
+          <a:solidFill>
+            <a:schemeClr val="dk1"/>
+          </a:solidFill>
+          <a:ln w="9525" cap="flat" cmpd="sng">
+            <a:solidFill>
+              <a:srgbClr val="666666"/>
+            </a:solidFill>
+            <a:prstDash val="solid"/>
+            <a:round/>
+            <a:headEnd type="none" w="sm" len="sm"/>
+            <a:tailEnd type="none" w="sm" len="sm"/>
+          </a:ln>
+        </p:spPr>
+        <p:txBody>
+          <a:bodyPr spcFirstLastPara="1" wrap="square" lIns="0" tIns="0" rIns="0" bIns="0" anchor="ctr" anchorCtr="0">
+            <a:noAutofit/>
+          </a:bodyPr>
+          <a:lstStyle/>
+          <a:p>
+            <a:pPr marL="0" lvl="0" indent="0" algn="ctr" rtl="0">
+              <a:spcBef>
+                <a:spcPts val="0"/>
+              </a:spcBef>
+              <a:spcAft>
+                <a:spcPts val="0"/>
+              </a:spcAft>
+              <a:buNone/>
+            </a:pPr>
+            <a:r>
+              <a:rPr lang="en" sz="900">
+                <a:solidFill>
+                  <a:srgbClr val="FFFFFF"/>
+                </a:solidFill>
+              </a:rPr>
+              <a:t>UC</a:t>
+            </a:r>
+            <a:br>
+              <a:rPr lang="en" sz="900">
+                <a:solidFill>
+                  <a:srgbClr val="FFFFFF"/>
+                </a:solidFill>
+              </a:rPr>
+            </a:br>
+            <a:r>
               <a:rPr lang="en" sz="900">
                 <a:solidFill>
                   <a:srgbClr val="FFFFFF"/>
                 </a:solidFill>
               </a:rPr>
               <a:t>3</a:t>
+            </a:r>
+            <a:endParaRPr sz="900">
+              <a:solidFill>
+                <a:srgbClr val="FFFFFF"/>
+              </a:solidFill>
+            </a:endParaRPr>
+          </a:p>
+        </p:txBody>
+      </p:sp>
+      <p:sp>
+        <p:nvSpPr>
+          <p:cNvPr id="29" name="Google Shape;214;p28">
+            <a:extLst>
+              <a:ext uri="{FF2B5EF4-FFF2-40B4-BE49-F238E27FC236}">
+                <a16:creationId xmlns:a16="http://schemas.microsoft.com/office/drawing/2014/main" id="{E82EDC6A-6D71-43F9-96B1-AC411DE2C1D8}"/>
+              </a:ext>
+            </a:extLst>
+          </p:cNvPr>
+          <p:cNvSpPr/>
+          <p:nvPr/>
+        </p:nvSpPr>
+        <p:spPr>
+          <a:xfrm>
+            <a:off x="6212774" y="2764108"/>
+            <a:ext cx="345000" cy="338400"/>
+          </a:xfrm>
+          <a:prstGeom prst="ellipse">
+            <a:avLst/>
+          </a:prstGeom>
+          <a:solidFill>
+            <a:schemeClr val="dk1"/>
+          </a:solidFill>
+          <a:ln w="9525" cap="flat" cmpd="sng">
+            <a:solidFill>
+              <a:srgbClr val="666666"/>
+            </a:solidFill>
+            <a:prstDash val="solid"/>
+            <a:round/>
+            <a:headEnd type="none" w="sm" len="sm"/>
+            <a:tailEnd type="none" w="sm" len="sm"/>
+          </a:ln>
+        </p:spPr>
+        <p:txBody>
+          <a:bodyPr spcFirstLastPara="1" wrap="square" lIns="0" tIns="0" rIns="0" bIns="0" anchor="ctr" anchorCtr="0">
+            <a:noAutofit/>
+          </a:bodyPr>
+          <a:lstStyle/>
+          <a:p>
+            <a:pPr marL="0" lvl="0" indent="0" algn="ctr" rtl="0">
+              <a:spcBef>
+                <a:spcPts val="0"/>
+              </a:spcBef>
+              <a:spcAft>
+                <a:spcPts val="0"/>
+              </a:spcAft>
+              <a:buNone/>
+            </a:pPr>
+            <a:r>
+              <a:rPr lang="en" sz="900">
+                <a:solidFill>
+                  <a:srgbClr val="FFFFFF"/>
+                </a:solidFill>
+              </a:rPr>
+              <a:t>UC</a:t>
+            </a:r>
+            <a:br>
+              <a:rPr lang="en" sz="900">
+                <a:solidFill>
+                  <a:srgbClr val="FFFFFF"/>
+                </a:solidFill>
+              </a:rPr>
+            </a:br>
+            <a:r>
+              <a:rPr lang="en" sz="900">
+                <a:solidFill>
+                  <a:srgbClr val="FFFFFF"/>
+                </a:solidFill>
+              </a:rPr>
+              <a:t>4</a:t>
+            </a:r>
+            <a:endParaRPr sz="900">
+              <a:solidFill>
+                <a:srgbClr val="FFFFFF"/>
+              </a:solidFill>
+            </a:endParaRPr>
+          </a:p>
+        </p:txBody>
+      </p:sp>
+      <p:sp>
+        <p:nvSpPr>
+          <p:cNvPr id="30" name="Google Shape;215;p28">
+            <a:extLst>
+              <a:ext uri="{FF2B5EF4-FFF2-40B4-BE49-F238E27FC236}">
+                <a16:creationId xmlns:a16="http://schemas.microsoft.com/office/drawing/2014/main" id="{7E24E198-F807-424E-8CAC-D637D6AE49FF}"/>
+              </a:ext>
+            </a:extLst>
+          </p:cNvPr>
+          <p:cNvSpPr/>
+          <p:nvPr/>
+        </p:nvSpPr>
+        <p:spPr>
+          <a:xfrm>
+            <a:off x="6212774" y="3147553"/>
+            <a:ext cx="345000" cy="338400"/>
+          </a:xfrm>
+          <a:prstGeom prst="ellipse">
+            <a:avLst/>
+          </a:prstGeom>
+          <a:solidFill>
+            <a:schemeClr val="dk1"/>
+          </a:solidFill>
+          <a:ln w="9525" cap="flat" cmpd="sng">
+            <a:solidFill>
+              <a:srgbClr val="666666"/>
+            </a:solidFill>
+            <a:prstDash val="solid"/>
+            <a:round/>
+            <a:headEnd type="none" w="sm" len="sm"/>
+            <a:tailEnd type="none" w="sm" len="sm"/>
+          </a:ln>
+        </p:spPr>
+        <p:txBody>
+          <a:bodyPr spcFirstLastPara="1" wrap="square" lIns="0" tIns="0" rIns="0" bIns="0" anchor="ctr" anchorCtr="0">
+            <a:noAutofit/>
+          </a:bodyPr>
+          <a:lstStyle/>
+          <a:p>
+            <a:pPr marL="0" lvl="0" indent="0" algn="ctr" rtl="0">
+              <a:spcBef>
+                <a:spcPts val="0"/>
+              </a:spcBef>
+              <a:spcAft>
+                <a:spcPts val="0"/>
+              </a:spcAft>
+              <a:buNone/>
+            </a:pPr>
+            <a:r>
+              <a:rPr lang="en" sz="900">
+                <a:solidFill>
+                  <a:srgbClr val="FFFFFF"/>
+                </a:solidFill>
+              </a:rPr>
+              <a:t>UC</a:t>
+            </a:r>
+            <a:br>
+              <a:rPr lang="en" sz="900">
+                <a:solidFill>
+                  <a:srgbClr val="FFFFFF"/>
+                </a:solidFill>
+              </a:rPr>
+            </a:br>
+            <a:r>
+              <a:rPr lang="en" sz="900">
+                <a:solidFill>
+                  <a:srgbClr val="FFFFFF"/>
+                </a:solidFill>
+              </a:rPr>
+              <a:t>5</a:t>
+            </a:r>
+            <a:endParaRPr sz="900">
+              <a:solidFill>
+                <a:srgbClr val="FFFFFF"/>
+              </a:solidFill>
+            </a:endParaRPr>
+          </a:p>
+        </p:txBody>
+      </p:sp>
+      <p:sp>
+        <p:nvSpPr>
+          <p:cNvPr id="31" name="Google Shape;93;p16">
+            <a:extLst>
+              <a:ext uri="{FF2B5EF4-FFF2-40B4-BE49-F238E27FC236}">
+                <a16:creationId xmlns:a16="http://schemas.microsoft.com/office/drawing/2014/main" id="{A96E1BC9-E3F5-492F-A6EF-FC80C8BD750F}"/>
+              </a:ext>
+            </a:extLst>
+          </p:cNvPr>
+          <p:cNvSpPr txBox="1"/>
+          <p:nvPr/>
+        </p:nvSpPr>
+        <p:spPr>
+          <a:xfrm>
+            <a:off x="6550911" y="1631786"/>
+            <a:ext cx="2483400" cy="415500"/>
+          </a:xfrm>
+          <a:prstGeom prst="rect">
+            <a:avLst/>
+          </a:prstGeom>
+          <a:noFill/>
+          <a:ln>
+            <a:noFill/>
+          </a:ln>
+        </p:spPr>
+        <p:txBody>
+          <a:bodyPr spcFirstLastPara="1" wrap="square" lIns="91425" tIns="91425" rIns="91425" bIns="91425" anchor="t" anchorCtr="0">
+            <a:noAutofit/>
+          </a:bodyPr>
+          <a:lstStyle/>
+          <a:p>
+            <a:pPr marL="0" lvl="0" indent="0" algn="l" rtl="0">
+              <a:spcBef>
+                <a:spcPts val="0"/>
+              </a:spcBef>
+              <a:spcAft>
+                <a:spcPts val="0"/>
+              </a:spcAft>
+              <a:buNone/>
+            </a:pPr>
+            <a:r>
+              <a:rPr lang="en" sz="1100" dirty="0">
+                <a:solidFill>
+                  <a:schemeClr val="dk1"/>
+                </a:solidFill>
+                <a:latin typeface="Open Sans"/>
+                <a:ea typeface="Open Sans"/>
+                <a:cs typeface="Open Sans"/>
+                <a:sym typeface="Open Sans"/>
+              </a:rPr>
+              <a:t>UC1: </a:t>
+            </a:r>
+            <a:r>
+              <a:rPr lang="en-US" sz="1100" dirty="0">
+                <a:solidFill>
+                  <a:schemeClr val="dk1"/>
+                </a:solidFill>
+                <a:latin typeface="Open Sans"/>
+                <a:ea typeface="Open Sans"/>
+                <a:cs typeface="Open Sans"/>
+                <a:sym typeface="Open Sans"/>
+              </a:rPr>
+              <a:t>Quality Control with CV</a:t>
+            </a:r>
+            <a:endParaRPr sz="1100" dirty="0">
+              <a:solidFill>
+                <a:schemeClr val="dk1"/>
+              </a:solidFill>
+              <a:latin typeface="Open Sans"/>
+              <a:ea typeface="Open Sans"/>
+              <a:cs typeface="Open Sans"/>
+              <a:sym typeface="Open Sans"/>
+            </a:endParaRPr>
+          </a:p>
+        </p:txBody>
+      </p:sp>
+      <p:sp>
+        <p:nvSpPr>
+          <p:cNvPr id="32" name="Google Shape;94;p16">
+            <a:extLst>
+              <a:ext uri="{FF2B5EF4-FFF2-40B4-BE49-F238E27FC236}">
+                <a16:creationId xmlns:a16="http://schemas.microsoft.com/office/drawing/2014/main" id="{AA78509D-C43A-4810-8D67-FA864282F38C}"/>
+              </a:ext>
+            </a:extLst>
+          </p:cNvPr>
+          <p:cNvSpPr txBox="1"/>
+          <p:nvPr/>
+        </p:nvSpPr>
+        <p:spPr>
+          <a:xfrm>
+            <a:off x="6550911" y="2010451"/>
+            <a:ext cx="2483400" cy="415500"/>
+          </a:xfrm>
+          <a:prstGeom prst="rect">
+            <a:avLst/>
+          </a:prstGeom>
+          <a:noFill/>
+          <a:ln>
+            <a:noFill/>
+          </a:ln>
+        </p:spPr>
+        <p:txBody>
+          <a:bodyPr spcFirstLastPara="1" wrap="square" lIns="91425" tIns="91425" rIns="91425" bIns="91425" anchor="t" anchorCtr="0">
+            <a:noAutofit/>
+          </a:bodyPr>
+          <a:lstStyle/>
+          <a:p>
+            <a:pPr lvl="0"/>
+            <a:r>
+              <a:rPr lang="en" sz="1050" dirty="0">
+                <a:solidFill>
+                  <a:schemeClr val="dk1"/>
+                </a:solidFill>
+                <a:latin typeface="Open Sans"/>
+                <a:ea typeface="Open Sans"/>
+                <a:cs typeface="Open Sans"/>
+                <a:sym typeface="Open Sans"/>
+              </a:rPr>
+              <a:t>UC2: </a:t>
+            </a:r>
+            <a:r>
+              <a:rPr lang="en-US" sz="1050" dirty="0">
+                <a:solidFill>
+                  <a:schemeClr val="dk1"/>
+                </a:solidFill>
+                <a:latin typeface="Open Sans"/>
+                <a:ea typeface="Open Sans"/>
+                <a:cs typeface="Open Sans"/>
+                <a:sym typeface="Open Sans"/>
+              </a:rPr>
+              <a:t>Recruiting Screener</a:t>
+            </a:r>
+            <a:endParaRPr sz="1050" dirty="0">
+              <a:solidFill>
+                <a:schemeClr val="dk1"/>
+              </a:solidFill>
+              <a:latin typeface="Open Sans"/>
+              <a:ea typeface="Open Sans"/>
+              <a:cs typeface="Open Sans"/>
+              <a:sym typeface="Open Sans"/>
+            </a:endParaRPr>
+          </a:p>
+        </p:txBody>
+      </p:sp>
+      <p:sp>
+        <p:nvSpPr>
+          <p:cNvPr id="33" name="Google Shape;95;p16">
+            <a:extLst>
+              <a:ext uri="{FF2B5EF4-FFF2-40B4-BE49-F238E27FC236}">
+                <a16:creationId xmlns:a16="http://schemas.microsoft.com/office/drawing/2014/main" id="{1D75455D-7654-4E69-A67F-AD5F5EEB319A}"/>
+              </a:ext>
+            </a:extLst>
+          </p:cNvPr>
+          <p:cNvSpPr txBox="1"/>
+          <p:nvPr/>
+        </p:nvSpPr>
+        <p:spPr>
+          <a:xfrm>
+            <a:off x="6550911" y="2389117"/>
+            <a:ext cx="2483400" cy="415500"/>
+          </a:xfrm>
+          <a:prstGeom prst="rect">
+            <a:avLst/>
+          </a:prstGeom>
+          <a:noFill/>
+          <a:ln>
+            <a:noFill/>
+          </a:ln>
+        </p:spPr>
+        <p:txBody>
+          <a:bodyPr spcFirstLastPara="1" wrap="square" lIns="91425" tIns="91425" rIns="91425" bIns="91425" anchor="t" anchorCtr="0">
+            <a:noAutofit/>
+          </a:bodyPr>
+          <a:lstStyle/>
+          <a:p>
+            <a:pPr marL="0" lvl="0" indent="0" algn="l" rtl="0">
+              <a:spcBef>
+                <a:spcPts val="0"/>
+              </a:spcBef>
+              <a:spcAft>
+                <a:spcPts val="0"/>
+              </a:spcAft>
+              <a:buNone/>
+            </a:pPr>
+            <a:r>
+              <a:rPr lang="en-US" sz="1100" dirty="0">
+                <a:solidFill>
+                  <a:schemeClr val="dk1"/>
+                </a:solidFill>
+                <a:latin typeface="Open Sans"/>
+                <a:ea typeface="Open Sans"/>
+                <a:cs typeface="Open Sans"/>
+                <a:sym typeface="Open Sans"/>
+              </a:rPr>
+              <a:t>UC3: Car detection of customer ID</a:t>
+            </a:r>
+            <a:endParaRPr sz="1100" dirty="0">
+              <a:solidFill>
+                <a:schemeClr val="dk1"/>
+              </a:solidFill>
+              <a:latin typeface="Open Sans"/>
+              <a:ea typeface="Open Sans"/>
+              <a:cs typeface="Open Sans"/>
+              <a:sym typeface="Open Sans"/>
+            </a:endParaRPr>
+          </a:p>
+        </p:txBody>
+      </p:sp>
+      <p:sp>
+        <p:nvSpPr>
+          <p:cNvPr id="34" name="Google Shape;96;p16">
+            <a:extLst>
+              <a:ext uri="{FF2B5EF4-FFF2-40B4-BE49-F238E27FC236}">
+                <a16:creationId xmlns:a16="http://schemas.microsoft.com/office/drawing/2014/main" id="{F4450D74-6D36-4053-BF27-39ABE9920F59}"/>
+              </a:ext>
+            </a:extLst>
+          </p:cNvPr>
+          <p:cNvSpPr txBox="1"/>
+          <p:nvPr/>
+        </p:nvSpPr>
+        <p:spPr>
+          <a:xfrm>
+            <a:off x="6550911" y="2767782"/>
+            <a:ext cx="2483400" cy="415500"/>
+          </a:xfrm>
+          <a:prstGeom prst="rect">
+            <a:avLst/>
+          </a:prstGeom>
+          <a:noFill/>
+          <a:ln>
+            <a:noFill/>
+          </a:ln>
+        </p:spPr>
+        <p:txBody>
+          <a:bodyPr spcFirstLastPara="1" wrap="square" lIns="91425" tIns="91425" rIns="91425" bIns="91425" anchor="t" anchorCtr="0">
+            <a:noAutofit/>
+          </a:bodyPr>
+          <a:lstStyle/>
+          <a:p>
+            <a:pPr marL="0" lvl="0" indent="0" algn="l" rtl="0">
+              <a:spcBef>
+                <a:spcPts val="0"/>
+              </a:spcBef>
+              <a:spcAft>
+                <a:spcPts val="0"/>
+              </a:spcAft>
+              <a:buNone/>
+            </a:pPr>
+            <a:r>
+              <a:rPr lang="en" sz="1050" dirty="0">
+                <a:solidFill>
+                  <a:schemeClr val="dk1"/>
+                </a:solidFill>
+                <a:latin typeface="Open Sans"/>
+                <a:ea typeface="Open Sans"/>
+                <a:cs typeface="Open Sans"/>
+                <a:sym typeface="Open Sans"/>
+              </a:rPr>
+              <a:t>UC4: </a:t>
+            </a:r>
+            <a:r>
+              <a:rPr lang="en-US" sz="1050" dirty="0">
+                <a:solidFill>
+                  <a:schemeClr val="dk1"/>
+                </a:solidFill>
+                <a:latin typeface="Open Sans"/>
+                <a:ea typeface="Open Sans"/>
+                <a:cs typeface="Open Sans"/>
+                <a:sym typeface="Open Sans"/>
+              </a:rPr>
+              <a:t>Car maintenance Expectation</a:t>
+            </a:r>
+            <a:endParaRPr sz="1050" dirty="0">
+              <a:solidFill>
+                <a:schemeClr val="dk1"/>
+              </a:solidFill>
+              <a:latin typeface="Open Sans"/>
+              <a:ea typeface="Open Sans"/>
+              <a:cs typeface="Open Sans"/>
+              <a:sym typeface="Open Sans"/>
+            </a:endParaRPr>
+          </a:p>
+        </p:txBody>
+      </p:sp>
+      <p:sp>
+        <p:nvSpPr>
+          <p:cNvPr id="35" name="Google Shape;97;p16">
+            <a:extLst>
+              <a:ext uri="{FF2B5EF4-FFF2-40B4-BE49-F238E27FC236}">
+                <a16:creationId xmlns:a16="http://schemas.microsoft.com/office/drawing/2014/main" id="{6A1ABCB7-E434-4D77-B196-0B87B427255E}"/>
+              </a:ext>
+            </a:extLst>
+          </p:cNvPr>
+          <p:cNvSpPr txBox="1"/>
+          <p:nvPr/>
+        </p:nvSpPr>
+        <p:spPr>
+          <a:xfrm>
+            <a:off x="6550911" y="3146447"/>
+            <a:ext cx="2483400" cy="415500"/>
+          </a:xfrm>
+          <a:prstGeom prst="rect">
+            <a:avLst/>
+          </a:prstGeom>
+          <a:noFill/>
+          <a:ln>
+            <a:noFill/>
+          </a:ln>
+        </p:spPr>
+        <p:txBody>
+          <a:bodyPr spcFirstLastPara="1" wrap="square" lIns="91425" tIns="91425" rIns="91425" bIns="91425" anchor="t" anchorCtr="0">
+            <a:noAutofit/>
+          </a:bodyPr>
+          <a:lstStyle/>
+          <a:p>
+            <a:pPr marL="0" lvl="0" indent="0" algn="l" rtl="0">
+              <a:spcBef>
+                <a:spcPts val="0"/>
+              </a:spcBef>
+              <a:spcAft>
+                <a:spcPts val="0"/>
+              </a:spcAft>
+              <a:buNone/>
+            </a:pPr>
+            <a:r>
+              <a:rPr lang="en" sz="1100" dirty="0">
+                <a:solidFill>
+                  <a:schemeClr val="dk1"/>
+                </a:solidFill>
+                <a:latin typeface="Open Sans"/>
+                <a:ea typeface="Open Sans"/>
+                <a:cs typeface="Open Sans"/>
+                <a:sym typeface="Open Sans"/>
+              </a:rPr>
+              <a:t>UC5: </a:t>
+            </a:r>
+            <a:r>
+              <a:rPr lang="en-US" sz="1100" dirty="0">
+                <a:solidFill>
+                  <a:schemeClr val="dk1"/>
+                </a:solidFill>
+                <a:latin typeface="Open Sans"/>
+                <a:ea typeface="Open Sans"/>
+                <a:cs typeface="Open Sans"/>
+                <a:sym typeface="Open Sans"/>
+              </a:rPr>
+              <a:t>Supply Chain Costs Predictor</a:t>
+            </a:r>
+            <a:endParaRPr sz="1100" dirty="0">
+              <a:solidFill>
+                <a:schemeClr val="dk1"/>
+              </a:solidFill>
+              <a:latin typeface="Open Sans"/>
+              <a:ea typeface="Open Sans"/>
+              <a:cs typeface="Open Sans"/>
+              <a:sym typeface="Open Sans"/>
+            </a:endParaRPr>
+          </a:p>
+        </p:txBody>
+      </p:sp>
+      <p:sp>
+        <p:nvSpPr>
+          <p:cNvPr id="36" name="Google Shape;214;p28">
+            <a:extLst>
+              <a:ext uri="{FF2B5EF4-FFF2-40B4-BE49-F238E27FC236}">
+                <a16:creationId xmlns:a16="http://schemas.microsoft.com/office/drawing/2014/main" id="{4F244A06-07D2-4238-B992-0AFA2C445E78}"/>
+              </a:ext>
+            </a:extLst>
+          </p:cNvPr>
+          <p:cNvSpPr/>
+          <p:nvPr/>
+        </p:nvSpPr>
+        <p:spPr>
+          <a:xfrm>
+            <a:off x="3498291" y="2107100"/>
+            <a:ext cx="345000" cy="338400"/>
+          </a:xfrm>
+          <a:prstGeom prst="ellipse">
+            <a:avLst/>
+          </a:prstGeom>
+          <a:solidFill>
+            <a:schemeClr val="dk1"/>
+          </a:solidFill>
+          <a:ln w="9525" cap="flat" cmpd="sng">
+            <a:solidFill>
+              <a:srgbClr val="666666"/>
+            </a:solidFill>
+            <a:prstDash val="solid"/>
+            <a:round/>
+            <a:headEnd type="none" w="sm" len="sm"/>
+            <a:tailEnd type="none" w="sm" len="sm"/>
+          </a:ln>
+        </p:spPr>
+        <p:txBody>
+          <a:bodyPr spcFirstLastPara="1" wrap="square" lIns="0" tIns="0" rIns="0" bIns="0" anchor="ctr" anchorCtr="0">
+            <a:noAutofit/>
+          </a:bodyPr>
+          <a:lstStyle/>
+          <a:p>
+            <a:pPr marL="0" lvl="0" indent="0" algn="ctr" rtl="0">
+              <a:spcBef>
+                <a:spcPts val="0"/>
+              </a:spcBef>
+              <a:spcAft>
+                <a:spcPts val="0"/>
+              </a:spcAft>
+              <a:buNone/>
+            </a:pPr>
+            <a:r>
+              <a:rPr lang="en" sz="900">
+                <a:solidFill>
+                  <a:srgbClr val="FFFFFF"/>
+                </a:solidFill>
+              </a:rPr>
+              <a:t>UC</a:t>
+            </a:r>
+            <a:br>
+              <a:rPr lang="en" sz="900">
+                <a:solidFill>
+                  <a:srgbClr val="FFFFFF"/>
+                </a:solidFill>
+              </a:rPr>
+            </a:br>
+            <a:r>
+              <a:rPr lang="en" sz="900">
+                <a:solidFill>
+                  <a:srgbClr val="FFFFFF"/>
+                </a:solidFill>
+              </a:rPr>
+              <a:t>4</a:t>
             </a:r>
             <a:endParaRPr sz="900">
               <a:solidFill>

</xml_diff>